<commit_message>
apply ntoes to fuckup
</commit_message>
<xml_diff>
--- a/2021_FuckUpNight/Presentation.pptx
+++ b/2021_FuckUpNight/Presentation.pptx
@@ -5,7 +5,7 @@
     <p:sldMasterId id="2147483648" r:id="rId1"/>
   </p:sldMasterIdLst>
   <p:notesMasterIdLst>
-    <p:notesMasterId r:id="rId21"/>
+    <p:notesMasterId r:id="rId22"/>
   </p:notesMasterIdLst>
   <p:sldIdLst>
     <p:sldId id="256" r:id="rId2"/>
@@ -24,9 +24,10 @@
     <p:sldId id="271" r:id="rId15"/>
     <p:sldId id="272" r:id="rId16"/>
     <p:sldId id="270" r:id="rId17"/>
-    <p:sldId id="275" r:id="rId18"/>
-    <p:sldId id="274" r:id="rId19"/>
-    <p:sldId id="276" r:id="rId20"/>
+    <p:sldId id="277" r:id="rId18"/>
+    <p:sldId id="275" r:id="rId19"/>
+    <p:sldId id="274" r:id="rId20"/>
+    <p:sldId id="276" r:id="rId21"/>
   </p:sldIdLst>
   <p:sldSz cx="12192000" cy="6858000"/>
   <p:notesSz cx="6858000" cy="9144000"/>
@@ -162,6 +163,7 @@
         </p14:section>
         <p14:section name="А что если" id="{9667AFB5-4A8D-4A24-A956-25CB62A881E0}">
           <p14:sldIdLst>
+            <p14:sldId id="277"/>
             <p14:sldId id="275"/>
             <p14:sldId id="274"/>
           </p14:sldIdLst>
@@ -4227,6 +4229,813 @@
 </file>
 
 <file path=ppt/diagrams/colors14.xml><?xml version="1.0" encoding="utf-8"?>
+<dgm:colorsDef xmlns:dgm="http://schemas.openxmlformats.org/drawingml/2006/diagram" xmlns:a="http://schemas.openxmlformats.org/drawingml/2006/main" uniqueId="urn:microsoft.com/office/officeart/2005/8/colors/accent1_1">
+  <dgm:title val=""/>
+  <dgm:desc val=""/>
+  <dgm:catLst>
+    <dgm:cat type="accent1" pri="11100"/>
+  </dgm:catLst>
+  <dgm:styleLbl name="node0">
+    <dgm:fillClrLst meth="repeat">
+      <a:schemeClr val="lt1"/>
+    </dgm:fillClrLst>
+    <dgm:linClrLst meth="repeat">
+      <a:schemeClr val="accent1">
+        <a:shade val="80000"/>
+      </a:schemeClr>
+    </dgm:linClrLst>
+    <dgm:effectClrLst/>
+    <dgm:txLinClrLst/>
+    <dgm:txFillClrLst meth="repeat">
+      <a:schemeClr val="dk1"/>
+    </dgm:txFillClrLst>
+    <dgm:txEffectClrLst/>
+  </dgm:styleLbl>
+  <dgm:styleLbl name="alignNode1">
+    <dgm:fillClrLst meth="repeat">
+      <a:schemeClr val="lt1"/>
+    </dgm:fillClrLst>
+    <dgm:linClrLst meth="repeat">
+      <a:schemeClr val="accent1">
+        <a:shade val="80000"/>
+      </a:schemeClr>
+    </dgm:linClrLst>
+    <dgm:effectClrLst/>
+    <dgm:txLinClrLst/>
+    <dgm:txFillClrLst meth="repeat">
+      <a:schemeClr val="dk1"/>
+    </dgm:txFillClrLst>
+    <dgm:txEffectClrLst/>
+  </dgm:styleLbl>
+  <dgm:styleLbl name="node1">
+    <dgm:fillClrLst meth="repeat">
+      <a:schemeClr val="lt1"/>
+    </dgm:fillClrLst>
+    <dgm:linClrLst meth="repeat">
+      <a:schemeClr val="accent1">
+        <a:shade val="80000"/>
+      </a:schemeClr>
+    </dgm:linClrLst>
+    <dgm:effectClrLst/>
+    <dgm:txLinClrLst/>
+    <dgm:txFillClrLst meth="repeat">
+      <a:schemeClr val="dk1"/>
+    </dgm:txFillClrLst>
+    <dgm:txEffectClrLst/>
+  </dgm:styleLbl>
+  <dgm:styleLbl name="lnNode1">
+    <dgm:fillClrLst meth="repeat">
+      <a:schemeClr val="lt1"/>
+    </dgm:fillClrLst>
+    <dgm:linClrLst meth="repeat">
+      <a:schemeClr val="accent1">
+        <a:shade val="80000"/>
+      </a:schemeClr>
+    </dgm:linClrLst>
+    <dgm:effectClrLst/>
+    <dgm:txLinClrLst/>
+    <dgm:txFillClrLst meth="repeat">
+      <a:schemeClr val="dk1"/>
+    </dgm:txFillClrLst>
+    <dgm:txEffectClrLst/>
+  </dgm:styleLbl>
+  <dgm:styleLbl name="vennNode1">
+    <dgm:fillClrLst meth="repeat">
+      <a:schemeClr val="lt1">
+        <a:alpha val="50000"/>
+      </a:schemeClr>
+    </dgm:fillClrLst>
+    <dgm:linClrLst meth="repeat">
+      <a:schemeClr val="accent1">
+        <a:shade val="80000"/>
+      </a:schemeClr>
+    </dgm:linClrLst>
+    <dgm:effectClrLst/>
+    <dgm:txLinClrLst/>
+    <dgm:txFillClrLst/>
+    <dgm:txEffectClrLst/>
+  </dgm:styleLbl>
+  <dgm:styleLbl name="node2">
+    <dgm:fillClrLst meth="repeat">
+      <a:schemeClr val="lt1"/>
+    </dgm:fillClrLst>
+    <dgm:linClrLst meth="repeat">
+      <a:schemeClr val="accent1">
+        <a:shade val="80000"/>
+      </a:schemeClr>
+    </dgm:linClrLst>
+    <dgm:effectClrLst/>
+    <dgm:txLinClrLst/>
+    <dgm:txFillClrLst meth="repeat">
+      <a:schemeClr val="dk1"/>
+    </dgm:txFillClrLst>
+    <dgm:txEffectClrLst/>
+  </dgm:styleLbl>
+  <dgm:styleLbl name="node3">
+    <dgm:fillClrLst meth="repeat">
+      <a:schemeClr val="lt1"/>
+    </dgm:fillClrLst>
+    <dgm:linClrLst meth="repeat">
+      <a:schemeClr val="accent1">
+        <a:shade val="80000"/>
+      </a:schemeClr>
+    </dgm:linClrLst>
+    <dgm:effectClrLst/>
+    <dgm:txLinClrLst/>
+    <dgm:txFillClrLst meth="repeat">
+      <a:schemeClr val="dk1"/>
+    </dgm:txFillClrLst>
+    <dgm:txEffectClrLst/>
+  </dgm:styleLbl>
+  <dgm:styleLbl name="node4">
+    <dgm:fillClrLst meth="repeat">
+      <a:schemeClr val="lt1"/>
+    </dgm:fillClrLst>
+    <dgm:linClrLst meth="repeat">
+      <a:schemeClr val="accent1">
+        <a:shade val="80000"/>
+      </a:schemeClr>
+    </dgm:linClrLst>
+    <dgm:effectClrLst/>
+    <dgm:txLinClrLst/>
+    <dgm:txFillClrLst meth="repeat">
+      <a:schemeClr val="dk1"/>
+    </dgm:txFillClrLst>
+    <dgm:txEffectClrLst/>
+  </dgm:styleLbl>
+  <dgm:styleLbl name="fgImgPlace1">
+    <dgm:fillClrLst meth="repeat">
+      <a:schemeClr val="accent1">
+        <a:tint val="40000"/>
+      </a:schemeClr>
+    </dgm:fillClrLst>
+    <dgm:linClrLst meth="repeat">
+      <a:schemeClr val="accent1">
+        <a:shade val="80000"/>
+      </a:schemeClr>
+    </dgm:linClrLst>
+    <dgm:effectClrLst/>
+    <dgm:txLinClrLst/>
+    <dgm:txFillClrLst meth="repeat">
+      <a:schemeClr val="lt1"/>
+    </dgm:txFillClrLst>
+    <dgm:txEffectClrLst/>
+  </dgm:styleLbl>
+  <dgm:styleLbl name="alignImgPlace1">
+    <dgm:fillClrLst meth="repeat">
+      <a:schemeClr val="accent1">
+        <a:tint val="40000"/>
+      </a:schemeClr>
+    </dgm:fillClrLst>
+    <dgm:linClrLst meth="repeat">
+      <a:schemeClr val="accent1">
+        <a:shade val="80000"/>
+      </a:schemeClr>
+    </dgm:linClrLst>
+    <dgm:effectClrLst/>
+    <dgm:txLinClrLst/>
+    <dgm:txFillClrLst meth="repeat">
+      <a:schemeClr val="lt1"/>
+    </dgm:txFillClrLst>
+    <dgm:txEffectClrLst/>
+  </dgm:styleLbl>
+  <dgm:styleLbl name="bgImgPlace1">
+    <dgm:fillClrLst meth="repeat">
+      <a:schemeClr val="accent1">
+        <a:tint val="40000"/>
+      </a:schemeClr>
+    </dgm:fillClrLst>
+    <dgm:linClrLst meth="repeat">
+      <a:schemeClr val="accent1">
+        <a:shade val="80000"/>
+      </a:schemeClr>
+    </dgm:linClrLst>
+    <dgm:effectClrLst/>
+    <dgm:txLinClrLst/>
+    <dgm:txFillClrLst meth="repeat">
+      <a:schemeClr val="lt1"/>
+    </dgm:txFillClrLst>
+    <dgm:txEffectClrLst/>
+  </dgm:styleLbl>
+  <dgm:styleLbl name="sibTrans2D1">
+    <dgm:fillClrLst meth="repeat">
+      <a:schemeClr val="accent1">
+        <a:tint val="60000"/>
+      </a:schemeClr>
+    </dgm:fillClrLst>
+    <dgm:linClrLst meth="repeat">
+      <a:schemeClr val="accent1">
+        <a:tint val="60000"/>
+      </a:schemeClr>
+    </dgm:linClrLst>
+    <dgm:effectClrLst/>
+    <dgm:txLinClrLst/>
+    <dgm:txFillClrLst meth="repeat">
+      <a:schemeClr val="dk1"/>
+    </dgm:txFillClrLst>
+    <dgm:txEffectClrLst/>
+  </dgm:styleLbl>
+  <dgm:styleLbl name="fgSibTrans2D1">
+    <dgm:fillClrLst meth="repeat">
+      <a:schemeClr val="accent1">
+        <a:tint val="60000"/>
+      </a:schemeClr>
+    </dgm:fillClrLst>
+    <dgm:linClrLst meth="repeat">
+      <a:schemeClr val="accent1">
+        <a:tint val="60000"/>
+      </a:schemeClr>
+    </dgm:linClrLst>
+    <dgm:effectClrLst/>
+    <dgm:txLinClrLst/>
+    <dgm:txFillClrLst meth="repeat">
+      <a:schemeClr val="dk1"/>
+    </dgm:txFillClrLst>
+    <dgm:txEffectClrLst/>
+  </dgm:styleLbl>
+  <dgm:styleLbl name="bgSibTrans2D1">
+    <dgm:fillClrLst meth="repeat">
+      <a:schemeClr val="accent1">
+        <a:tint val="60000"/>
+      </a:schemeClr>
+    </dgm:fillClrLst>
+    <dgm:linClrLst meth="repeat">
+      <a:schemeClr val="accent1">
+        <a:tint val="60000"/>
+      </a:schemeClr>
+    </dgm:linClrLst>
+    <dgm:effectClrLst/>
+    <dgm:txLinClrLst/>
+    <dgm:txFillClrLst meth="repeat">
+      <a:schemeClr val="dk1"/>
+    </dgm:txFillClrLst>
+    <dgm:txEffectClrLst/>
+  </dgm:styleLbl>
+  <dgm:styleLbl name="sibTrans1D1">
+    <dgm:fillClrLst meth="repeat">
+      <a:schemeClr val="accent1"/>
+    </dgm:fillClrLst>
+    <dgm:linClrLst meth="repeat">
+      <a:schemeClr val="accent1"/>
+    </dgm:linClrLst>
+    <dgm:effectClrLst/>
+    <dgm:txLinClrLst/>
+    <dgm:txFillClrLst meth="repeat">
+      <a:schemeClr val="tx1"/>
+    </dgm:txFillClrLst>
+    <dgm:txEffectClrLst/>
+  </dgm:styleLbl>
+  <dgm:styleLbl name="callout">
+    <dgm:fillClrLst meth="repeat">
+      <a:schemeClr val="accent1"/>
+    </dgm:fillClrLst>
+    <dgm:linClrLst meth="repeat">
+      <a:schemeClr val="accent1"/>
+    </dgm:linClrLst>
+    <dgm:effectClrLst/>
+    <dgm:txLinClrLst/>
+    <dgm:txFillClrLst meth="repeat">
+      <a:schemeClr val="tx1"/>
+    </dgm:txFillClrLst>
+    <dgm:txEffectClrLst/>
+  </dgm:styleLbl>
+  <dgm:styleLbl name="asst0">
+    <dgm:fillClrLst meth="repeat">
+      <a:schemeClr val="lt1"/>
+    </dgm:fillClrLst>
+    <dgm:linClrLst meth="repeat">
+      <a:schemeClr val="accent1">
+        <a:shade val="80000"/>
+      </a:schemeClr>
+    </dgm:linClrLst>
+    <dgm:effectClrLst/>
+    <dgm:txLinClrLst/>
+    <dgm:txFillClrLst meth="repeat">
+      <a:schemeClr val="dk1"/>
+    </dgm:txFillClrLst>
+    <dgm:txEffectClrLst/>
+  </dgm:styleLbl>
+  <dgm:styleLbl name="asst1">
+    <dgm:fillClrLst meth="repeat">
+      <a:schemeClr val="lt1"/>
+    </dgm:fillClrLst>
+    <dgm:linClrLst meth="repeat">
+      <a:schemeClr val="accent1">
+        <a:shade val="80000"/>
+      </a:schemeClr>
+    </dgm:linClrLst>
+    <dgm:effectClrLst/>
+    <dgm:txLinClrLst/>
+    <dgm:txFillClrLst meth="repeat">
+      <a:schemeClr val="dk1"/>
+    </dgm:txFillClrLst>
+    <dgm:txEffectClrLst/>
+  </dgm:styleLbl>
+  <dgm:styleLbl name="asst2">
+    <dgm:fillClrLst meth="repeat">
+      <a:schemeClr val="lt1"/>
+    </dgm:fillClrLst>
+    <dgm:linClrLst meth="repeat">
+      <a:schemeClr val="accent1">
+        <a:shade val="80000"/>
+      </a:schemeClr>
+    </dgm:linClrLst>
+    <dgm:effectClrLst/>
+    <dgm:txLinClrLst/>
+    <dgm:txFillClrLst meth="repeat">
+      <a:schemeClr val="dk1"/>
+    </dgm:txFillClrLst>
+    <dgm:txEffectClrLst/>
+  </dgm:styleLbl>
+  <dgm:styleLbl name="asst3">
+    <dgm:fillClrLst meth="repeat">
+      <a:schemeClr val="lt1"/>
+    </dgm:fillClrLst>
+    <dgm:linClrLst meth="repeat">
+      <a:schemeClr val="accent1">
+        <a:shade val="80000"/>
+      </a:schemeClr>
+    </dgm:linClrLst>
+    <dgm:effectClrLst/>
+    <dgm:txLinClrLst/>
+    <dgm:txFillClrLst meth="repeat">
+      <a:schemeClr val="dk1"/>
+    </dgm:txFillClrLst>
+    <dgm:txEffectClrLst/>
+  </dgm:styleLbl>
+  <dgm:styleLbl name="asst4">
+    <dgm:fillClrLst meth="repeat">
+      <a:schemeClr val="lt1"/>
+    </dgm:fillClrLst>
+    <dgm:linClrLst meth="repeat">
+      <a:schemeClr val="accent1">
+        <a:shade val="80000"/>
+      </a:schemeClr>
+    </dgm:linClrLst>
+    <dgm:effectClrLst/>
+    <dgm:txLinClrLst/>
+    <dgm:txFillClrLst meth="repeat">
+      <a:schemeClr val="dk1"/>
+    </dgm:txFillClrLst>
+    <dgm:txEffectClrLst/>
+  </dgm:styleLbl>
+  <dgm:styleLbl name="parChTrans2D1">
+    <dgm:fillClrLst meth="repeat">
+      <a:schemeClr val="accent1">
+        <a:tint val="60000"/>
+      </a:schemeClr>
+    </dgm:fillClrLst>
+    <dgm:linClrLst meth="repeat">
+      <a:schemeClr val="accent1">
+        <a:tint val="60000"/>
+      </a:schemeClr>
+    </dgm:linClrLst>
+    <dgm:effectClrLst/>
+    <dgm:txLinClrLst/>
+    <dgm:txFillClrLst/>
+    <dgm:txEffectClrLst/>
+  </dgm:styleLbl>
+  <dgm:styleLbl name="parChTrans2D2">
+    <dgm:fillClrLst meth="repeat">
+      <a:schemeClr val="accent1"/>
+    </dgm:fillClrLst>
+    <dgm:linClrLst meth="repeat">
+      <a:schemeClr val="accent1"/>
+    </dgm:linClrLst>
+    <dgm:effectClrLst/>
+    <dgm:txLinClrLst/>
+    <dgm:txFillClrLst/>
+    <dgm:txEffectClrLst/>
+  </dgm:styleLbl>
+  <dgm:styleLbl name="parChTrans2D3">
+    <dgm:fillClrLst meth="repeat">
+      <a:schemeClr val="accent1"/>
+    </dgm:fillClrLst>
+    <dgm:linClrLst meth="repeat">
+      <a:schemeClr val="accent1"/>
+    </dgm:linClrLst>
+    <dgm:effectClrLst/>
+    <dgm:txLinClrLst/>
+    <dgm:txFillClrLst/>
+    <dgm:txEffectClrLst/>
+  </dgm:styleLbl>
+  <dgm:styleLbl name="parChTrans2D4">
+    <dgm:fillClrLst meth="repeat">
+      <a:schemeClr val="accent1"/>
+    </dgm:fillClrLst>
+    <dgm:linClrLst meth="repeat">
+      <a:schemeClr val="accent1"/>
+    </dgm:linClrLst>
+    <dgm:effectClrLst/>
+    <dgm:txLinClrLst/>
+    <dgm:txFillClrLst meth="repeat">
+      <a:schemeClr val="lt1"/>
+    </dgm:txFillClrLst>
+    <dgm:txEffectClrLst/>
+  </dgm:styleLbl>
+  <dgm:styleLbl name="parChTrans1D1">
+    <dgm:fillClrLst meth="repeat">
+      <a:schemeClr val="accent1"/>
+    </dgm:fillClrLst>
+    <dgm:linClrLst meth="repeat">
+      <a:schemeClr val="accent1">
+        <a:shade val="60000"/>
+      </a:schemeClr>
+    </dgm:linClrLst>
+    <dgm:effectClrLst/>
+    <dgm:txLinClrLst/>
+    <dgm:txFillClrLst meth="repeat">
+      <a:schemeClr val="tx1"/>
+    </dgm:txFillClrLst>
+    <dgm:txEffectClrLst/>
+  </dgm:styleLbl>
+  <dgm:styleLbl name="parChTrans1D2">
+    <dgm:fillClrLst meth="repeat">
+      <a:schemeClr val="accent1"/>
+    </dgm:fillClrLst>
+    <dgm:linClrLst meth="repeat">
+      <a:schemeClr val="accent1">
+        <a:shade val="60000"/>
+      </a:schemeClr>
+    </dgm:linClrLst>
+    <dgm:effectClrLst/>
+    <dgm:txLinClrLst/>
+    <dgm:txFillClrLst meth="repeat">
+      <a:schemeClr val="tx1"/>
+    </dgm:txFillClrLst>
+    <dgm:txEffectClrLst/>
+  </dgm:styleLbl>
+  <dgm:styleLbl name="parChTrans1D3">
+    <dgm:fillClrLst meth="repeat">
+      <a:schemeClr val="accent1"/>
+    </dgm:fillClrLst>
+    <dgm:linClrLst meth="repeat">
+      <a:schemeClr val="accent1">
+        <a:shade val="80000"/>
+      </a:schemeClr>
+    </dgm:linClrLst>
+    <dgm:effectClrLst/>
+    <dgm:txLinClrLst/>
+    <dgm:txFillClrLst meth="repeat">
+      <a:schemeClr val="tx1"/>
+    </dgm:txFillClrLst>
+    <dgm:txEffectClrLst/>
+  </dgm:styleLbl>
+  <dgm:styleLbl name="parChTrans1D4">
+    <dgm:fillClrLst meth="repeat">
+      <a:schemeClr val="accent1"/>
+    </dgm:fillClrLst>
+    <dgm:linClrLst meth="repeat">
+      <a:schemeClr val="accent1">
+        <a:shade val="80000"/>
+      </a:schemeClr>
+    </dgm:linClrLst>
+    <dgm:effectClrLst/>
+    <dgm:txLinClrLst/>
+    <dgm:txFillClrLst meth="repeat">
+      <a:schemeClr val="tx1"/>
+    </dgm:txFillClrLst>
+    <dgm:txEffectClrLst/>
+  </dgm:styleLbl>
+  <dgm:styleLbl name="fgAcc1">
+    <dgm:fillClrLst meth="repeat">
+      <a:schemeClr val="accent1">
+        <a:alpha val="90000"/>
+        <a:tint val="40000"/>
+      </a:schemeClr>
+    </dgm:fillClrLst>
+    <dgm:linClrLst meth="repeat">
+      <a:schemeClr val="accent1"/>
+    </dgm:linClrLst>
+    <dgm:effectClrLst/>
+    <dgm:txLinClrLst/>
+    <dgm:txFillClrLst meth="repeat">
+      <a:schemeClr val="dk1"/>
+    </dgm:txFillClrLst>
+    <dgm:txEffectClrLst/>
+  </dgm:styleLbl>
+  <dgm:styleLbl name="conFgAcc1">
+    <dgm:fillClrLst meth="repeat">
+      <a:schemeClr val="accent1">
+        <a:alpha val="90000"/>
+        <a:tint val="40000"/>
+      </a:schemeClr>
+    </dgm:fillClrLst>
+    <dgm:linClrLst meth="repeat">
+      <a:schemeClr val="accent1"/>
+    </dgm:linClrLst>
+    <dgm:effectClrLst/>
+    <dgm:txLinClrLst/>
+    <dgm:txFillClrLst meth="repeat">
+      <a:schemeClr val="dk1"/>
+    </dgm:txFillClrLst>
+    <dgm:txEffectClrLst/>
+  </dgm:styleLbl>
+  <dgm:styleLbl name="alignAcc1">
+    <dgm:fillClrLst meth="repeat">
+      <a:schemeClr val="accent1">
+        <a:alpha val="90000"/>
+        <a:tint val="40000"/>
+      </a:schemeClr>
+    </dgm:fillClrLst>
+    <dgm:linClrLst meth="repeat">
+      <a:schemeClr val="accent1"/>
+    </dgm:linClrLst>
+    <dgm:effectClrLst/>
+    <dgm:txLinClrLst/>
+    <dgm:txFillClrLst meth="repeat">
+      <a:schemeClr val="dk1"/>
+    </dgm:txFillClrLst>
+    <dgm:txEffectClrLst/>
+  </dgm:styleLbl>
+  <dgm:styleLbl name="trAlignAcc1">
+    <dgm:fillClrLst meth="repeat">
+      <a:schemeClr val="accent1">
+        <a:alpha val="40000"/>
+        <a:tint val="40000"/>
+      </a:schemeClr>
+    </dgm:fillClrLst>
+    <dgm:linClrLst meth="repeat">
+      <a:schemeClr val="accent1"/>
+    </dgm:linClrLst>
+    <dgm:effectClrLst/>
+    <dgm:txLinClrLst/>
+    <dgm:txFillClrLst meth="repeat">
+      <a:schemeClr val="dk1"/>
+    </dgm:txFillClrLst>
+    <dgm:txEffectClrLst/>
+  </dgm:styleLbl>
+  <dgm:styleLbl name="bgAcc1">
+    <dgm:fillClrLst meth="repeat">
+      <a:schemeClr val="accent1">
+        <a:alpha val="90000"/>
+        <a:tint val="40000"/>
+      </a:schemeClr>
+    </dgm:fillClrLst>
+    <dgm:linClrLst meth="repeat">
+      <a:schemeClr val="accent1"/>
+    </dgm:linClrLst>
+    <dgm:effectClrLst/>
+    <dgm:txLinClrLst/>
+    <dgm:txFillClrLst meth="repeat">
+      <a:schemeClr val="dk1"/>
+    </dgm:txFillClrLst>
+    <dgm:txEffectClrLst/>
+  </dgm:styleLbl>
+  <dgm:styleLbl name="solidFgAcc1">
+    <dgm:fillClrLst meth="repeat">
+      <a:schemeClr val="lt1"/>
+    </dgm:fillClrLst>
+    <dgm:linClrLst meth="repeat">
+      <a:schemeClr val="accent1"/>
+    </dgm:linClrLst>
+    <dgm:effectClrLst/>
+    <dgm:txLinClrLst/>
+    <dgm:txFillClrLst meth="repeat">
+      <a:schemeClr val="dk1"/>
+    </dgm:txFillClrLst>
+    <dgm:txEffectClrLst/>
+  </dgm:styleLbl>
+  <dgm:styleLbl name="solidAlignAcc1">
+    <dgm:fillClrLst meth="repeat">
+      <a:schemeClr val="lt1"/>
+    </dgm:fillClrLst>
+    <dgm:linClrLst meth="repeat">
+      <a:schemeClr val="accent1"/>
+    </dgm:linClrLst>
+    <dgm:effectClrLst/>
+    <dgm:txLinClrLst/>
+    <dgm:txFillClrLst meth="repeat">
+      <a:schemeClr val="dk1"/>
+    </dgm:txFillClrLst>
+    <dgm:txEffectClrLst/>
+  </dgm:styleLbl>
+  <dgm:styleLbl name="solidBgAcc1">
+    <dgm:fillClrLst meth="repeat">
+      <a:schemeClr val="lt1"/>
+    </dgm:fillClrLst>
+    <dgm:linClrLst meth="repeat">
+      <a:schemeClr val="accent1"/>
+    </dgm:linClrLst>
+    <dgm:effectClrLst/>
+    <dgm:txLinClrLst/>
+    <dgm:txFillClrLst meth="repeat">
+      <a:schemeClr val="dk1"/>
+    </dgm:txFillClrLst>
+    <dgm:txEffectClrLst/>
+  </dgm:styleLbl>
+  <dgm:styleLbl name="fgAccFollowNode1">
+    <dgm:fillClrLst meth="repeat">
+      <a:schemeClr val="lt1">
+        <a:alpha val="90000"/>
+        <a:tint val="40000"/>
+      </a:schemeClr>
+    </dgm:fillClrLst>
+    <dgm:linClrLst meth="repeat">
+      <a:schemeClr val="accent1">
+        <a:alpha val="90000"/>
+      </a:schemeClr>
+    </dgm:linClrLst>
+    <dgm:effectClrLst/>
+    <dgm:txLinClrLst/>
+    <dgm:txFillClrLst meth="repeat">
+      <a:schemeClr val="dk1"/>
+    </dgm:txFillClrLst>
+    <dgm:txEffectClrLst/>
+  </dgm:styleLbl>
+  <dgm:styleLbl name="alignAccFollowNode1">
+    <dgm:fillClrLst meth="repeat">
+      <a:schemeClr val="lt1">
+        <a:alpha val="90000"/>
+        <a:tint val="40000"/>
+      </a:schemeClr>
+    </dgm:fillClrLst>
+    <dgm:linClrLst meth="repeat">
+      <a:schemeClr val="accent1">
+        <a:alpha val="90000"/>
+      </a:schemeClr>
+    </dgm:linClrLst>
+    <dgm:effectClrLst/>
+    <dgm:txLinClrLst/>
+    <dgm:txFillClrLst meth="repeat">
+      <a:schemeClr val="dk1"/>
+    </dgm:txFillClrLst>
+    <dgm:txEffectClrLst/>
+  </dgm:styleLbl>
+  <dgm:styleLbl name="bgAccFollowNode1">
+    <dgm:fillClrLst meth="repeat">
+      <a:schemeClr val="lt1">
+        <a:alpha val="90000"/>
+        <a:tint val="40000"/>
+      </a:schemeClr>
+    </dgm:fillClrLst>
+    <dgm:linClrLst meth="repeat">
+      <a:schemeClr val="accent1">
+        <a:alpha val="90000"/>
+      </a:schemeClr>
+    </dgm:linClrLst>
+    <dgm:effectClrLst/>
+    <dgm:txLinClrLst/>
+    <dgm:txFillClrLst meth="repeat">
+      <a:schemeClr val="dk1"/>
+    </dgm:txFillClrLst>
+    <dgm:txEffectClrLst/>
+  </dgm:styleLbl>
+  <dgm:styleLbl name="fgAcc0">
+    <dgm:fillClrLst meth="repeat">
+      <a:schemeClr val="accent1">
+        <a:alpha val="90000"/>
+        <a:tint val="40000"/>
+      </a:schemeClr>
+    </dgm:fillClrLst>
+    <dgm:linClrLst meth="repeat">
+      <a:schemeClr val="accent1"/>
+    </dgm:linClrLst>
+    <dgm:effectClrLst/>
+    <dgm:txLinClrLst/>
+    <dgm:txFillClrLst meth="repeat">
+      <a:schemeClr val="dk1"/>
+    </dgm:txFillClrLst>
+    <dgm:txEffectClrLst/>
+  </dgm:styleLbl>
+  <dgm:styleLbl name="fgAcc2">
+    <dgm:fillClrLst meth="repeat">
+      <a:schemeClr val="accent1">
+        <a:alpha val="90000"/>
+        <a:tint val="40000"/>
+      </a:schemeClr>
+    </dgm:fillClrLst>
+    <dgm:linClrLst meth="repeat">
+      <a:schemeClr val="accent1"/>
+    </dgm:linClrLst>
+    <dgm:effectClrLst/>
+    <dgm:txLinClrLst/>
+    <dgm:txFillClrLst meth="repeat">
+      <a:schemeClr val="dk1"/>
+    </dgm:txFillClrLst>
+    <dgm:txEffectClrLst/>
+  </dgm:styleLbl>
+  <dgm:styleLbl name="fgAcc3">
+    <dgm:fillClrLst meth="repeat">
+      <a:schemeClr val="accent1">
+        <a:alpha val="90000"/>
+        <a:tint val="40000"/>
+      </a:schemeClr>
+    </dgm:fillClrLst>
+    <dgm:linClrLst meth="repeat">
+      <a:schemeClr val="accent1"/>
+    </dgm:linClrLst>
+    <dgm:effectClrLst/>
+    <dgm:txLinClrLst/>
+    <dgm:txFillClrLst meth="repeat">
+      <a:schemeClr val="dk1"/>
+    </dgm:txFillClrLst>
+    <dgm:txEffectClrLst/>
+  </dgm:styleLbl>
+  <dgm:styleLbl name="fgAcc4">
+    <dgm:fillClrLst meth="repeat">
+      <a:schemeClr val="accent1">
+        <a:alpha val="90000"/>
+        <a:tint val="40000"/>
+      </a:schemeClr>
+    </dgm:fillClrLst>
+    <dgm:linClrLst meth="repeat">
+      <a:schemeClr val="accent1"/>
+    </dgm:linClrLst>
+    <dgm:effectClrLst/>
+    <dgm:txLinClrLst/>
+    <dgm:txFillClrLst meth="repeat">
+      <a:schemeClr val="dk1"/>
+    </dgm:txFillClrLst>
+    <dgm:txEffectClrLst/>
+  </dgm:styleLbl>
+  <dgm:styleLbl name="bgShp">
+    <dgm:fillClrLst meth="repeat">
+      <a:schemeClr val="accent1">
+        <a:tint val="40000"/>
+      </a:schemeClr>
+    </dgm:fillClrLst>
+    <dgm:linClrLst meth="repeat">
+      <a:schemeClr val="accent1"/>
+    </dgm:linClrLst>
+    <dgm:effectClrLst/>
+    <dgm:txLinClrLst/>
+    <dgm:txFillClrLst meth="repeat">
+      <a:schemeClr val="dk1"/>
+    </dgm:txFillClrLst>
+    <dgm:txEffectClrLst/>
+  </dgm:styleLbl>
+  <dgm:styleLbl name="dkBgShp">
+    <dgm:fillClrLst meth="repeat">
+      <a:schemeClr val="accent1">
+        <a:shade val="80000"/>
+      </a:schemeClr>
+    </dgm:fillClrLst>
+    <dgm:linClrLst meth="repeat">
+      <a:schemeClr val="accent1"/>
+    </dgm:linClrLst>
+    <dgm:effectClrLst/>
+    <dgm:txLinClrLst/>
+    <dgm:txFillClrLst meth="repeat">
+      <a:schemeClr val="lt1"/>
+    </dgm:txFillClrLst>
+    <dgm:txEffectClrLst/>
+  </dgm:styleLbl>
+  <dgm:styleLbl name="trBgShp">
+    <dgm:fillClrLst meth="repeat">
+      <a:schemeClr val="accent1">
+        <a:tint val="50000"/>
+        <a:alpha val="40000"/>
+      </a:schemeClr>
+    </dgm:fillClrLst>
+    <dgm:linClrLst meth="repeat">
+      <a:schemeClr val="accent1"/>
+    </dgm:linClrLst>
+    <dgm:effectClrLst/>
+    <dgm:txLinClrLst/>
+    <dgm:txFillClrLst meth="repeat">
+      <a:schemeClr val="lt1"/>
+    </dgm:txFillClrLst>
+    <dgm:txEffectClrLst/>
+  </dgm:styleLbl>
+  <dgm:styleLbl name="fgShp">
+    <dgm:fillClrLst meth="repeat">
+      <a:schemeClr val="accent1">
+        <a:tint val="60000"/>
+      </a:schemeClr>
+    </dgm:fillClrLst>
+    <dgm:linClrLst meth="repeat">
+      <a:schemeClr val="lt1"/>
+    </dgm:linClrLst>
+    <dgm:effectClrLst/>
+    <dgm:txLinClrLst/>
+    <dgm:txFillClrLst meth="repeat">
+      <a:schemeClr val="dk1"/>
+    </dgm:txFillClrLst>
+    <dgm:txEffectClrLst/>
+  </dgm:styleLbl>
+  <dgm:styleLbl name="revTx">
+    <dgm:fillClrLst meth="repeat">
+      <a:schemeClr val="lt1">
+        <a:alpha val="0"/>
+      </a:schemeClr>
+    </dgm:fillClrLst>
+    <dgm:linClrLst meth="repeat">
+      <a:schemeClr val="dk1">
+        <a:alpha val="0"/>
+      </a:schemeClr>
+    </dgm:linClrLst>
+    <dgm:effectClrLst/>
+    <dgm:txLinClrLst/>
+    <dgm:txFillClrLst meth="repeat">
+      <a:schemeClr val="tx1"/>
+    </dgm:txFillClrLst>
+    <dgm:txEffectClrLst/>
+  </dgm:styleLbl>
+</dgm:colorsDef>
+</file>
+
+<file path=ppt/diagrams/colors15.xml><?xml version="1.0" encoding="utf-8"?>
 <dgm:colorsDef xmlns:dgm="http://schemas.openxmlformats.org/drawingml/2006/diagram" xmlns:a="http://schemas.openxmlformats.org/drawingml/2006/main" uniqueId="urn:microsoft.com/office/officeart/2005/8/colors/accent1_1">
   <dgm:title val=""/>
   <dgm:desc val=""/>
@@ -12807,6 +13616,276 @@
 <file path=ppt/diagrams/data13.xml><?xml version="1.0" encoding="utf-8"?>
 <dgm:dataModel xmlns:dgm="http://schemas.openxmlformats.org/drawingml/2006/diagram" xmlns:a="http://schemas.openxmlformats.org/drawingml/2006/main">
   <dgm:ptLst>
+    <dgm:pt modelId="{D2DB5F5A-2C93-4848-854B-4FB89EC7F113}" type="doc">
+      <dgm:prSet loTypeId="urn:microsoft.com/office/officeart/2005/8/layout/vList3" loCatId="list" qsTypeId="urn:microsoft.com/office/officeart/2005/8/quickstyle/simple1" qsCatId="simple" csTypeId="urn:microsoft.com/office/officeart/2005/8/colors/accent1_1" csCatId="accent1" phldr="1"/>
+      <dgm:spPr/>
+    </dgm:pt>
+    <dgm:pt modelId="{5B246BB5-1C0C-41F9-B9C8-00DF3F49D97C}">
+      <dgm:prSet phldrT="[Text]"/>
+      <dgm:spPr/>
+      <dgm:t>
+        <a:bodyPr/>
+        <a:lstStyle/>
+        <a:p>
+          <a:r>
+            <a:rPr lang="ru-RU" dirty="0"/>
+            <a:t>Собственная БД</a:t>
+          </a:r>
+          <a:endParaRPr lang="en-US" dirty="0"/>
+        </a:p>
+      </dgm:t>
+    </dgm:pt>
+    <dgm:pt modelId="{ACA10327-98C6-4965-B830-39D2B107D350}" type="parTrans" cxnId="{811D48DC-0043-488F-8ABC-8F870F7B2536}">
+      <dgm:prSet/>
+      <dgm:spPr/>
+      <dgm:t>
+        <a:bodyPr/>
+        <a:lstStyle/>
+        <a:p>
+          <a:endParaRPr lang="en-US"/>
+        </a:p>
+      </dgm:t>
+    </dgm:pt>
+    <dgm:pt modelId="{96147CF9-592F-4BE7-AB0B-1F12143A5652}" type="sibTrans" cxnId="{811D48DC-0043-488F-8ABC-8F870F7B2536}">
+      <dgm:prSet/>
+      <dgm:spPr/>
+      <dgm:t>
+        <a:bodyPr/>
+        <a:lstStyle/>
+        <a:p>
+          <a:endParaRPr lang="en-US"/>
+        </a:p>
+      </dgm:t>
+    </dgm:pt>
+    <dgm:pt modelId="{809C7CC0-8521-4CBE-9EEA-9BAFABD6F1D7}">
+      <dgm:prSet phldrT="[Text]"/>
+      <dgm:spPr/>
+      <dgm:t>
+        <a:bodyPr/>
+        <a:lstStyle/>
+        <a:p>
+          <a:r>
+            <a:rPr lang="ru-RU" dirty="0"/>
+            <a:t>Связь по сети</a:t>
+          </a:r>
+          <a:endParaRPr lang="en-US" dirty="0"/>
+        </a:p>
+      </dgm:t>
+    </dgm:pt>
+    <dgm:pt modelId="{7DC02584-6588-47AB-AECC-9EDE26B14EE4}" type="parTrans" cxnId="{4455AEF3-076C-4880-B71F-CB0ED4E329AF}">
+      <dgm:prSet/>
+      <dgm:spPr/>
+      <dgm:t>
+        <a:bodyPr/>
+        <a:lstStyle/>
+        <a:p>
+          <a:endParaRPr lang="en-US"/>
+        </a:p>
+      </dgm:t>
+    </dgm:pt>
+    <dgm:pt modelId="{493128DE-E917-4E58-B739-8332561DED6D}" type="sibTrans" cxnId="{4455AEF3-076C-4880-B71F-CB0ED4E329AF}">
+      <dgm:prSet/>
+      <dgm:spPr/>
+      <dgm:t>
+        <a:bodyPr/>
+        <a:lstStyle/>
+        <a:p>
+          <a:endParaRPr lang="en-US"/>
+        </a:p>
+      </dgm:t>
+    </dgm:pt>
+    <dgm:pt modelId="{D618B17A-2E63-4356-875E-99FD40A79997}">
+      <dgm:prSet phldrT="[Text]"/>
+      <dgm:spPr/>
+      <dgm:t>
+        <a:bodyPr/>
+        <a:lstStyle/>
+        <a:p>
+          <a:r>
+            <a:rPr lang="en-US" dirty="0"/>
+            <a:t>Code Ownership</a:t>
+          </a:r>
+        </a:p>
+      </dgm:t>
+    </dgm:pt>
+    <dgm:pt modelId="{6F9EF865-651D-4325-9646-E6B9C107C322}" type="parTrans" cxnId="{DAAF6760-9EAA-479E-AC18-1EF6A72ECC90}">
+      <dgm:prSet/>
+      <dgm:spPr/>
+      <dgm:t>
+        <a:bodyPr/>
+        <a:lstStyle/>
+        <a:p>
+          <a:endParaRPr lang="en-US"/>
+        </a:p>
+      </dgm:t>
+    </dgm:pt>
+    <dgm:pt modelId="{63037F34-4782-429A-A605-87E26C50BC3C}" type="sibTrans" cxnId="{DAAF6760-9EAA-479E-AC18-1EF6A72ECC90}">
+      <dgm:prSet/>
+      <dgm:spPr/>
+      <dgm:t>
+        <a:bodyPr/>
+        <a:lstStyle/>
+        <a:p>
+          <a:endParaRPr lang="en-US"/>
+        </a:p>
+      </dgm:t>
+    </dgm:pt>
+    <dgm:pt modelId="{6C4435EE-73E2-4A99-A79F-72F015B36B2E}" type="pres">
+      <dgm:prSet presAssocID="{D2DB5F5A-2C93-4848-854B-4FB89EC7F113}" presName="linearFlow" presStyleCnt="0">
+        <dgm:presLayoutVars>
+          <dgm:dir/>
+          <dgm:resizeHandles val="exact"/>
+        </dgm:presLayoutVars>
+      </dgm:prSet>
+      <dgm:spPr/>
+    </dgm:pt>
+    <dgm:pt modelId="{06EA5166-7D3B-43B6-8B46-B5B359EFED68}" type="pres">
+      <dgm:prSet presAssocID="{5B246BB5-1C0C-41F9-B9C8-00DF3F49D97C}" presName="composite" presStyleCnt="0"/>
+      <dgm:spPr/>
+    </dgm:pt>
+    <dgm:pt modelId="{748D3911-3543-4CA8-A3CC-2DCEA93C2C4B}" type="pres">
+      <dgm:prSet presAssocID="{5B246BB5-1C0C-41F9-B9C8-00DF3F49D97C}" presName="imgShp" presStyleLbl="fgImgPlace1" presStyleIdx="0" presStyleCnt="3"/>
+      <dgm:spPr>
+        <a:blipFill>
+          <a:blip xmlns:r="http://schemas.openxmlformats.org/officeDocument/2006/relationships" r:embed="rId1">
+            <a:extLst>
+              <a:ext uri="{96DAC541-7B7A-43D3-8B79-37D633B846F1}">
+                <asvg:svgBlip xmlns:asvg="http://schemas.microsoft.com/office/drawing/2016/SVG/main" r:embed="rId2"/>
+              </a:ext>
+            </a:extLst>
+          </a:blip>
+          <a:srcRect/>
+          <a:stretch>
+            <a:fillRect/>
+          </a:stretch>
+        </a:blipFill>
+      </dgm:spPr>
+      <dgm:extLst>
+        <a:ext uri="{E40237B7-FDA0-4F09-8148-C483321AD2D9}">
+          <dgm14:cNvPr xmlns:dgm14="http://schemas.microsoft.com/office/drawing/2010/diagram" id="0" name="" descr="Database with solid fill"/>
+        </a:ext>
+      </dgm:extLst>
+    </dgm:pt>
+    <dgm:pt modelId="{67FB6ED0-4D39-4ED4-A17D-B9B64DAEB94C}" type="pres">
+      <dgm:prSet presAssocID="{5B246BB5-1C0C-41F9-B9C8-00DF3F49D97C}" presName="txShp" presStyleLbl="node1" presStyleIdx="0" presStyleCnt="3">
+        <dgm:presLayoutVars>
+          <dgm:bulletEnabled val="1"/>
+        </dgm:presLayoutVars>
+      </dgm:prSet>
+      <dgm:spPr/>
+    </dgm:pt>
+    <dgm:pt modelId="{20FBAB6B-8348-46DD-A51B-C13E99C16685}" type="pres">
+      <dgm:prSet presAssocID="{96147CF9-592F-4BE7-AB0B-1F12143A5652}" presName="spacing" presStyleCnt="0"/>
+      <dgm:spPr/>
+    </dgm:pt>
+    <dgm:pt modelId="{4DBA5902-244F-4B1A-ACD0-EEAE7E8388DB}" type="pres">
+      <dgm:prSet presAssocID="{809C7CC0-8521-4CBE-9EEA-9BAFABD6F1D7}" presName="composite" presStyleCnt="0"/>
+      <dgm:spPr/>
+    </dgm:pt>
+    <dgm:pt modelId="{4374335F-5209-4D05-80A9-8C2A99C10EAB}" type="pres">
+      <dgm:prSet presAssocID="{809C7CC0-8521-4CBE-9EEA-9BAFABD6F1D7}" presName="imgShp" presStyleLbl="fgImgPlace1" presStyleIdx="1" presStyleCnt="3"/>
+      <dgm:spPr>
+        <a:blipFill>
+          <a:blip xmlns:r="http://schemas.openxmlformats.org/officeDocument/2006/relationships" r:embed="rId3">
+            <a:extLst>
+              <a:ext uri="{96DAC541-7B7A-43D3-8B79-37D633B846F1}">
+                <asvg:svgBlip xmlns:asvg="http://schemas.microsoft.com/office/drawing/2016/SVG/main" r:embed="rId4"/>
+              </a:ext>
+            </a:extLst>
+          </a:blip>
+          <a:srcRect/>
+          <a:stretch>
+            <a:fillRect/>
+          </a:stretch>
+        </a:blipFill>
+      </dgm:spPr>
+      <dgm:extLst>
+        <a:ext uri="{E40237B7-FDA0-4F09-8148-C483321AD2D9}">
+          <dgm14:cNvPr xmlns:dgm14="http://schemas.microsoft.com/office/drawing/2010/diagram" id="0" name="" descr="Disconnected with solid fill"/>
+        </a:ext>
+      </dgm:extLst>
+    </dgm:pt>
+    <dgm:pt modelId="{81C8F462-A942-46E3-BFF2-D730F422F67A}" type="pres">
+      <dgm:prSet presAssocID="{809C7CC0-8521-4CBE-9EEA-9BAFABD6F1D7}" presName="txShp" presStyleLbl="node1" presStyleIdx="1" presStyleCnt="3">
+        <dgm:presLayoutVars>
+          <dgm:bulletEnabled val="1"/>
+        </dgm:presLayoutVars>
+      </dgm:prSet>
+      <dgm:spPr/>
+    </dgm:pt>
+    <dgm:pt modelId="{92CD8E88-BEF8-4E31-B0AF-6789375ADF2F}" type="pres">
+      <dgm:prSet presAssocID="{493128DE-E917-4E58-B739-8332561DED6D}" presName="spacing" presStyleCnt="0"/>
+      <dgm:spPr/>
+    </dgm:pt>
+    <dgm:pt modelId="{DFC19944-8E93-4F26-90B0-01326E01A2B1}" type="pres">
+      <dgm:prSet presAssocID="{D618B17A-2E63-4356-875E-99FD40A79997}" presName="composite" presStyleCnt="0"/>
+      <dgm:spPr/>
+    </dgm:pt>
+    <dgm:pt modelId="{E0DA71D5-93ED-487D-BBED-2017E0C828DA}" type="pres">
+      <dgm:prSet presAssocID="{D618B17A-2E63-4356-875E-99FD40A79997}" presName="imgShp" presStyleLbl="fgImgPlace1" presStyleIdx="2" presStyleCnt="3"/>
+      <dgm:spPr>
+        <a:blipFill>
+          <a:blip xmlns:r="http://schemas.openxmlformats.org/officeDocument/2006/relationships" r:embed="rId5">
+            <a:extLst>
+              <a:ext uri="{96DAC541-7B7A-43D3-8B79-37D633B846F1}">
+                <asvg:svgBlip xmlns:asvg="http://schemas.microsoft.com/office/drawing/2016/SVG/main" r:embed="rId6"/>
+              </a:ext>
+            </a:extLst>
+          </a:blip>
+          <a:srcRect/>
+          <a:stretch>
+            <a:fillRect/>
+          </a:stretch>
+        </a:blipFill>
+      </dgm:spPr>
+      <dgm:extLst>
+        <a:ext uri="{E40237B7-FDA0-4F09-8148-C483321AD2D9}">
+          <dgm14:cNvPr xmlns:dgm14="http://schemas.microsoft.com/office/drawing/2010/diagram" id="0" name="" descr="Farmer female with solid fill"/>
+        </a:ext>
+      </dgm:extLst>
+    </dgm:pt>
+    <dgm:pt modelId="{F47ECD3F-15BD-4CE7-BB71-A11F16727651}" type="pres">
+      <dgm:prSet presAssocID="{D618B17A-2E63-4356-875E-99FD40A79997}" presName="txShp" presStyleLbl="node1" presStyleIdx="2" presStyleCnt="3">
+        <dgm:presLayoutVars>
+          <dgm:bulletEnabled val="1"/>
+        </dgm:presLayoutVars>
+      </dgm:prSet>
+      <dgm:spPr/>
+    </dgm:pt>
+  </dgm:ptLst>
+  <dgm:cxnLst>
+    <dgm:cxn modelId="{63231601-81F3-4E7A-9EE2-536D4C0ADB4F}" type="presOf" srcId="{5B246BB5-1C0C-41F9-B9C8-00DF3F49D97C}" destId="{67FB6ED0-4D39-4ED4-A17D-B9B64DAEB94C}" srcOrd="0" destOrd="0" presId="urn:microsoft.com/office/officeart/2005/8/layout/vList3"/>
+    <dgm:cxn modelId="{DAAF6760-9EAA-479E-AC18-1EF6A72ECC90}" srcId="{D2DB5F5A-2C93-4848-854B-4FB89EC7F113}" destId="{D618B17A-2E63-4356-875E-99FD40A79997}" srcOrd="2" destOrd="0" parTransId="{6F9EF865-651D-4325-9646-E6B9C107C322}" sibTransId="{63037F34-4782-429A-A605-87E26C50BC3C}"/>
+    <dgm:cxn modelId="{34A97F69-25A4-464F-A66F-FBBB72F3DF4C}" type="presOf" srcId="{D618B17A-2E63-4356-875E-99FD40A79997}" destId="{F47ECD3F-15BD-4CE7-BB71-A11F16727651}" srcOrd="0" destOrd="0" presId="urn:microsoft.com/office/officeart/2005/8/layout/vList3"/>
+    <dgm:cxn modelId="{61EDC375-1B9C-4DA0-A9D2-297D9AB26DA8}" type="presOf" srcId="{809C7CC0-8521-4CBE-9EEA-9BAFABD6F1D7}" destId="{81C8F462-A942-46E3-BFF2-D730F422F67A}" srcOrd="0" destOrd="0" presId="urn:microsoft.com/office/officeart/2005/8/layout/vList3"/>
+    <dgm:cxn modelId="{205C56B0-7FAC-4999-80C9-FFEAF8DE94EF}" type="presOf" srcId="{D2DB5F5A-2C93-4848-854B-4FB89EC7F113}" destId="{6C4435EE-73E2-4A99-A79F-72F015B36B2E}" srcOrd="0" destOrd="0" presId="urn:microsoft.com/office/officeart/2005/8/layout/vList3"/>
+    <dgm:cxn modelId="{811D48DC-0043-488F-8ABC-8F870F7B2536}" srcId="{D2DB5F5A-2C93-4848-854B-4FB89EC7F113}" destId="{5B246BB5-1C0C-41F9-B9C8-00DF3F49D97C}" srcOrd="0" destOrd="0" parTransId="{ACA10327-98C6-4965-B830-39D2B107D350}" sibTransId="{96147CF9-592F-4BE7-AB0B-1F12143A5652}"/>
+    <dgm:cxn modelId="{4455AEF3-076C-4880-B71F-CB0ED4E329AF}" srcId="{D2DB5F5A-2C93-4848-854B-4FB89EC7F113}" destId="{809C7CC0-8521-4CBE-9EEA-9BAFABD6F1D7}" srcOrd="1" destOrd="0" parTransId="{7DC02584-6588-47AB-AECC-9EDE26B14EE4}" sibTransId="{493128DE-E917-4E58-B739-8332561DED6D}"/>
+    <dgm:cxn modelId="{D593397A-7D63-4975-81D5-AA6C421985E0}" type="presParOf" srcId="{6C4435EE-73E2-4A99-A79F-72F015B36B2E}" destId="{06EA5166-7D3B-43B6-8B46-B5B359EFED68}" srcOrd="0" destOrd="0" presId="urn:microsoft.com/office/officeart/2005/8/layout/vList3"/>
+    <dgm:cxn modelId="{EDF67B53-4F73-4624-BC76-CBBF3FE0806B}" type="presParOf" srcId="{06EA5166-7D3B-43B6-8B46-B5B359EFED68}" destId="{748D3911-3543-4CA8-A3CC-2DCEA93C2C4B}" srcOrd="0" destOrd="0" presId="urn:microsoft.com/office/officeart/2005/8/layout/vList3"/>
+    <dgm:cxn modelId="{64EEFE25-EA8E-4482-826A-5759097BFDDE}" type="presParOf" srcId="{06EA5166-7D3B-43B6-8B46-B5B359EFED68}" destId="{67FB6ED0-4D39-4ED4-A17D-B9B64DAEB94C}" srcOrd="1" destOrd="0" presId="urn:microsoft.com/office/officeart/2005/8/layout/vList3"/>
+    <dgm:cxn modelId="{379D6C6D-DF5F-4EF1-B9CF-9E765DF6B5D0}" type="presParOf" srcId="{6C4435EE-73E2-4A99-A79F-72F015B36B2E}" destId="{20FBAB6B-8348-46DD-A51B-C13E99C16685}" srcOrd="1" destOrd="0" presId="urn:microsoft.com/office/officeart/2005/8/layout/vList3"/>
+    <dgm:cxn modelId="{B140A815-D692-420E-88FD-7B20BB9AC526}" type="presParOf" srcId="{6C4435EE-73E2-4A99-A79F-72F015B36B2E}" destId="{4DBA5902-244F-4B1A-ACD0-EEAE7E8388DB}" srcOrd="2" destOrd="0" presId="urn:microsoft.com/office/officeart/2005/8/layout/vList3"/>
+    <dgm:cxn modelId="{2C4743CB-3827-448D-BC50-E90DDC978A37}" type="presParOf" srcId="{4DBA5902-244F-4B1A-ACD0-EEAE7E8388DB}" destId="{4374335F-5209-4D05-80A9-8C2A99C10EAB}" srcOrd="0" destOrd="0" presId="urn:microsoft.com/office/officeart/2005/8/layout/vList3"/>
+    <dgm:cxn modelId="{B1E0E586-76C0-41B3-9791-2B7FC53512EB}" type="presParOf" srcId="{4DBA5902-244F-4B1A-ACD0-EEAE7E8388DB}" destId="{81C8F462-A942-46E3-BFF2-D730F422F67A}" srcOrd="1" destOrd="0" presId="urn:microsoft.com/office/officeart/2005/8/layout/vList3"/>
+    <dgm:cxn modelId="{CC1C7FCE-D26B-4700-A7C8-FFD7C611FA62}" type="presParOf" srcId="{6C4435EE-73E2-4A99-A79F-72F015B36B2E}" destId="{92CD8E88-BEF8-4E31-B0AF-6789375ADF2F}" srcOrd="3" destOrd="0" presId="urn:microsoft.com/office/officeart/2005/8/layout/vList3"/>
+    <dgm:cxn modelId="{C7531F4B-E99F-4EEA-8231-A4E5DA384039}" type="presParOf" srcId="{6C4435EE-73E2-4A99-A79F-72F015B36B2E}" destId="{DFC19944-8E93-4F26-90B0-01326E01A2B1}" srcOrd="4" destOrd="0" presId="urn:microsoft.com/office/officeart/2005/8/layout/vList3"/>
+    <dgm:cxn modelId="{EED8D3D5-5852-4D62-923B-E99ABFBEEBEF}" type="presParOf" srcId="{DFC19944-8E93-4F26-90B0-01326E01A2B1}" destId="{E0DA71D5-93ED-487D-BBED-2017E0C828DA}" srcOrd="0" destOrd="0" presId="urn:microsoft.com/office/officeart/2005/8/layout/vList3"/>
+    <dgm:cxn modelId="{150118AA-AB4F-468B-BB3B-57D10BB29CC3}" type="presParOf" srcId="{DFC19944-8E93-4F26-90B0-01326E01A2B1}" destId="{F47ECD3F-15BD-4CE7-BB71-A11F16727651}" srcOrd="1" destOrd="0" presId="urn:microsoft.com/office/officeart/2005/8/layout/vList3"/>
+  </dgm:cxnLst>
+  <dgm:bg/>
+  <dgm:whole/>
+  <dgm:extLst>
+    <a:ext uri="http://schemas.microsoft.com/office/drawing/2008/diagram">
+      <dsp:dataModelExt xmlns:dsp="http://schemas.microsoft.com/office/drawing/2008/diagram" relId="rId6" minVer="http://schemas.openxmlformats.org/drawingml/2006/diagram"/>
+    </a:ext>
+  </dgm:extLst>
+</dgm:dataModel>
+</file>
+
+<file path=ppt/diagrams/data14.xml><?xml version="1.0" encoding="utf-8"?>
+<dgm:dataModel xmlns:dgm="http://schemas.openxmlformats.org/drawingml/2006/diagram" xmlns:a="http://schemas.openxmlformats.org/drawingml/2006/main">
+  <dgm:ptLst>
     <dgm:pt modelId="{C5CF4EEF-5FA2-4CD1-85AD-1F3BDB0CF8F5}" type="doc">
       <dgm:prSet loTypeId="urn:microsoft.com/office/officeart/2005/8/layout/hList7" loCatId="list" qsTypeId="urn:microsoft.com/office/officeart/2005/8/quickstyle/simple1" qsCatId="simple" csTypeId="urn:microsoft.com/office/officeart/2005/8/colors/accent1_1" csCatId="accent1" phldr="1"/>
       <dgm:spPr/>
@@ -13167,7 +14246,7 @@
 </dgm:dataModel>
 </file>
 
-<file path=ppt/diagrams/data14.xml><?xml version="1.0" encoding="utf-8"?>
+<file path=ppt/diagrams/data15.xml><?xml version="1.0" encoding="utf-8"?>
 <dgm:dataModel xmlns:dgm="http://schemas.openxmlformats.org/drawingml/2006/diagram" xmlns:a="http://schemas.openxmlformats.org/drawingml/2006/main">
   <dgm:ptLst>
     <dgm:pt modelId="{C5CF4EEF-5FA2-4CD1-85AD-1F3BDB0CF8F5}" type="doc">
@@ -13254,7 +14333,11 @@
         <a:lstStyle/>
         <a:p>
           <a:r>
-            <a:rPr lang="en-US" dirty="0"/>
+            <a:rPr lang="en-US" dirty="0">
+              <a:solidFill>
+                <a:srgbClr val="FF0000"/>
+              </a:solidFill>
+            </a:rPr>
             <a:t>Reporting</a:t>
           </a:r>
         </a:p>
@@ -13546,6 +14629,9 @@
         <a:blipFill>
           <a:blip xmlns:r="http://schemas.openxmlformats.org/officeDocument/2006/relationships" r:embed="rId1">
             <a:extLst>
+              <a:ext uri="{28A0092B-C50C-407E-A947-70E740481C1C}">
+                <a14:useLocalDpi xmlns:a14="http://schemas.microsoft.com/office/drawing/2010/main" val="0"/>
+              </a:ext>
               <a:ext uri="{96DAC541-7B7A-43D3-8B79-37D633B846F1}">
                 <asvg:svgBlip xmlns:asvg="http://schemas.microsoft.com/office/drawing/2016/SVG/main" r:embed="rId2"/>
               </a:ext>
@@ -13559,7 +14645,7 @@
       </dgm:spPr>
       <dgm:extLst>
         <a:ext uri="{E40237B7-FDA0-4F09-8148-C483321AD2D9}">
-          <dgm14:cNvPr xmlns:dgm14="http://schemas.microsoft.com/office/drawing/2010/diagram" id="0" name="" descr="Database with solid fill"/>
+          <dgm14:cNvPr xmlns:dgm14="http://schemas.microsoft.com/office/drawing/2010/diagram" id="0" name="" descr="Artificial Intelligence with solid fill"/>
         </a:ext>
       </dgm:extLst>
     </dgm:pt>
@@ -17928,6 +19014,419 @@
       <dsp:cNvGrpSpPr/>
     </dsp:nvGrpSpPr>
     <dsp:grpSpPr/>
+    <dsp:sp modelId="{67FB6ED0-4D39-4ED4-A17D-B9B64DAEB94C}">
+      <dsp:nvSpPr>
+        <dsp:cNvPr id="0" name=""/>
+        <dsp:cNvSpPr/>
+      </dsp:nvSpPr>
+      <dsp:spPr>
+        <a:xfrm rot="10800000">
+          <a:off x="2063667" y="883"/>
+          <a:ext cx="6992874" cy="1209216"/>
+        </a:xfrm>
+        <a:prstGeom prst="homePlate">
+          <a:avLst/>
+        </a:prstGeom>
+        <a:solidFill>
+          <a:schemeClr val="lt1">
+            <a:hueOff val="0"/>
+            <a:satOff val="0"/>
+            <a:lumOff val="0"/>
+            <a:alphaOff val="0"/>
+          </a:schemeClr>
+        </a:solidFill>
+        <a:ln w="12700" cap="flat" cmpd="sng" algn="ctr">
+          <a:solidFill>
+            <a:schemeClr val="accent1">
+              <a:shade val="80000"/>
+              <a:hueOff val="0"/>
+              <a:satOff val="0"/>
+              <a:lumOff val="0"/>
+              <a:alphaOff val="0"/>
+            </a:schemeClr>
+          </a:solidFill>
+          <a:prstDash val="solid"/>
+          <a:miter lim="800000"/>
+        </a:ln>
+        <a:effectLst/>
+      </dsp:spPr>
+      <dsp:style>
+        <a:lnRef idx="2">
+          <a:scrgbClr r="0" g="0" b="0"/>
+        </a:lnRef>
+        <a:fillRef idx="1">
+          <a:scrgbClr r="0" g="0" b="0"/>
+        </a:fillRef>
+        <a:effectRef idx="0">
+          <a:scrgbClr r="0" g="0" b="0"/>
+        </a:effectRef>
+        <a:fontRef idx="minor">
+          <a:schemeClr val="lt1"/>
+        </a:fontRef>
+      </dsp:style>
+      <dsp:txBody>
+        <a:bodyPr spcFirstLastPara="0" vert="horz" wrap="square" lIns="533231" tIns="213360" rIns="398272" bIns="213360" numCol="1" spcCol="1270" anchor="ctr" anchorCtr="0">
+          <a:noAutofit/>
+        </a:bodyPr>
+        <a:lstStyle/>
+        <a:p>
+          <a:pPr marL="0" lvl="0" indent="0" algn="ctr" defTabSz="2489200">
+            <a:lnSpc>
+              <a:spcPct val="90000"/>
+            </a:lnSpc>
+            <a:spcBef>
+              <a:spcPct val="0"/>
+            </a:spcBef>
+            <a:spcAft>
+              <a:spcPct val="35000"/>
+            </a:spcAft>
+            <a:buNone/>
+          </a:pPr>
+          <a:r>
+            <a:rPr lang="ru-RU" sz="5600" kern="1200" dirty="0"/>
+            <a:t>Собственная БД</a:t>
+          </a:r>
+          <a:endParaRPr lang="en-US" sz="5600" kern="1200" dirty="0"/>
+        </a:p>
+      </dsp:txBody>
+      <dsp:txXfrm rot="10800000">
+        <a:off x="2365971" y="883"/>
+        <a:ext cx="6690570" cy="1209216"/>
+      </dsp:txXfrm>
+    </dsp:sp>
+    <dsp:sp modelId="{748D3911-3543-4CA8-A3CC-2DCEA93C2C4B}">
+      <dsp:nvSpPr>
+        <dsp:cNvPr id="0" name=""/>
+        <dsp:cNvSpPr/>
+      </dsp:nvSpPr>
+      <dsp:spPr>
+        <a:xfrm>
+          <a:off x="1459058" y="883"/>
+          <a:ext cx="1209216" cy="1209216"/>
+        </a:xfrm>
+        <a:prstGeom prst="ellipse">
+          <a:avLst/>
+        </a:prstGeom>
+        <a:blipFill>
+          <a:blip xmlns:r="http://schemas.openxmlformats.org/officeDocument/2006/relationships" r:embed="rId1">
+            <a:extLst>
+              <a:ext uri="{96DAC541-7B7A-43D3-8B79-37D633B846F1}">
+                <asvg:svgBlip xmlns:asvg="http://schemas.microsoft.com/office/drawing/2016/SVG/main" r:embed="rId2"/>
+              </a:ext>
+            </a:extLst>
+          </a:blip>
+          <a:srcRect/>
+          <a:stretch>
+            <a:fillRect/>
+          </a:stretch>
+        </a:blipFill>
+        <a:ln w="12700" cap="flat" cmpd="sng" algn="ctr">
+          <a:solidFill>
+            <a:schemeClr val="accent1">
+              <a:shade val="80000"/>
+              <a:hueOff val="0"/>
+              <a:satOff val="0"/>
+              <a:lumOff val="0"/>
+              <a:alphaOff val="0"/>
+            </a:schemeClr>
+          </a:solidFill>
+          <a:prstDash val="solid"/>
+          <a:miter lim="800000"/>
+        </a:ln>
+        <a:effectLst/>
+      </dsp:spPr>
+      <dsp:style>
+        <a:lnRef idx="2">
+          <a:scrgbClr r="0" g="0" b="0"/>
+        </a:lnRef>
+        <a:fillRef idx="1">
+          <a:scrgbClr r="0" g="0" b="0"/>
+        </a:fillRef>
+        <a:effectRef idx="0">
+          <a:scrgbClr r="0" g="0" b="0"/>
+        </a:effectRef>
+        <a:fontRef idx="minor"/>
+      </dsp:style>
+    </dsp:sp>
+    <dsp:sp modelId="{81C8F462-A942-46E3-BFF2-D730F422F67A}">
+      <dsp:nvSpPr>
+        <dsp:cNvPr id="0" name=""/>
+        <dsp:cNvSpPr/>
+      </dsp:nvSpPr>
+      <dsp:spPr>
+        <a:xfrm rot="10800000">
+          <a:off x="2063667" y="1571060"/>
+          <a:ext cx="6992874" cy="1209216"/>
+        </a:xfrm>
+        <a:prstGeom prst="homePlate">
+          <a:avLst/>
+        </a:prstGeom>
+        <a:solidFill>
+          <a:schemeClr val="lt1">
+            <a:hueOff val="0"/>
+            <a:satOff val="0"/>
+            <a:lumOff val="0"/>
+            <a:alphaOff val="0"/>
+          </a:schemeClr>
+        </a:solidFill>
+        <a:ln w="12700" cap="flat" cmpd="sng" algn="ctr">
+          <a:solidFill>
+            <a:schemeClr val="accent1">
+              <a:shade val="80000"/>
+              <a:hueOff val="0"/>
+              <a:satOff val="0"/>
+              <a:lumOff val="0"/>
+              <a:alphaOff val="0"/>
+            </a:schemeClr>
+          </a:solidFill>
+          <a:prstDash val="solid"/>
+          <a:miter lim="800000"/>
+        </a:ln>
+        <a:effectLst/>
+      </dsp:spPr>
+      <dsp:style>
+        <a:lnRef idx="2">
+          <a:scrgbClr r="0" g="0" b="0"/>
+        </a:lnRef>
+        <a:fillRef idx="1">
+          <a:scrgbClr r="0" g="0" b="0"/>
+        </a:fillRef>
+        <a:effectRef idx="0">
+          <a:scrgbClr r="0" g="0" b="0"/>
+        </a:effectRef>
+        <a:fontRef idx="minor">
+          <a:schemeClr val="lt1"/>
+        </a:fontRef>
+      </dsp:style>
+      <dsp:txBody>
+        <a:bodyPr spcFirstLastPara="0" vert="horz" wrap="square" lIns="533231" tIns="213360" rIns="398272" bIns="213360" numCol="1" spcCol="1270" anchor="ctr" anchorCtr="0">
+          <a:noAutofit/>
+        </a:bodyPr>
+        <a:lstStyle/>
+        <a:p>
+          <a:pPr marL="0" lvl="0" indent="0" algn="ctr" defTabSz="2489200">
+            <a:lnSpc>
+              <a:spcPct val="90000"/>
+            </a:lnSpc>
+            <a:spcBef>
+              <a:spcPct val="0"/>
+            </a:spcBef>
+            <a:spcAft>
+              <a:spcPct val="35000"/>
+            </a:spcAft>
+            <a:buNone/>
+          </a:pPr>
+          <a:r>
+            <a:rPr lang="ru-RU" sz="5600" kern="1200" dirty="0"/>
+            <a:t>Связь по сети</a:t>
+          </a:r>
+          <a:endParaRPr lang="en-US" sz="5600" kern="1200" dirty="0"/>
+        </a:p>
+      </dsp:txBody>
+      <dsp:txXfrm rot="10800000">
+        <a:off x="2365971" y="1571060"/>
+        <a:ext cx="6690570" cy="1209216"/>
+      </dsp:txXfrm>
+    </dsp:sp>
+    <dsp:sp modelId="{4374335F-5209-4D05-80A9-8C2A99C10EAB}">
+      <dsp:nvSpPr>
+        <dsp:cNvPr id="0" name=""/>
+        <dsp:cNvSpPr/>
+      </dsp:nvSpPr>
+      <dsp:spPr>
+        <a:xfrm>
+          <a:off x="1459058" y="1571060"/>
+          <a:ext cx="1209216" cy="1209216"/>
+        </a:xfrm>
+        <a:prstGeom prst="ellipse">
+          <a:avLst/>
+        </a:prstGeom>
+        <a:blipFill>
+          <a:blip xmlns:r="http://schemas.openxmlformats.org/officeDocument/2006/relationships" r:embed="rId3">
+            <a:extLst>
+              <a:ext uri="{96DAC541-7B7A-43D3-8B79-37D633B846F1}">
+                <asvg:svgBlip xmlns:asvg="http://schemas.microsoft.com/office/drawing/2016/SVG/main" r:embed="rId4"/>
+              </a:ext>
+            </a:extLst>
+          </a:blip>
+          <a:srcRect/>
+          <a:stretch>
+            <a:fillRect/>
+          </a:stretch>
+        </a:blipFill>
+        <a:ln w="12700" cap="flat" cmpd="sng" algn="ctr">
+          <a:solidFill>
+            <a:schemeClr val="accent1">
+              <a:shade val="80000"/>
+              <a:hueOff val="0"/>
+              <a:satOff val="0"/>
+              <a:lumOff val="0"/>
+              <a:alphaOff val="0"/>
+            </a:schemeClr>
+          </a:solidFill>
+          <a:prstDash val="solid"/>
+          <a:miter lim="800000"/>
+        </a:ln>
+        <a:effectLst/>
+      </dsp:spPr>
+      <dsp:style>
+        <a:lnRef idx="2">
+          <a:scrgbClr r="0" g="0" b="0"/>
+        </a:lnRef>
+        <a:fillRef idx="1">
+          <a:scrgbClr r="0" g="0" b="0"/>
+        </a:fillRef>
+        <a:effectRef idx="0">
+          <a:scrgbClr r="0" g="0" b="0"/>
+        </a:effectRef>
+        <a:fontRef idx="minor"/>
+      </dsp:style>
+    </dsp:sp>
+    <dsp:sp modelId="{F47ECD3F-15BD-4CE7-BB71-A11F16727651}">
+      <dsp:nvSpPr>
+        <dsp:cNvPr id="0" name=""/>
+        <dsp:cNvSpPr/>
+      </dsp:nvSpPr>
+      <dsp:spPr>
+        <a:xfrm rot="10800000">
+          <a:off x="2063667" y="3141237"/>
+          <a:ext cx="6992874" cy="1209216"/>
+        </a:xfrm>
+        <a:prstGeom prst="homePlate">
+          <a:avLst/>
+        </a:prstGeom>
+        <a:solidFill>
+          <a:schemeClr val="lt1">
+            <a:hueOff val="0"/>
+            <a:satOff val="0"/>
+            <a:lumOff val="0"/>
+            <a:alphaOff val="0"/>
+          </a:schemeClr>
+        </a:solidFill>
+        <a:ln w="12700" cap="flat" cmpd="sng" algn="ctr">
+          <a:solidFill>
+            <a:schemeClr val="accent1">
+              <a:shade val="80000"/>
+              <a:hueOff val="0"/>
+              <a:satOff val="0"/>
+              <a:lumOff val="0"/>
+              <a:alphaOff val="0"/>
+            </a:schemeClr>
+          </a:solidFill>
+          <a:prstDash val="solid"/>
+          <a:miter lim="800000"/>
+        </a:ln>
+        <a:effectLst/>
+      </dsp:spPr>
+      <dsp:style>
+        <a:lnRef idx="2">
+          <a:scrgbClr r="0" g="0" b="0"/>
+        </a:lnRef>
+        <a:fillRef idx="1">
+          <a:scrgbClr r="0" g="0" b="0"/>
+        </a:fillRef>
+        <a:effectRef idx="0">
+          <a:scrgbClr r="0" g="0" b="0"/>
+        </a:effectRef>
+        <a:fontRef idx="minor">
+          <a:schemeClr val="lt1"/>
+        </a:fontRef>
+      </dsp:style>
+      <dsp:txBody>
+        <a:bodyPr spcFirstLastPara="0" vert="horz" wrap="square" lIns="533231" tIns="213360" rIns="398272" bIns="213360" numCol="1" spcCol="1270" anchor="ctr" anchorCtr="0">
+          <a:noAutofit/>
+        </a:bodyPr>
+        <a:lstStyle/>
+        <a:p>
+          <a:pPr marL="0" lvl="0" indent="0" algn="ctr" defTabSz="2489200">
+            <a:lnSpc>
+              <a:spcPct val="90000"/>
+            </a:lnSpc>
+            <a:spcBef>
+              <a:spcPct val="0"/>
+            </a:spcBef>
+            <a:spcAft>
+              <a:spcPct val="35000"/>
+            </a:spcAft>
+            <a:buNone/>
+          </a:pPr>
+          <a:r>
+            <a:rPr lang="en-US" sz="5600" kern="1200" dirty="0"/>
+            <a:t>Code Ownership</a:t>
+          </a:r>
+        </a:p>
+      </dsp:txBody>
+      <dsp:txXfrm rot="10800000">
+        <a:off x="2365971" y="3141237"/>
+        <a:ext cx="6690570" cy="1209216"/>
+      </dsp:txXfrm>
+    </dsp:sp>
+    <dsp:sp modelId="{E0DA71D5-93ED-487D-BBED-2017E0C828DA}">
+      <dsp:nvSpPr>
+        <dsp:cNvPr id="0" name=""/>
+        <dsp:cNvSpPr/>
+      </dsp:nvSpPr>
+      <dsp:spPr>
+        <a:xfrm>
+          <a:off x="1459058" y="3141237"/>
+          <a:ext cx="1209216" cy="1209216"/>
+        </a:xfrm>
+        <a:prstGeom prst="ellipse">
+          <a:avLst/>
+        </a:prstGeom>
+        <a:blipFill>
+          <a:blip xmlns:r="http://schemas.openxmlformats.org/officeDocument/2006/relationships" r:embed="rId5">
+            <a:extLst>
+              <a:ext uri="{96DAC541-7B7A-43D3-8B79-37D633B846F1}">
+                <asvg:svgBlip xmlns:asvg="http://schemas.microsoft.com/office/drawing/2016/SVG/main" r:embed="rId6"/>
+              </a:ext>
+            </a:extLst>
+          </a:blip>
+          <a:srcRect/>
+          <a:stretch>
+            <a:fillRect/>
+          </a:stretch>
+        </a:blipFill>
+        <a:ln w="12700" cap="flat" cmpd="sng" algn="ctr">
+          <a:solidFill>
+            <a:schemeClr val="accent1">
+              <a:shade val="80000"/>
+              <a:hueOff val="0"/>
+              <a:satOff val="0"/>
+              <a:lumOff val="0"/>
+              <a:alphaOff val="0"/>
+            </a:schemeClr>
+          </a:solidFill>
+          <a:prstDash val="solid"/>
+          <a:miter lim="800000"/>
+        </a:ln>
+        <a:effectLst/>
+      </dsp:spPr>
+      <dsp:style>
+        <a:lnRef idx="2">
+          <a:scrgbClr r="0" g="0" b="0"/>
+        </a:lnRef>
+        <a:fillRef idx="1">
+          <a:scrgbClr r="0" g="0" b="0"/>
+        </a:fillRef>
+        <a:effectRef idx="0">
+          <a:scrgbClr r="0" g="0" b="0"/>
+        </a:effectRef>
+        <a:fontRef idx="minor"/>
+      </dsp:style>
+    </dsp:sp>
+  </dsp:spTree>
+</dsp:drawing>
+</file>
+
+<file path=ppt/diagrams/drawing14.xml><?xml version="1.0" encoding="utf-8"?>
+<dsp:drawing xmlns:dgm="http://schemas.openxmlformats.org/drawingml/2006/diagram" xmlns:dsp="http://schemas.microsoft.com/office/drawing/2008/diagram" xmlns:a="http://schemas.openxmlformats.org/drawingml/2006/main">
+  <dsp:spTree>
+    <dsp:nvGrpSpPr>
+      <dsp:cNvPr id="0" name=""/>
+      <dsp:cNvGrpSpPr/>
+    </dsp:nvGrpSpPr>
+    <dsp:grpSpPr/>
     <dsp:sp modelId="{90E163DB-7206-4557-9DB0-415849B2180E}">
       <dsp:nvSpPr>
         <dsp:cNvPr id="0" name=""/>
@@ -18415,7 +19914,7 @@
 </dsp:drawing>
 </file>
 
-<file path=ppt/diagrams/drawing14.xml><?xml version="1.0" encoding="utf-8"?>
+<file path=ppt/diagrams/drawing15.xml><?xml version="1.0" encoding="utf-8"?>
 <dsp:drawing xmlns:dgm="http://schemas.openxmlformats.org/drawingml/2006/diagram" xmlns:dsp="http://schemas.microsoft.com/office/drawing/2008/diagram" xmlns:a="http://schemas.openxmlformats.org/drawingml/2006/main">
   <dsp:spTree>
     <dsp:nvGrpSpPr>
@@ -18512,7 +20011,11 @@
             <a:buChar char="•"/>
           </a:pPr>
           <a:r>
-            <a:rPr lang="en-US" sz="3000" kern="1200" dirty="0"/>
+            <a:rPr lang="en-US" sz="3000" kern="1200" dirty="0">
+              <a:solidFill>
+                <a:srgbClr val="FF0000"/>
+              </a:solidFill>
+            </a:rPr>
             <a:t>Reporting</a:t>
           </a:r>
         </a:p>
@@ -18791,6 +20294,9 @@
         <a:blipFill>
           <a:blip xmlns:r="http://schemas.openxmlformats.org/officeDocument/2006/relationships" r:embed="rId1">
             <a:extLst>
+              <a:ext uri="{28A0092B-C50C-407E-A947-70E740481C1C}">
+                <a14:useLocalDpi xmlns:a14="http://schemas.microsoft.com/office/drawing/2010/main" val="0"/>
+              </a:ext>
               <a:ext uri="{96DAC541-7B7A-43D3-8B79-37D633B846F1}">
                 <asvg:svgBlip xmlns:asvg="http://schemas.microsoft.com/office/drawing/2016/SVG/main" r:embed="rId2"/>
               </a:ext>
@@ -23507,6 +25013,169 @@
 </file>
 
 <file path=ppt/diagrams/layout13.xml><?xml version="1.0" encoding="utf-8"?>
+<dgm:layoutDef xmlns:dgm="http://schemas.openxmlformats.org/drawingml/2006/diagram" xmlns:a="http://schemas.openxmlformats.org/drawingml/2006/main" uniqueId="urn:microsoft.com/office/officeart/2005/8/layout/vList3">
+  <dgm:title val=""/>
+  <dgm:desc val=""/>
+  <dgm:catLst>
+    <dgm:cat type="list" pri="14000"/>
+    <dgm:cat type="convert" pri="3000"/>
+    <dgm:cat type="picture" pri="27000"/>
+    <dgm:cat type="pictureconvert" pri="27000"/>
+  </dgm:catLst>
+  <dgm:sampData useDef="1">
+    <dgm:dataModel>
+      <dgm:ptLst/>
+      <dgm:bg/>
+      <dgm:whole/>
+    </dgm:dataModel>
+  </dgm:sampData>
+  <dgm:styleData>
+    <dgm:dataModel>
+      <dgm:ptLst>
+        <dgm:pt modelId="0" type="doc"/>
+        <dgm:pt modelId="1"/>
+        <dgm:pt modelId="2"/>
+      </dgm:ptLst>
+      <dgm:cxnLst>
+        <dgm:cxn modelId="3" srcId="0" destId="1" srcOrd="0" destOrd="0"/>
+        <dgm:cxn modelId="4" srcId="0" destId="2" srcOrd="1" destOrd="0"/>
+      </dgm:cxnLst>
+      <dgm:bg/>
+      <dgm:whole/>
+    </dgm:dataModel>
+  </dgm:styleData>
+  <dgm:clrData>
+    <dgm:dataModel>
+      <dgm:ptLst>
+        <dgm:pt modelId="0" type="doc"/>
+        <dgm:pt modelId="1"/>
+        <dgm:pt modelId="2"/>
+        <dgm:pt modelId="3"/>
+        <dgm:pt modelId="4"/>
+      </dgm:ptLst>
+      <dgm:cxnLst>
+        <dgm:cxn modelId="5" srcId="0" destId="1" srcOrd="0" destOrd="0"/>
+        <dgm:cxn modelId="6" srcId="0" destId="2" srcOrd="1" destOrd="0"/>
+        <dgm:cxn modelId="7" srcId="0" destId="3" srcOrd="2" destOrd="0"/>
+        <dgm:cxn modelId="8" srcId="0" destId="4" srcOrd="3" destOrd="0"/>
+      </dgm:cxnLst>
+      <dgm:bg/>
+      <dgm:whole/>
+    </dgm:dataModel>
+  </dgm:clrData>
+  <dgm:layoutNode name="linearFlow">
+    <dgm:varLst>
+      <dgm:dir/>
+      <dgm:resizeHandles val="exact"/>
+    </dgm:varLst>
+    <dgm:alg type="lin">
+      <dgm:param type="linDir" val="fromT"/>
+      <dgm:param type="vertAlign" val="mid"/>
+      <dgm:param type="horzAlign" val="ctr"/>
+    </dgm:alg>
+    <dgm:shape xmlns:r="http://schemas.openxmlformats.org/officeDocument/2006/relationships" r:blip="">
+      <dgm:adjLst/>
+    </dgm:shape>
+    <dgm:presOf/>
+    <dgm:constrLst>
+      <dgm:constr type="w" for="ch" forName="composite" refType="w"/>
+      <dgm:constr type="h" for="ch" forName="composite" refType="h"/>
+      <dgm:constr type="h" for="ch" forName="spacing" refType="h" refFor="ch" refForName="composite" fact="0.25"/>
+      <dgm:constr type="h" for="ch" forName="spacing" refType="w" op="lte" fact="0.1"/>
+      <dgm:constr type="primFontSz" for="des" ptType="node" op="equ" val="65"/>
+    </dgm:constrLst>
+    <dgm:ruleLst/>
+    <dgm:forEach name="Name0" axis="ch" ptType="node">
+      <dgm:layoutNode name="composite">
+        <dgm:alg type="composite"/>
+        <dgm:shape xmlns:r="http://schemas.openxmlformats.org/officeDocument/2006/relationships" r:blip="">
+          <dgm:adjLst/>
+        </dgm:shape>
+        <dgm:presOf/>
+        <dgm:choose name="Name1">
+          <dgm:if name="Name2" func="var" arg="dir" op="equ" val="norm">
+            <dgm:constrLst>
+              <dgm:constr type="w" for="ch" forName="imgShp" refType="w" fact="0.335"/>
+              <dgm:constr type="h" for="ch" forName="imgShp" refType="w" refFor="ch" refForName="imgShp" op="equ"/>
+              <dgm:constr type="h" for="ch" forName="imgShp" refType="h" op="lte"/>
+              <dgm:constr type="ctrY" for="ch" forName="imgShp" refType="h" fact="0.5"/>
+              <dgm:constr type="l" for="ch" forName="imgShp"/>
+              <dgm:constr type="w" for="ch" forName="txShp" refType="w" op="equ" fact="0.665"/>
+              <dgm:constr type="h" for="ch" forName="txShp" refType="h" refFor="ch" refForName="imgShp" op="equ"/>
+              <dgm:constr type="ctrY" for="ch" forName="txShp" refType="h" fact="0.5"/>
+              <dgm:constr type="l" for="ch" forName="txShp" refType="w" refFor="ch" refForName="imgShp" fact="0.5"/>
+              <dgm:constr type="lMarg" for="ch" forName="txShp" refType="w" refFor="ch" refForName="imgShp" fact="1.25"/>
+            </dgm:constrLst>
+          </dgm:if>
+          <dgm:else name="Name3">
+            <dgm:constrLst>
+              <dgm:constr type="w" for="ch" forName="imgShp" refType="w" fact="0.335"/>
+              <dgm:constr type="h" for="ch" forName="imgShp" refType="w" refFor="ch" refForName="imgShp" op="equ"/>
+              <dgm:constr type="h" for="ch" forName="imgShp" refType="h" op="lte"/>
+              <dgm:constr type="ctrY" for="ch" forName="imgShp" refType="h" fact="0.5"/>
+              <dgm:constr type="r" for="ch" forName="imgShp" refType="w"/>
+              <dgm:constr type="w" for="ch" forName="txShp" refType="w" op="equ" fact="0.665"/>
+              <dgm:constr type="h" for="ch" forName="txShp" refType="h" refFor="ch" refForName="imgShp" op="equ"/>
+              <dgm:constr type="ctrY" for="ch" forName="txShp" refType="h" fact="0.5"/>
+              <dgm:constr type="r" for="ch" forName="txShp" refType="ctrX" refFor="ch" refForName="imgShp"/>
+              <dgm:constr type="rMarg" for="ch" forName="txShp" refType="w" refFor="ch" refForName="imgShp" fact="1.25"/>
+            </dgm:constrLst>
+          </dgm:else>
+        </dgm:choose>
+        <dgm:ruleLst/>
+        <dgm:layoutNode name="imgShp" styleLbl="fgImgPlace1">
+          <dgm:alg type="sp"/>
+          <dgm:shape xmlns:r="http://schemas.openxmlformats.org/officeDocument/2006/relationships" type="ellipse" r:blip="" blipPhldr="1">
+            <dgm:adjLst/>
+          </dgm:shape>
+          <dgm:presOf/>
+          <dgm:constrLst/>
+          <dgm:ruleLst/>
+        </dgm:layoutNode>
+        <dgm:layoutNode name="txShp">
+          <dgm:varLst>
+            <dgm:bulletEnabled val="1"/>
+          </dgm:varLst>
+          <dgm:alg type="tx"/>
+          <dgm:choose name="Name4">
+            <dgm:if name="Name5" func="var" arg="dir" op="equ" val="norm">
+              <dgm:shape xmlns:r="http://schemas.openxmlformats.org/officeDocument/2006/relationships" rot="180" type="homePlate" r:blip="" zOrderOff="-1">
+                <dgm:adjLst/>
+              </dgm:shape>
+            </dgm:if>
+            <dgm:else name="Name6">
+              <dgm:shape xmlns:r="http://schemas.openxmlformats.org/officeDocument/2006/relationships" type="homePlate" r:blip="" zOrderOff="-1">
+                <dgm:adjLst/>
+              </dgm:shape>
+            </dgm:else>
+          </dgm:choose>
+          <dgm:presOf axis="desOrSelf" ptType="node"/>
+          <dgm:constrLst>
+            <dgm:constr type="tMarg" refType="primFontSz" fact="0.3"/>
+            <dgm:constr type="bMarg" refType="primFontSz" fact="0.3"/>
+          </dgm:constrLst>
+          <dgm:ruleLst>
+            <dgm:rule type="primFontSz" val="5" fact="NaN" max="NaN"/>
+          </dgm:ruleLst>
+        </dgm:layoutNode>
+      </dgm:layoutNode>
+      <dgm:forEach name="Name7" axis="followSib" ptType="sibTrans" cnt="1">
+        <dgm:layoutNode name="spacing">
+          <dgm:alg type="sp"/>
+          <dgm:shape xmlns:r="http://schemas.openxmlformats.org/officeDocument/2006/relationships" r:blip="">
+            <dgm:adjLst/>
+          </dgm:shape>
+          <dgm:presOf axis="self"/>
+          <dgm:constrLst/>
+          <dgm:ruleLst/>
+        </dgm:layoutNode>
+      </dgm:forEach>
+    </dgm:forEach>
+  </dgm:layoutNode>
+</dgm:layoutDef>
+</file>
+
+<file path=ppt/diagrams/layout14.xml><?xml version="1.0" encoding="utf-8"?>
 <dgm:layoutDef xmlns:dgm="http://schemas.openxmlformats.org/drawingml/2006/diagram" xmlns:a="http://schemas.openxmlformats.org/drawingml/2006/main" uniqueId="urn:microsoft.com/office/officeart/2005/8/layout/hList7">
   <dgm:title val=""/>
   <dgm:desc val=""/>
@@ -23701,7 +25370,7 @@
 </dgm:layoutDef>
 </file>
 
-<file path=ppt/diagrams/layout14.xml><?xml version="1.0" encoding="utf-8"?>
+<file path=ppt/diagrams/layout15.xml><?xml version="1.0" encoding="utf-8"?>
 <dgm:layoutDef xmlns:dgm="http://schemas.openxmlformats.org/drawingml/2006/diagram" xmlns:a="http://schemas.openxmlformats.org/drawingml/2006/main" uniqueId="urn:microsoft.com/office/officeart/2005/8/layout/hList7">
   <dgm:title val=""/>
   <dgm:desc val=""/>
@@ -32812,6 +34481,1040 @@
 </dgm:styleDef>
 </file>
 
+<file path=ppt/diagrams/quickStyle15.xml><?xml version="1.0" encoding="utf-8"?>
+<dgm:styleDef xmlns:dgm="http://schemas.openxmlformats.org/drawingml/2006/diagram" xmlns:a="http://schemas.openxmlformats.org/drawingml/2006/main" uniqueId="urn:microsoft.com/office/officeart/2005/8/quickstyle/simple1">
+  <dgm:title val=""/>
+  <dgm:desc val=""/>
+  <dgm:catLst>
+    <dgm:cat type="simple" pri="10100"/>
+  </dgm:catLst>
+  <dgm:scene3d>
+    <a:camera prst="orthographicFront"/>
+    <a:lightRig rig="threePt" dir="t"/>
+  </dgm:scene3d>
+  <dgm:styleLbl name="node0">
+    <dgm:scene3d>
+      <a:camera prst="orthographicFront"/>
+      <a:lightRig rig="threePt" dir="t"/>
+    </dgm:scene3d>
+    <dgm:sp3d/>
+    <dgm:txPr/>
+    <dgm:style>
+      <a:lnRef idx="2">
+        <a:scrgbClr r="0" g="0" b="0"/>
+      </a:lnRef>
+      <a:fillRef idx="1">
+        <a:scrgbClr r="0" g="0" b="0"/>
+      </a:fillRef>
+      <a:effectRef idx="0">
+        <a:scrgbClr r="0" g="0" b="0"/>
+      </a:effectRef>
+      <a:fontRef idx="minor">
+        <a:schemeClr val="lt1"/>
+      </a:fontRef>
+    </dgm:style>
+  </dgm:styleLbl>
+  <dgm:styleLbl name="lnNode1">
+    <dgm:scene3d>
+      <a:camera prst="orthographicFront"/>
+      <a:lightRig rig="threePt" dir="t"/>
+    </dgm:scene3d>
+    <dgm:sp3d/>
+    <dgm:txPr/>
+    <dgm:style>
+      <a:lnRef idx="2">
+        <a:scrgbClr r="0" g="0" b="0"/>
+      </a:lnRef>
+      <a:fillRef idx="1">
+        <a:scrgbClr r="0" g="0" b="0"/>
+      </a:fillRef>
+      <a:effectRef idx="0">
+        <a:scrgbClr r="0" g="0" b="0"/>
+      </a:effectRef>
+      <a:fontRef idx="minor">
+        <a:schemeClr val="lt1"/>
+      </a:fontRef>
+    </dgm:style>
+  </dgm:styleLbl>
+  <dgm:styleLbl name="vennNode1">
+    <dgm:scene3d>
+      <a:camera prst="orthographicFront"/>
+      <a:lightRig rig="threePt" dir="t"/>
+    </dgm:scene3d>
+    <dgm:sp3d/>
+    <dgm:txPr/>
+    <dgm:style>
+      <a:lnRef idx="2">
+        <a:scrgbClr r="0" g="0" b="0"/>
+      </a:lnRef>
+      <a:fillRef idx="1">
+        <a:scrgbClr r="0" g="0" b="0"/>
+      </a:fillRef>
+      <a:effectRef idx="0">
+        <a:scrgbClr r="0" g="0" b="0"/>
+      </a:effectRef>
+      <a:fontRef idx="minor">
+        <a:schemeClr val="tx1"/>
+      </a:fontRef>
+    </dgm:style>
+  </dgm:styleLbl>
+  <dgm:styleLbl name="alignNode1">
+    <dgm:scene3d>
+      <a:camera prst="orthographicFront"/>
+      <a:lightRig rig="threePt" dir="t"/>
+    </dgm:scene3d>
+    <dgm:sp3d/>
+    <dgm:txPr/>
+    <dgm:style>
+      <a:lnRef idx="2">
+        <a:scrgbClr r="0" g="0" b="0"/>
+      </a:lnRef>
+      <a:fillRef idx="1">
+        <a:scrgbClr r="0" g="0" b="0"/>
+      </a:fillRef>
+      <a:effectRef idx="0">
+        <a:scrgbClr r="0" g="0" b="0"/>
+      </a:effectRef>
+      <a:fontRef idx="minor">
+        <a:schemeClr val="lt1"/>
+      </a:fontRef>
+    </dgm:style>
+  </dgm:styleLbl>
+  <dgm:styleLbl name="node1">
+    <dgm:scene3d>
+      <a:camera prst="orthographicFront"/>
+      <a:lightRig rig="threePt" dir="t"/>
+    </dgm:scene3d>
+    <dgm:sp3d/>
+    <dgm:txPr/>
+    <dgm:style>
+      <a:lnRef idx="2">
+        <a:scrgbClr r="0" g="0" b="0"/>
+      </a:lnRef>
+      <a:fillRef idx="1">
+        <a:scrgbClr r="0" g="0" b="0"/>
+      </a:fillRef>
+      <a:effectRef idx="0">
+        <a:scrgbClr r="0" g="0" b="0"/>
+      </a:effectRef>
+      <a:fontRef idx="minor">
+        <a:schemeClr val="lt1"/>
+      </a:fontRef>
+    </dgm:style>
+  </dgm:styleLbl>
+  <dgm:styleLbl name="node2">
+    <dgm:scene3d>
+      <a:camera prst="orthographicFront"/>
+      <a:lightRig rig="threePt" dir="t"/>
+    </dgm:scene3d>
+    <dgm:sp3d/>
+    <dgm:txPr/>
+    <dgm:style>
+      <a:lnRef idx="2">
+        <a:scrgbClr r="0" g="0" b="0"/>
+      </a:lnRef>
+      <a:fillRef idx="1">
+        <a:scrgbClr r="0" g="0" b="0"/>
+      </a:fillRef>
+      <a:effectRef idx="0">
+        <a:scrgbClr r="0" g="0" b="0"/>
+      </a:effectRef>
+      <a:fontRef idx="minor">
+        <a:schemeClr val="lt1"/>
+      </a:fontRef>
+    </dgm:style>
+  </dgm:styleLbl>
+  <dgm:styleLbl name="node3">
+    <dgm:scene3d>
+      <a:camera prst="orthographicFront"/>
+      <a:lightRig rig="threePt" dir="t"/>
+    </dgm:scene3d>
+    <dgm:sp3d/>
+    <dgm:txPr/>
+    <dgm:style>
+      <a:lnRef idx="2">
+        <a:scrgbClr r="0" g="0" b="0"/>
+      </a:lnRef>
+      <a:fillRef idx="1">
+        <a:scrgbClr r="0" g="0" b="0"/>
+      </a:fillRef>
+      <a:effectRef idx="0">
+        <a:scrgbClr r="0" g="0" b="0"/>
+      </a:effectRef>
+      <a:fontRef idx="minor">
+        <a:schemeClr val="lt1"/>
+      </a:fontRef>
+    </dgm:style>
+  </dgm:styleLbl>
+  <dgm:styleLbl name="node4">
+    <dgm:scene3d>
+      <a:camera prst="orthographicFront"/>
+      <a:lightRig rig="threePt" dir="t"/>
+    </dgm:scene3d>
+    <dgm:sp3d/>
+    <dgm:txPr/>
+    <dgm:style>
+      <a:lnRef idx="2">
+        <a:scrgbClr r="0" g="0" b="0"/>
+      </a:lnRef>
+      <a:fillRef idx="1">
+        <a:scrgbClr r="0" g="0" b="0"/>
+      </a:fillRef>
+      <a:effectRef idx="0">
+        <a:scrgbClr r="0" g="0" b="0"/>
+      </a:effectRef>
+      <a:fontRef idx="minor">
+        <a:schemeClr val="lt1"/>
+      </a:fontRef>
+    </dgm:style>
+  </dgm:styleLbl>
+  <dgm:styleLbl name="fgImgPlace1">
+    <dgm:scene3d>
+      <a:camera prst="orthographicFront"/>
+      <a:lightRig rig="threePt" dir="t"/>
+    </dgm:scene3d>
+    <dgm:sp3d/>
+    <dgm:txPr/>
+    <dgm:style>
+      <a:lnRef idx="2">
+        <a:scrgbClr r="0" g="0" b="0"/>
+      </a:lnRef>
+      <a:fillRef idx="1">
+        <a:scrgbClr r="0" g="0" b="0"/>
+      </a:fillRef>
+      <a:effectRef idx="0">
+        <a:scrgbClr r="0" g="0" b="0"/>
+      </a:effectRef>
+      <a:fontRef idx="minor"/>
+    </dgm:style>
+  </dgm:styleLbl>
+  <dgm:styleLbl name="alignImgPlace1">
+    <dgm:scene3d>
+      <a:camera prst="orthographicFront"/>
+      <a:lightRig rig="threePt" dir="t"/>
+    </dgm:scene3d>
+    <dgm:sp3d/>
+    <dgm:txPr/>
+    <dgm:style>
+      <a:lnRef idx="2">
+        <a:scrgbClr r="0" g="0" b="0"/>
+      </a:lnRef>
+      <a:fillRef idx="1">
+        <a:scrgbClr r="0" g="0" b="0"/>
+      </a:fillRef>
+      <a:effectRef idx="0">
+        <a:scrgbClr r="0" g="0" b="0"/>
+      </a:effectRef>
+      <a:fontRef idx="minor"/>
+    </dgm:style>
+  </dgm:styleLbl>
+  <dgm:styleLbl name="bgImgPlace1">
+    <dgm:scene3d>
+      <a:camera prst="orthographicFront"/>
+      <a:lightRig rig="threePt" dir="t"/>
+    </dgm:scene3d>
+    <dgm:sp3d/>
+    <dgm:txPr/>
+    <dgm:style>
+      <a:lnRef idx="2">
+        <a:scrgbClr r="0" g="0" b="0"/>
+      </a:lnRef>
+      <a:fillRef idx="1">
+        <a:scrgbClr r="0" g="0" b="0"/>
+      </a:fillRef>
+      <a:effectRef idx="0">
+        <a:scrgbClr r="0" g="0" b="0"/>
+      </a:effectRef>
+      <a:fontRef idx="minor"/>
+    </dgm:style>
+  </dgm:styleLbl>
+  <dgm:styleLbl name="sibTrans2D1">
+    <dgm:scene3d>
+      <a:camera prst="orthographicFront"/>
+      <a:lightRig rig="threePt" dir="t"/>
+    </dgm:scene3d>
+    <dgm:sp3d/>
+    <dgm:txPr/>
+    <dgm:style>
+      <a:lnRef idx="0">
+        <a:scrgbClr r="0" g="0" b="0"/>
+      </a:lnRef>
+      <a:fillRef idx="1">
+        <a:scrgbClr r="0" g="0" b="0"/>
+      </a:fillRef>
+      <a:effectRef idx="0">
+        <a:scrgbClr r="0" g="0" b="0"/>
+      </a:effectRef>
+      <a:fontRef idx="minor">
+        <a:schemeClr val="lt1"/>
+      </a:fontRef>
+    </dgm:style>
+  </dgm:styleLbl>
+  <dgm:styleLbl name="fgSibTrans2D1">
+    <dgm:scene3d>
+      <a:camera prst="orthographicFront"/>
+      <a:lightRig rig="threePt" dir="t"/>
+    </dgm:scene3d>
+    <dgm:sp3d/>
+    <dgm:txPr/>
+    <dgm:style>
+      <a:lnRef idx="0">
+        <a:scrgbClr r="0" g="0" b="0"/>
+      </a:lnRef>
+      <a:fillRef idx="1">
+        <a:scrgbClr r="0" g="0" b="0"/>
+      </a:fillRef>
+      <a:effectRef idx="0">
+        <a:scrgbClr r="0" g="0" b="0"/>
+      </a:effectRef>
+      <a:fontRef idx="minor">
+        <a:schemeClr val="lt1"/>
+      </a:fontRef>
+    </dgm:style>
+  </dgm:styleLbl>
+  <dgm:styleLbl name="bgSibTrans2D1">
+    <dgm:scene3d>
+      <a:camera prst="orthographicFront"/>
+      <a:lightRig rig="threePt" dir="t"/>
+    </dgm:scene3d>
+    <dgm:sp3d/>
+    <dgm:txPr/>
+    <dgm:style>
+      <a:lnRef idx="0">
+        <a:scrgbClr r="0" g="0" b="0"/>
+      </a:lnRef>
+      <a:fillRef idx="1">
+        <a:scrgbClr r="0" g="0" b="0"/>
+      </a:fillRef>
+      <a:effectRef idx="0">
+        <a:scrgbClr r="0" g="0" b="0"/>
+      </a:effectRef>
+      <a:fontRef idx="minor">
+        <a:schemeClr val="lt1"/>
+      </a:fontRef>
+    </dgm:style>
+  </dgm:styleLbl>
+  <dgm:styleLbl name="sibTrans1D1">
+    <dgm:scene3d>
+      <a:camera prst="orthographicFront"/>
+      <a:lightRig rig="threePt" dir="t"/>
+    </dgm:scene3d>
+    <dgm:sp3d/>
+    <dgm:txPr/>
+    <dgm:style>
+      <a:lnRef idx="1">
+        <a:scrgbClr r="0" g="0" b="0"/>
+      </a:lnRef>
+      <a:fillRef idx="0">
+        <a:scrgbClr r="0" g="0" b="0"/>
+      </a:fillRef>
+      <a:effectRef idx="0">
+        <a:scrgbClr r="0" g="0" b="0"/>
+      </a:effectRef>
+      <a:fontRef idx="minor"/>
+    </dgm:style>
+  </dgm:styleLbl>
+  <dgm:styleLbl name="callout">
+    <dgm:scene3d>
+      <a:camera prst="orthographicFront"/>
+      <a:lightRig rig="threePt" dir="t"/>
+    </dgm:scene3d>
+    <dgm:sp3d/>
+    <dgm:txPr/>
+    <dgm:style>
+      <a:lnRef idx="2">
+        <a:scrgbClr r="0" g="0" b="0"/>
+      </a:lnRef>
+      <a:fillRef idx="1">
+        <a:scrgbClr r="0" g="0" b="0"/>
+      </a:fillRef>
+      <a:effectRef idx="0">
+        <a:scrgbClr r="0" g="0" b="0"/>
+      </a:effectRef>
+      <a:fontRef idx="minor"/>
+    </dgm:style>
+  </dgm:styleLbl>
+  <dgm:styleLbl name="asst0">
+    <dgm:scene3d>
+      <a:camera prst="orthographicFront"/>
+      <a:lightRig rig="threePt" dir="t"/>
+    </dgm:scene3d>
+    <dgm:sp3d/>
+    <dgm:txPr/>
+    <dgm:style>
+      <a:lnRef idx="2">
+        <a:scrgbClr r="0" g="0" b="0"/>
+      </a:lnRef>
+      <a:fillRef idx="1">
+        <a:scrgbClr r="0" g="0" b="0"/>
+      </a:fillRef>
+      <a:effectRef idx="0">
+        <a:scrgbClr r="0" g="0" b="0"/>
+      </a:effectRef>
+      <a:fontRef idx="minor">
+        <a:schemeClr val="lt1"/>
+      </a:fontRef>
+    </dgm:style>
+  </dgm:styleLbl>
+  <dgm:styleLbl name="asst1">
+    <dgm:scene3d>
+      <a:camera prst="orthographicFront"/>
+      <a:lightRig rig="threePt" dir="t"/>
+    </dgm:scene3d>
+    <dgm:sp3d/>
+    <dgm:txPr/>
+    <dgm:style>
+      <a:lnRef idx="2">
+        <a:scrgbClr r="0" g="0" b="0"/>
+      </a:lnRef>
+      <a:fillRef idx="1">
+        <a:scrgbClr r="0" g="0" b="0"/>
+      </a:fillRef>
+      <a:effectRef idx="0">
+        <a:scrgbClr r="0" g="0" b="0"/>
+      </a:effectRef>
+      <a:fontRef idx="minor">
+        <a:schemeClr val="lt1"/>
+      </a:fontRef>
+    </dgm:style>
+  </dgm:styleLbl>
+  <dgm:styleLbl name="asst2">
+    <dgm:scene3d>
+      <a:camera prst="orthographicFront"/>
+      <a:lightRig rig="threePt" dir="t"/>
+    </dgm:scene3d>
+    <dgm:sp3d/>
+    <dgm:txPr/>
+    <dgm:style>
+      <a:lnRef idx="2">
+        <a:scrgbClr r="0" g="0" b="0"/>
+      </a:lnRef>
+      <a:fillRef idx="1">
+        <a:scrgbClr r="0" g="0" b="0"/>
+      </a:fillRef>
+      <a:effectRef idx="0">
+        <a:scrgbClr r="0" g="0" b="0"/>
+      </a:effectRef>
+      <a:fontRef idx="minor">
+        <a:schemeClr val="lt1"/>
+      </a:fontRef>
+    </dgm:style>
+  </dgm:styleLbl>
+  <dgm:styleLbl name="asst3">
+    <dgm:scene3d>
+      <a:camera prst="orthographicFront"/>
+      <a:lightRig rig="threePt" dir="t"/>
+    </dgm:scene3d>
+    <dgm:sp3d/>
+    <dgm:txPr/>
+    <dgm:style>
+      <a:lnRef idx="2">
+        <a:scrgbClr r="0" g="0" b="0"/>
+      </a:lnRef>
+      <a:fillRef idx="1">
+        <a:scrgbClr r="0" g="0" b="0"/>
+      </a:fillRef>
+      <a:effectRef idx="0">
+        <a:scrgbClr r="0" g="0" b="0"/>
+      </a:effectRef>
+      <a:fontRef idx="minor">
+        <a:schemeClr val="lt1"/>
+      </a:fontRef>
+    </dgm:style>
+  </dgm:styleLbl>
+  <dgm:styleLbl name="asst4">
+    <dgm:scene3d>
+      <a:camera prst="orthographicFront"/>
+      <a:lightRig rig="threePt" dir="t"/>
+    </dgm:scene3d>
+    <dgm:sp3d/>
+    <dgm:txPr/>
+    <dgm:style>
+      <a:lnRef idx="2">
+        <a:scrgbClr r="0" g="0" b="0"/>
+      </a:lnRef>
+      <a:fillRef idx="1">
+        <a:scrgbClr r="0" g="0" b="0"/>
+      </a:fillRef>
+      <a:effectRef idx="0">
+        <a:scrgbClr r="0" g="0" b="0"/>
+      </a:effectRef>
+      <a:fontRef idx="minor">
+        <a:schemeClr val="lt1"/>
+      </a:fontRef>
+    </dgm:style>
+  </dgm:styleLbl>
+  <dgm:styleLbl name="parChTrans2D1">
+    <dgm:scene3d>
+      <a:camera prst="orthographicFront"/>
+      <a:lightRig rig="threePt" dir="t"/>
+    </dgm:scene3d>
+    <dgm:sp3d/>
+    <dgm:txPr/>
+    <dgm:style>
+      <a:lnRef idx="2">
+        <a:scrgbClr r="0" g="0" b="0"/>
+      </a:lnRef>
+      <a:fillRef idx="1">
+        <a:scrgbClr r="0" g="0" b="0"/>
+      </a:fillRef>
+      <a:effectRef idx="0">
+        <a:scrgbClr r="0" g="0" b="0"/>
+      </a:effectRef>
+      <a:fontRef idx="minor">
+        <a:schemeClr val="lt1"/>
+      </a:fontRef>
+    </dgm:style>
+  </dgm:styleLbl>
+  <dgm:styleLbl name="parChTrans2D2">
+    <dgm:scene3d>
+      <a:camera prst="orthographicFront"/>
+      <a:lightRig rig="threePt" dir="t"/>
+    </dgm:scene3d>
+    <dgm:sp3d/>
+    <dgm:txPr/>
+    <dgm:style>
+      <a:lnRef idx="2">
+        <a:scrgbClr r="0" g="0" b="0"/>
+      </a:lnRef>
+      <a:fillRef idx="1">
+        <a:scrgbClr r="0" g="0" b="0"/>
+      </a:fillRef>
+      <a:effectRef idx="0">
+        <a:scrgbClr r="0" g="0" b="0"/>
+      </a:effectRef>
+      <a:fontRef idx="minor">
+        <a:schemeClr val="lt1"/>
+      </a:fontRef>
+    </dgm:style>
+  </dgm:styleLbl>
+  <dgm:styleLbl name="parChTrans2D3">
+    <dgm:scene3d>
+      <a:camera prst="orthographicFront"/>
+      <a:lightRig rig="threePt" dir="t"/>
+    </dgm:scene3d>
+    <dgm:sp3d/>
+    <dgm:txPr/>
+    <dgm:style>
+      <a:lnRef idx="2">
+        <a:scrgbClr r="0" g="0" b="0"/>
+      </a:lnRef>
+      <a:fillRef idx="1">
+        <a:scrgbClr r="0" g="0" b="0"/>
+      </a:fillRef>
+      <a:effectRef idx="0">
+        <a:scrgbClr r="0" g="0" b="0"/>
+      </a:effectRef>
+      <a:fontRef idx="minor">
+        <a:schemeClr val="lt1"/>
+      </a:fontRef>
+    </dgm:style>
+  </dgm:styleLbl>
+  <dgm:styleLbl name="parChTrans2D4">
+    <dgm:scene3d>
+      <a:camera prst="orthographicFront"/>
+      <a:lightRig rig="threePt" dir="t"/>
+    </dgm:scene3d>
+    <dgm:sp3d/>
+    <dgm:txPr/>
+    <dgm:style>
+      <a:lnRef idx="2">
+        <a:scrgbClr r="0" g="0" b="0"/>
+      </a:lnRef>
+      <a:fillRef idx="1">
+        <a:scrgbClr r="0" g="0" b="0"/>
+      </a:fillRef>
+      <a:effectRef idx="0">
+        <a:scrgbClr r="0" g="0" b="0"/>
+      </a:effectRef>
+      <a:fontRef idx="minor">
+        <a:schemeClr val="lt1"/>
+      </a:fontRef>
+    </dgm:style>
+  </dgm:styleLbl>
+  <dgm:styleLbl name="parChTrans1D1">
+    <dgm:scene3d>
+      <a:camera prst="orthographicFront"/>
+      <a:lightRig rig="threePt" dir="t"/>
+    </dgm:scene3d>
+    <dgm:sp3d/>
+    <dgm:txPr/>
+    <dgm:style>
+      <a:lnRef idx="2">
+        <a:scrgbClr r="0" g="0" b="0"/>
+      </a:lnRef>
+      <a:fillRef idx="0">
+        <a:scrgbClr r="0" g="0" b="0"/>
+      </a:fillRef>
+      <a:effectRef idx="0">
+        <a:scrgbClr r="0" g="0" b="0"/>
+      </a:effectRef>
+      <a:fontRef idx="minor"/>
+    </dgm:style>
+  </dgm:styleLbl>
+  <dgm:styleLbl name="parChTrans1D2">
+    <dgm:scene3d>
+      <a:camera prst="orthographicFront"/>
+      <a:lightRig rig="threePt" dir="t"/>
+    </dgm:scene3d>
+    <dgm:sp3d/>
+    <dgm:txPr/>
+    <dgm:style>
+      <a:lnRef idx="2">
+        <a:scrgbClr r="0" g="0" b="0"/>
+      </a:lnRef>
+      <a:fillRef idx="0">
+        <a:scrgbClr r="0" g="0" b="0"/>
+      </a:fillRef>
+      <a:effectRef idx="0">
+        <a:scrgbClr r="0" g="0" b="0"/>
+      </a:effectRef>
+      <a:fontRef idx="minor"/>
+    </dgm:style>
+  </dgm:styleLbl>
+  <dgm:styleLbl name="parChTrans1D3">
+    <dgm:scene3d>
+      <a:camera prst="orthographicFront"/>
+      <a:lightRig rig="threePt" dir="t"/>
+    </dgm:scene3d>
+    <dgm:sp3d/>
+    <dgm:txPr/>
+    <dgm:style>
+      <a:lnRef idx="2">
+        <a:scrgbClr r="0" g="0" b="0"/>
+      </a:lnRef>
+      <a:fillRef idx="0">
+        <a:scrgbClr r="0" g="0" b="0"/>
+      </a:fillRef>
+      <a:effectRef idx="0">
+        <a:scrgbClr r="0" g="0" b="0"/>
+      </a:effectRef>
+      <a:fontRef idx="minor"/>
+    </dgm:style>
+  </dgm:styleLbl>
+  <dgm:styleLbl name="parChTrans1D4">
+    <dgm:scene3d>
+      <a:camera prst="orthographicFront"/>
+      <a:lightRig rig="threePt" dir="t"/>
+    </dgm:scene3d>
+    <dgm:sp3d/>
+    <dgm:txPr/>
+    <dgm:style>
+      <a:lnRef idx="2">
+        <a:scrgbClr r="0" g="0" b="0"/>
+      </a:lnRef>
+      <a:fillRef idx="0">
+        <a:scrgbClr r="0" g="0" b="0"/>
+      </a:fillRef>
+      <a:effectRef idx="0">
+        <a:scrgbClr r="0" g="0" b="0"/>
+      </a:effectRef>
+      <a:fontRef idx="minor"/>
+    </dgm:style>
+  </dgm:styleLbl>
+  <dgm:styleLbl name="fgAcc1">
+    <dgm:scene3d>
+      <a:camera prst="orthographicFront"/>
+      <a:lightRig rig="threePt" dir="t"/>
+    </dgm:scene3d>
+    <dgm:sp3d/>
+    <dgm:txPr/>
+    <dgm:style>
+      <a:lnRef idx="2">
+        <a:scrgbClr r="0" g="0" b="0"/>
+      </a:lnRef>
+      <a:fillRef idx="1">
+        <a:scrgbClr r="0" g="0" b="0"/>
+      </a:fillRef>
+      <a:effectRef idx="0">
+        <a:scrgbClr r="0" g="0" b="0"/>
+      </a:effectRef>
+      <a:fontRef idx="minor"/>
+    </dgm:style>
+  </dgm:styleLbl>
+  <dgm:styleLbl name="conFgAcc1">
+    <dgm:scene3d>
+      <a:camera prst="orthographicFront"/>
+      <a:lightRig rig="threePt" dir="t"/>
+    </dgm:scene3d>
+    <dgm:sp3d/>
+    <dgm:txPr/>
+    <dgm:style>
+      <a:lnRef idx="2">
+        <a:scrgbClr r="0" g="0" b="0"/>
+      </a:lnRef>
+      <a:fillRef idx="1">
+        <a:scrgbClr r="0" g="0" b="0"/>
+      </a:fillRef>
+      <a:effectRef idx="0">
+        <a:scrgbClr r="0" g="0" b="0"/>
+      </a:effectRef>
+      <a:fontRef idx="minor"/>
+    </dgm:style>
+  </dgm:styleLbl>
+  <dgm:styleLbl name="alignAcc1">
+    <dgm:scene3d>
+      <a:camera prst="orthographicFront"/>
+      <a:lightRig rig="threePt" dir="t"/>
+    </dgm:scene3d>
+    <dgm:sp3d/>
+    <dgm:txPr/>
+    <dgm:style>
+      <a:lnRef idx="2">
+        <a:scrgbClr r="0" g="0" b="0"/>
+      </a:lnRef>
+      <a:fillRef idx="1">
+        <a:scrgbClr r="0" g="0" b="0"/>
+      </a:fillRef>
+      <a:effectRef idx="0">
+        <a:scrgbClr r="0" g="0" b="0"/>
+      </a:effectRef>
+      <a:fontRef idx="minor"/>
+    </dgm:style>
+  </dgm:styleLbl>
+  <dgm:styleLbl name="trAlignAcc1">
+    <dgm:scene3d>
+      <a:camera prst="orthographicFront"/>
+      <a:lightRig rig="threePt" dir="t"/>
+    </dgm:scene3d>
+    <dgm:sp3d/>
+    <dgm:txPr/>
+    <dgm:style>
+      <a:lnRef idx="1">
+        <a:scrgbClr r="0" g="0" b="0"/>
+      </a:lnRef>
+      <a:fillRef idx="1">
+        <a:scrgbClr r="0" g="0" b="0"/>
+      </a:fillRef>
+      <a:effectRef idx="0">
+        <a:scrgbClr r="0" g="0" b="0"/>
+      </a:effectRef>
+      <a:fontRef idx="minor"/>
+    </dgm:style>
+  </dgm:styleLbl>
+  <dgm:styleLbl name="bgAcc1">
+    <dgm:scene3d>
+      <a:camera prst="orthographicFront"/>
+      <a:lightRig rig="threePt" dir="t"/>
+    </dgm:scene3d>
+    <dgm:sp3d/>
+    <dgm:txPr/>
+    <dgm:style>
+      <a:lnRef idx="2">
+        <a:scrgbClr r="0" g="0" b="0"/>
+      </a:lnRef>
+      <a:fillRef idx="1">
+        <a:scrgbClr r="0" g="0" b="0"/>
+      </a:fillRef>
+      <a:effectRef idx="0">
+        <a:scrgbClr r="0" g="0" b="0"/>
+      </a:effectRef>
+      <a:fontRef idx="minor"/>
+    </dgm:style>
+  </dgm:styleLbl>
+  <dgm:styleLbl name="solidFgAcc1">
+    <dgm:scene3d>
+      <a:camera prst="orthographicFront"/>
+      <a:lightRig rig="threePt" dir="t"/>
+    </dgm:scene3d>
+    <dgm:sp3d/>
+    <dgm:txPr/>
+    <dgm:style>
+      <a:lnRef idx="2">
+        <a:scrgbClr r="0" g="0" b="0"/>
+      </a:lnRef>
+      <a:fillRef idx="1">
+        <a:scrgbClr r="0" g="0" b="0"/>
+      </a:fillRef>
+      <a:effectRef idx="0">
+        <a:scrgbClr r="0" g="0" b="0"/>
+      </a:effectRef>
+      <a:fontRef idx="minor"/>
+    </dgm:style>
+  </dgm:styleLbl>
+  <dgm:styleLbl name="solidAlignAcc1">
+    <dgm:scene3d>
+      <a:camera prst="orthographicFront"/>
+      <a:lightRig rig="threePt" dir="t"/>
+    </dgm:scene3d>
+    <dgm:sp3d/>
+    <dgm:txPr/>
+    <dgm:style>
+      <a:lnRef idx="2">
+        <a:scrgbClr r="0" g="0" b="0"/>
+      </a:lnRef>
+      <a:fillRef idx="1">
+        <a:scrgbClr r="0" g="0" b="0"/>
+      </a:fillRef>
+      <a:effectRef idx="0">
+        <a:scrgbClr r="0" g="0" b="0"/>
+      </a:effectRef>
+      <a:fontRef idx="minor"/>
+    </dgm:style>
+  </dgm:styleLbl>
+  <dgm:styleLbl name="solidBgAcc1">
+    <dgm:scene3d>
+      <a:camera prst="orthographicFront"/>
+      <a:lightRig rig="threePt" dir="t"/>
+    </dgm:scene3d>
+    <dgm:sp3d/>
+    <dgm:txPr/>
+    <dgm:style>
+      <a:lnRef idx="2">
+        <a:scrgbClr r="0" g="0" b="0"/>
+      </a:lnRef>
+      <a:fillRef idx="1">
+        <a:scrgbClr r="0" g="0" b="0"/>
+      </a:fillRef>
+      <a:effectRef idx="0">
+        <a:scrgbClr r="0" g="0" b="0"/>
+      </a:effectRef>
+      <a:fontRef idx="minor"/>
+    </dgm:style>
+  </dgm:styleLbl>
+  <dgm:styleLbl name="fgAccFollowNode1">
+    <dgm:scene3d>
+      <a:camera prst="orthographicFront"/>
+      <a:lightRig rig="threePt" dir="t"/>
+    </dgm:scene3d>
+    <dgm:sp3d/>
+    <dgm:txPr/>
+    <dgm:style>
+      <a:lnRef idx="2">
+        <a:scrgbClr r="0" g="0" b="0"/>
+      </a:lnRef>
+      <a:fillRef idx="1">
+        <a:scrgbClr r="0" g="0" b="0"/>
+      </a:fillRef>
+      <a:effectRef idx="0">
+        <a:scrgbClr r="0" g="0" b="0"/>
+      </a:effectRef>
+      <a:fontRef idx="minor"/>
+    </dgm:style>
+  </dgm:styleLbl>
+  <dgm:styleLbl name="alignAccFollowNode1">
+    <dgm:scene3d>
+      <a:camera prst="orthographicFront"/>
+      <a:lightRig rig="threePt" dir="t"/>
+    </dgm:scene3d>
+    <dgm:sp3d/>
+    <dgm:txPr/>
+    <dgm:style>
+      <a:lnRef idx="2">
+        <a:scrgbClr r="0" g="0" b="0"/>
+      </a:lnRef>
+      <a:fillRef idx="1">
+        <a:scrgbClr r="0" g="0" b="0"/>
+      </a:fillRef>
+      <a:effectRef idx="0">
+        <a:scrgbClr r="0" g="0" b="0"/>
+      </a:effectRef>
+      <a:fontRef idx="minor"/>
+    </dgm:style>
+  </dgm:styleLbl>
+  <dgm:styleLbl name="bgAccFollowNode1">
+    <dgm:scene3d>
+      <a:camera prst="orthographicFront"/>
+      <a:lightRig rig="threePt" dir="t"/>
+    </dgm:scene3d>
+    <dgm:sp3d/>
+    <dgm:txPr/>
+    <dgm:style>
+      <a:lnRef idx="2">
+        <a:scrgbClr r="0" g="0" b="0"/>
+      </a:lnRef>
+      <a:fillRef idx="1">
+        <a:scrgbClr r="0" g="0" b="0"/>
+      </a:fillRef>
+      <a:effectRef idx="0">
+        <a:scrgbClr r="0" g="0" b="0"/>
+      </a:effectRef>
+      <a:fontRef idx="minor"/>
+    </dgm:style>
+  </dgm:styleLbl>
+  <dgm:styleLbl name="fgAcc0">
+    <dgm:scene3d>
+      <a:camera prst="orthographicFront"/>
+      <a:lightRig rig="threePt" dir="t"/>
+    </dgm:scene3d>
+    <dgm:sp3d/>
+    <dgm:txPr/>
+    <dgm:style>
+      <a:lnRef idx="2">
+        <a:scrgbClr r="0" g="0" b="0"/>
+      </a:lnRef>
+      <a:fillRef idx="1">
+        <a:scrgbClr r="0" g="0" b="0"/>
+      </a:fillRef>
+      <a:effectRef idx="0">
+        <a:scrgbClr r="0" g="0" b="0"/>
+      </a:effectRef>
+      <a:fontRef idx="minor"/>
+    </dgm:style>
+  </dgm:styleLbl>
+  <dgm:styleLbl name="fgAcc2">
+    <dgm:scene3d>
+      <a:camera prst="orthographicFront"/>
+      <a:lightRig rig="threePt" dir="t"/>
+    </dgm:scene3d>
+    <dgm:sp3d/>
+    <dgm:txPr/>
+    <dgm:style>
+      <a:lnRef idx="2">
+        <a:scrgbClr r="0" g="0" b="0"/>
+      </a:lnRef>
+      <a:fillRef idx="1">
+        <a:scrgbClr r="0" g="0" b="0"/>
+      </a:fillRef>
+      <a:effectRef idx="0">
+        <a:scrgbClr r="0" g="0" b="0"/>
+      </a:effectRef>
+      <a:fontRef idx="minor"/>
+    </dgm:style>
+  </dgm:styleLbl>
+  <dgm:styleLbl name="fgAcc3">
+    <dgm:scene3d>
+      <a:camera prst="orthographicFront"/>
+      <a:lightRig rig="threePt" dir="t"/>
+    </dgm:scene3d>
+    <dgm:sp3d/>
+    <dgm:txPr/>
+    <dgm:style>
+      <a:lnRef idx="2">
+        <a:scrgbClr r="0" g="0" b="0"/>
+      </a:lnRef>
+      <a:fillRef idx="1">
+        <a:scrgbClr r="0" g="0" b="0"/>
+      </a:fillRef>
+      <a:effectRef idx="0">
+        <a:scrgbClr r="0" g="0" b="0"/>
+      </a:effectRef>
+      <a:fontRef idx="minor"/>
+    </dgm:style>
+  </dgm:styleLbl>
+  <dgm:styleLbl name="fgAcc4">
+    <dgm:scene3d>
+      <a:camera prst="orthographicFront"/>
+      <a:lightRig rig="threePt" dir="t"/>
+    </dgm:scene3d>
+    <dgm:sp3d/>
+    <dgm:txPr/>
+    <dgm:style>
+      <a:lnRef idx="2">
+        <a:scrgbClr r="0" g="0" b="0"/>
+      </a:lnRef>
+      <a:fillRef idx="1">
+        <a:scrgbClr r="0" g="0" b="0"/>
+      </a:fillRef>
+      <a:effectRef idx="0">
+        <a:scrgbClr r="0" g="0" b="0"/>
+      </a:effectRef>
+      <a:fontRef idx="minor"/>
+    </dgm:style>
+  </dgm:styleLbl>
+  <dgm:styleLbl name="bgShp">
+    <dgm:scene3d>
+      <a:camera prst="orthographicFront"/>
+      <a:lightRig rig="threePt" dir="t"/>
+    </dgm:scene3d>
+    <dgm:sp3d/>
+    <dgm:txPr/>
+    <dgm:style>
+      <a:lnRef idx="0">
+        <a:scrgbClr r="0" g="0" b="0"/>
+      </a:lnRef>
+      <a:fillRef idx="1">
+        <a:scrgbClr r="0" g="0" b="0"/>
+      </a:fillRef>
+      <a:effectRef idx="0">
+        <a:scrgbClr r="0" g="0" b="0"/>
+      </a:effectRef>
+      <a:fontRef idx="minor"/>
+    </dgm:style>
+  </dgm:styleLbl>
+  <dgm:styleLbl name="dkBgShp">
+    <dgm:scene3d>
+      <a:camera prst="orthographicFront"/>
+      <a:lightRig rig="threePt" dir="t"/>
+    </dgm:scene3d>
+    <dgm:sp3d/>
+    <dgm:txPr/>
+    <dgm:style>
+      <a:lnRef idx="0">
+        <a:scrgbClr r="0" g="0" b="0"/>
+      </a:lnRef>
+      <a:fillRef idx="1">
+        <a:scrgbClr r="0" g="0" b="0"/>
+      </a:fillRef>
+      <a:effectRef idx="0">
+        <a:scrgbClr r="0" g="0" b="0"/>
+      </a:effectRef>
+      <a:fontRef idx="minor"/>
+    </dgm:style>
+  </dgm:styleLbl>
+  <dgm:styleLbl name="trBgShp">
+    <dgm:scene3d>
+      <a:camera prst="orthographicFront"/>
+      <a:lightRig rig="threePt" dir="t"/>
+    </dgm:scene3d>
+    <dgm:sp3d/>
+    <dgm:txPr/>
+    <dgm:style>
+      <a:lnRef idx="0">
+        <a:scrgbClr r="0" g="0" b="0"/>
+      </a:lnRef>
+      <a:fillRef idx="1">
+        <a:scrgbClr r="0" g="0" b="0"/>
+      </a:fillRef>
+      <a:effectRef idx="0">
+        <a:scrgbClr r="0" g="0" b="0"/>
+      </a:effectRef>
+      <a:fontRef idx="minor"/>
+    </dgm:style>
+  </dgm:styleLbl>
+  <dgm:styleLbl name="fgShp">
+    <dgm:scene3d>
+      <a:camera prst="orthographicFront"/>
+      <a:lightRig rig="threePt" dir="t"/>
+    </dgm:scene3d>
+    <dgm:sp3d/>
+    <dgm:txPr/>
+    <dgm:style>
+      <a:lnRef idx="2">
+        <a:scrgbClr r="0" g="0" b="0"/>
+      </a:lnRef>
+      <a:fillRef idx="1">
+        <a:scrgbClr r="0" g="0" b="0"/>
+      </a:fillRef>
+      <a:effectRef idx="0">
+        <a:scrgbClr r="0" g="0" b="0"/>
+      </a:effectRef>
+      <a:fontRef idx="minor"/>
+    </dgm:style>
+  </dgm:styleLbl>
+  <dgm:styleLbl name="revTx">
+    <dgm:scene3d>
+      <a:camera prst="orthographicFront"/>
+      <a:lightRig rig="threePt" dir="t"/>
+    </dgm:scene3d>
+    <dgm:sp3d/>
+    <dgm:txPr/>
+    <dgm:style>
+      <a:lnRef idx="0">
+        <a:scrgbClr r="0" g="0" b="0"/>
+      </a:lnRef>
+      <a:fillRef idx="0">
+        <a:scrgbClr r="0" g="0" b="0"/>
+      </a:fillRef>
+      <a:effectRef idx="0">
+        <a:scrgbClr r="0" g="0" b="0"/>
+      </a:effectRef>
+      <a:fontRef idx="minor"/>
+    </dgm:style>
+  </dgm:styleLbl>
+</dgm:styleDef>
+</file>
+
 <file path=ppt/diagrams/quickStyle2.xml><?xml version="1.0" encoding="utf-8"?>
 <dgm:styleDef xmlns:dgm="http://schemas.openxmlformats.org/drawingml/2006/diagram" xmlns:a="http://schemas.openxmlformats.org/drawingml/2006/main" uniqueId="urn:microsoft.com/office/officeart/2005/8/quickstyle/simple1">
   <dgm:title val=""/>
@@ -41166,7 +43869,7 @@
           <a:p>
             <a:fld id="{83B82F2E-7BF0-4478-B30F-6DC8BF0B2F06}" type="datetimeFigureOut">
               <a:rPr lang="en-US" smtClean="0"/>
-              <a:t>2021-10-30</a:t>
+              <a:t>2021-11-05</a:t>
             </a:fld>
             <a:endParaRPr lang="en-US"/>
           </a:p>
@@ -41586,7 +44289,7 @@
           <a:p>
             <a:fld id="{B6F10287-B1A7-4952-A817-DFE375B7FB46}" type="slidenum">
               <a:rPr lang="en-US" smtClean="0"/>
-              <a:t>17</a:t>
+              <a:t>18</a:t>
             </a:fld>
             <a:endParaRPr lang="en-US"/>
           </a:p>
@@ -41674,7 +44377,7 @@
           <a:p>
             <a:fld id="{B6F10287-B1A7-4952-A817-DFE375B7FB46}" type="slidenum">
               <a:rPr lang="en-US" smtClean="0"/>
-              <a:t>19</a:t>
+              <a:t>20</a:t>
             </a:fld>
             <a:endParaRPr lang="en-US"/>
           </a:p>
@@ -42575,7 +45278,7 @@
           <a:p>
             <a:fld id="{838550C6-B700-4010-A128-436CD12A3E28}" type="datetime1">
               <a:rPr lang="en-US" smtClean="0"/>
-              <a:t>2021-10-30</a:t>
+              <a:t>2021-11-05</a:t>
             </a:fld>
             <a:endParaRPr lang="en-US"/>
           </a:p>
@@ -42773,7 +45476,7 @@
           <a:p>
             <a:fld id="{4AEF2539-0B99-4BE6-867B-AF5F5CC16E2A}" type="datetime1">
               <a:rPr lang="en-US" smtClean="0"/>
-              <a:t>2021-10-30</a:t>
+              <a:t>2021-11-05</a:t>
             </a:fld>
             <a:endParaRPr lang="en-US"/>
           </a:p>
@@ -42981,7 +45684,7 @@
           <a:p>
             <a:fld id="{AA20639D-DE06-4714-A2DD-7BE4DEFA6620}" type="datetime1">
               <a:rPr lang="en-US" smtClean="0"/>
-              <a:t>2021-10-30</a:t>
+              <a:t>2021-11-05</a:t>
             </a:fld>
             <a:endParaRPr lang="en-US"/>
           </a:p>
@@ -43179,7 +45882,7 @@
           <a:p>
             <a:fld id="{7CE3065D-3EB2-4AB6-9A73-6741DBC19012}" type="datetime1">
               <a:rPr lang="en-US" smtClean="0"/>
-              <a:t>2021-10-30</a:t>
+              <a:t>2021-11-05</a:t>
             </a:fld>
             <a:endParaRPr lang="en-US"/>
           </a:p>
@@ -43454,7 +46157,7 @@
           <a:p>
             <a:fld id="{F5B98698-9691-4BBC-8346-4023DC940402}" type="datetime1">
               <a:rPr lang="en-US" smtClean="0"/>
-              <a:t>2021-10-30</a:t>
+              <a:t>2021-11-05</a:t>
             </a:fld>
             <a:endParaRPr lang="en-US"/>
           </a:p>
@@ -43719,7 +46422,7 @@
           <a:p>
             <a:fld id="{A62108FF-6B6B-4956-8BDB-A173EC229641}" type="datetime1">
               <a:rPr lang="en-US" smtClean="0"/>
-              <a:t>2021-10-30</a:t>
+              <a:t>2021-11-05</a:t>
             </a:fld>
             <a:endParaRPr lang="en-US"/>
           </a:p>
@@ -44131,7 +46834,7 @@
           <a:p>
             <a:fld id="{B00B79BE-572B-4DFD-B3A5-62A1D591CEE0}" type="datetime1">
               <a:rPr lang="en-US" smtClean="0"/>
-              <a:t>2021-10-30</a:t>
+              <a:t>2021-11-05</a:t>
             </a:fld>
             <a:endParaRPr lang="en-US"/>
           </a:p>
@@ -44272,7 +46975,7 @@
           <a:p>
             <a:fld id="{6793535B-05D0-41A1-BA02-10BC42F2B02D}" type="datetime1">
               <a:rPr lang="en-US" smtClean="0"/>
-              <a:t>2021-10-30</a:t>
+              <a:t>2021-11-05</a:t>
             </a:fld>
             <a:endParaRPr lang="en-US"/>
           </a:p>
@@ -44385,7 +47088,7 @@
           <a:p>
             <a:fld id="{CFAA7C6A-169A-4D40-8F33-4C784E98E1A4}" type="datetime1">
               <a:rPr lang="en-US" smtClean="0"/>
-              <a:t>2021-10-30</a:t>
+              <a:t>2021-11-05</a:t>
             </a:fld>
             <a:endParaRPr lang="en-US"/>
           </a:p>
@@ -44696,7 +47399,7 @@
           <a:p>
             <a:fld id="{EEC83A40-97F0-472C-BDC2-592D41FF3468}" type="datetime1">
               <a:rPr lang="en-US" smtClean="0"/>
-              <a:t>2021-10-30</a:t>
+              <a:t>2021-11-05</a:t>
             </a:fld>
             <a:endParaRPr lang="en-US"/>
           </a:p>
@@ -44987,7 +47690,7 @@
           <a:p>
             <a:fld id="{CBE839F0-C029-4840-B6B5-DD225AC2619B}" type="datetime1">
               <a:rPr lang="en-US" smtClean="0"/>
-              <a:t>2021-10-30</a:t>
+              <a:t>2021-11-05</a:t>
             </a:fld>
             <a:endParaRPr lang="en-US"/>
           </a:p>
@@ -45228,7 +47931,7 @@
           <a:p>
             <a:fld id="{3D507592-AC47-4ACC-AC8C-38BE4BF7CBB1}" type="datetime1">
               <a:rPr lang="en-US" smtClean="0"/>
-              <a:t>2021-10-30</a:t>
+              <a:t>2021-11-05</a:t>
             </a:fld>
             <a:endParaRPr lang="en-US"/>
           </a:p>
@@ -47883,6 +50586,258 @@
           <p:cNvPr id="2" name="Title 1">
             <a:extLst>
               <a:ext uri="{FF2B5EF4-FFF2-40B4-BE49-F238E27FC236}">
+                <a16:creationId xmlns:a16="http://schemas.microsoft.com/office/drawing/2014/main" id="{4972D122-2D50-477A-B9F2-33C388E0EC79}"/>
+              </a:ext>
+            </a:extLst>
+          </p:cNvPr>
+          <p:cNvSpPr>
+            <a:spLocks noGrp="1"/>
+          </p:cNvSpPr>
+          <p:nvPr>
+            <p:ph type="title"/>
+          </p:nvPr>
+        </p:nvSpPr>
+        <p:spPr/>
+        <p:txBody>
+          <a:bodyPr/>
+          <a:lstStyle/>
+          <a:p>
+            <a:r>
+              <a:rPr lang="ru-RU" dirty="0"/>
+              <a:t>Чему мы научились</a:t>
+            </a:r>
+            <a:r>
+              <a:rPr lang="en-US" dirty="0"/>
+              <a:t>?</a:t>
+            </a:r>
+          </a:p>
+        </p:txBody>
+      </p:sp>
+      <p:sp>
+        <p:nvSpPr>
+          <p:cNvPr id="4" name="Slide Number Placeholder 3">
+            <a:extLst>
+              <a:ext uri="{FF2B5EF4-FFF2-40B4-BE49-F238E27FC236}">
+                <a16:creationId xmlns:a16="http://schemas.microsoft.com/office/drawing/2014/main" id="{FEC295F8-C79B-46FF-BDE7-973AB411DFE8}"/>
+              </a:ext>
+            </a:extLst>
+          </p:cNvPr>
+          <p:cNvSpPr>
+            <a:spLocks noGrp="1"/>
+          </p:cNvSpPr>
+          <p:nvPr>
+            <p:ph type="sldNum" sz="quarter" idx="12"/>
+          </p:nvPr>
+        </p:nvSpPr>
+        <p:spPr/>
+        <p:txBody>
+          <a:bodyPr/>
+          <a:lstStyle/>
+          <a:p>
+            <a:fld id="{C0511E7A-FB40-414D-9CE5-8839E25420B8}" type="slidenum">
+              <a:rPr lang="en-US" smtClean="0"/>
+              <a:t>17</a:t>
+            </a:fld>
+            <a:endParaRPr lang="en-US"/>
+          </a:p>
+        </p:txBody>
+      </p:sp>
+      <p:graphicFrame>
+        <p:nvGraphicFramePr>
+          <p:cNvPr id="5" name="Content Placeholder 4">
+            <a:extLst>
+              <a:ext uri="{FF2B5EF4-FFF2-40B4-BE49-F238E27FC236}">
+                <a16:creationId xmlns:a16="http://schemas.microsoft.com/office/drawing/2014/main" id="{94AE374D-27E9-4EE7-9E22-1FBC8C93F443}"/>
+              </a:ext>
+            </a:extLst>
+          </p:cNvPr>
+          <p:cNvGraphicFramePr>
+            <a:graphicFrameLocks noGrp="1"/>
+          </p:cNvGraphicFramePr>
+          <p:nvPr>
+            <p:ph idx="1"/>
+            <p:extLst>
+              <p:ext uri="{D42A27DB-BD31-4B8C-83A1-F6EECF244321}">
+                <p14:modId xmlns:p14="http://schemas.microsoft.com/office/powerpoint/2010/main" val="1148811297"/>
+              </p:ext>
+            </p:extLst>
+          </p:nvPr>
+        </p:nvGraphicFramePr>
+        <p:xfrm>
+          <a:off x="838200" y="1825625"/>
+          <a:ext cx="10515600" cy="4351338"/>
+        </p:xfrm>
+        <a:graphic>
+          <a:graphicData uri="http://schemas.openxmlformats.org/drawingml/2006/diagram">
+            <dgm:relIds xmlns:dgm="http://schemas.openxmlformats.org/drawingml/2006/diagram" xmlns:r="http://schemas.openxmlformats.org/officeDocument/2006/relationships" r:dm="rId2" r:lo="rId3" r:qs="rId4" r:cs="rId5"/>
+          </a:graphicData>
+        </a:graphic>
+      </p:graphicFrame>
+      <p:sp>
+        <p:nvSpPr>
+          <p:cNvPr id="6" name="TextBox 5">
+            <a:extLst>
+              <a:ext uri="{FF2B5EF4-FFF2-40B4-BE49-F238E27FC236}">
+                <a16:creationId xmlns:a16="http://schemas.microsoft.com/office/drawing/2014/main" id="{13427090-B08A-4159-B55A-C62555F92856}"/>
+              </a:ext>
+            </a:extLst>
+          </p:cNvPr>
+          <p:cNvSpPr txBox="1"/>
+          <p:nvPr/>
+        </p:nvSpPr>
+        <p:spPr>
+          <a:xfrm rot="1383367">
+            <a:off x="2212850" y="2749739"/>
+            <a:ext cx="8250848" cy="2215991"/>
+          </a:xfrm>
+          <a:prstGeom prst="rect">
+            <a:avLst/>
+          </a:prstGeom>
+          <a:noFill/>
+        </p:spPr>
+        <p:txBody>
+          <a:bodyPr wrap="none" rtlCol="0">
+            <a:spAutoFit/>
+          </a:bodyPr>
+          <a:lstStyle/>
+          <a:p>
+            <a:r>
+              <a:rPr lang="ru-RU" sz="13800" b="1" dirty="0">
+                <a:solidFill>
+                  <a:srgbClr val="FF0000"/>
+                </a:solidFill>
+              </a:rPr>
+              <a:t>НЕ ВСЕГДА</a:t>
+            </a:r>
+            <a:endParaRPr lang="en-US" sz="13800" b="1" dirty="0">
+              <a:solidFill>
+                <a:srgbClr val="FF0000"/>
+              </a:solidFill>
+            </a:endParaRPr>
+          </a:p>
+        </p:txBody>
+      </p:sp>
+    </p:spTree>
+    <p:extLst>
+      <p:ext uri="{BB962C8B-B14F-4D97-AF65-F5344CB8AC3E}">
+        <p14:creationId xmlns:p14="http://schemas.microsoft.com/office/powerpoint/2010/main" val="2063652437"/>
+      </p:ext>
+    </p:extLst>
+  </p:cSld>
+  <p:clrMapOvr>
+    <a:masterClrMapping/>
+  </p:clrMapOvr>
+  <p:timing>
+    <p:tnLst>
+      <p:par>
+        <p:cTn id="1" dur="indefinite" restart="never" nodeType="tmRoot">
+          <p:childTnLst>
+            <p:seq concurrent="1" nextAc="seek">
+              <p:cTn id="2" dur="indefinite" nodeType="mainSeq">
+                <p:childTnLst>
+                  <p:par>
+                    <p:cTn id="3" fill="hold">
+                      <p:stCondLst>
+                        <p:cond delay="indefinite"/>
+                      </p:stCondLst>
+                      <p:childTnLst>
+                        <p:par>
+                          <p:cTn id="4" fill="hold">
+                            <p:stCondLst>
+                              <p:cond delay="0"/>
+                            </p:stCondLst>
+                            <p:childTnLst>
+                              <p:par>
+                                <p:cTn id="5" presetID="22" presetClass="entr" presetSubtype="4" fill="hold" grpId="0" nodeType="clickEffect">
+                                  <p:stCondLst>
+                                    <p:cond delay="0"/>
+                                  </p:stCondLst>
+                                  <p:childTnLst>
+                                    <p:set>
+                                      <p:cBhvr>
+                                        <p:cTn id="6" dur="1" fill="hold">
+                                          <p:stCondLst>
+                                            <p:cond delay="0"/>
+                                          </p:stCondLst>
+                                        </p:cTn>
+                                        <p:tgtEl>
+                                          <p:spTgt spid="6"/>
+                                        </p:tgtEl>
+                                        <p:attrNameLst>
+                                          <p:attrName>style.visibility</p:attrName>
+                                        </p:attrNameLst>
+                                      </p:cBhvr>
+                                      <p:to>
+                                        <p:strVal val="visible"/>
+                                      </p:to>
+                                    </p:set>
+                                    <p:animEffect transition="in" filter="wipe(down)">
+                                      <p:cBhvr>
+                                        <p:cTn id="7" dur="500"/>
+                                        <p:tgtEl>
+                                          <p:spTgt spid="6"/>
+                                        </p:tgtEl>
+                                      </p:cBhvr>
+                                    </p:animEffect>
+                                  </p:childTnLst>
+                                </p:cTn>
+                              </p:par>
+                            </p:childTnLst>
+                          </p:cTn>
+                        </p:par>
+                      </p:childTnLst>
+                    </p:cTn>
+                  </p:par>
+                </p:childTnLst>
+              </p:cTn>
+              <p:prevCondLst>
+                <p:cond evt="onPrev" delay="0">
+                  <p:tgtEl>
+                    <p:sldTgt/>
+                  </p:tgtEl>
+                </p:cond>
+              </p:prevCondLst>
+              <p:nextCondLst>
+                <p:cond evt="onNext" delay="0">
+                  <p:tgtEl>
+                    <p:sldTgt/>
+                  </p:tgtEl>
+                </p:cond>
+              </p:nextCondLst>
+            </p:seq>
+          </p:childTnLst>
+        </p:cTn>
+      </p:par>
+    </p:tnLst>
+    <p:bldLst>
+      <p:bldP spid="6" grpId="0"/>
+    </p:bldLst>
+  </p:timing>
+</p:sld>
+</file>
+
+<file path=ppt/slides/slide18.xml><?xml version="1.0" encoding="utf-8"?>
+<p:sld xmlns:a="http://schemas.openxmlformats.org/drawingml/2006/main" xmlns:r="http://schemas.openxmlformats.org/officeDocument/2006/relationships" xmlns:p="http://schemas.openxmlformats.org/presentationml/2006/main">
+  <p:cSld>
+    <p:spTree>
+      <p:nvGrpSpPr>
+        <p:cNvPr id="1" name=""/>
+        <p:cNvGrpSpPr/>
+        <p:nvPr/>
+      </p:nvGrpSpPr>
+      <p:grpSpPr>
+        <a:xfrm>
+          <a:off x="0" y="0"/>
+          <a:ext cx="0" cy="0"/>
+          <a:chOff x="0" y="0"/>
+          <a:chExt cx="0" cy="0"/>
+        </a:xfrm>
+      </p:grpSpPr>
+      <p:sp>
+        <p:nvSpPr>
+          <p:cNvPr id="2" name="Title 1">
+            <a:extLst>
+              <a:ext uri="{FF2B5EF4-FFF2-40B4-BE49-F238E27FC236}">
                 <a16:creationId xmlns:a16="http://schemas.microsoft.com/office/drawing/2014/main" id="{ECE1263B-9CB5-40CA-B9FE-C53F39194A8A}"/>
               </a:ext>
             </a:extLst>
@@ -47961,7 +50916,7 @@
           <a:p>
             <a:fld id="{C0511E7A-FB40-414D-9CE5-8839E25420B8}" type="slidenum">
               <a:rPr lang="en-US" smtClean="0"/>
-              <a:t>17</a:t>
+              <a:t>18</a:t>
             </a:fld>
             <a:endParaRPr lang="en-US"/>
           </a:p>
@@ -48108,7 +51063,7 @@
 </p:sld>
 </file>
 
-<file path=ppt/slides/slide18.xml><?xml version="1.0" encoding="utf-8"?>
+<file path=ppt/slides/slide19.xml><?xml version="1.0" encoding="utf-8"?>
 <p:sld xmlns:a="http://schemas.openxmlformats.org/drawingml/2006/main" xmlns:r="http://schemas.openxmlformats.org/officeDocument/2006/relationships" xmlns:p="http://schemas.openxmlformats.org/presentationml/2006/main">
   <p:cSld>
     <p:spTree>
@@ -48170,7 +51125,7 @@
             <p:ph idx="1"/>
             <p:extLst>
               <p:ext uri="{D42A27DB-BD31-4B8C-83A1-F6EECF244321}">
-                <p14:modId xmlns:p14="http://schemas.microsoft.com/office/powerpoint/2010/main" val="1581881256"/>
+                <p14:modId xmlns:p14="http://schemas.microsoft.com/office/powerpoint/2010/main" val="1113129396"/>
               </p:ext>
             </p:extLst>
           </p:nvPr>
@@ -48208,7 +51163,7 @@
           <a:p>
             <a:fld id="{C0511E7A-FB40-414D-9CE5-8839E25420B8}" type="slidenum">
               <a:rPr lang="en-US" smtClean="0"/>
-              <a:t>18</a:t>
+              <a:t>19</a:t>
             </a:fld>
             <a:endParaRPr lang="en-US"/>
           </a:p>
@@ -48218,129 +51173,6 @@
     <p:extLst>
       <p:ext uri="{BB962C8B-B14F-4D97-AF65-F5344CB8AC3E}">
         <p14:creationId xmlns:p14="http://schemas.microsoft.com/office/powerpoint/2010/main" val="392261936"/>
-      </p:ext>
-    </p:extLst>
-  </p:cSld>
-  <p:clrMapOvr>
-    <a:masterClrMapping/>
-  </p:clrMapOvr>
-</p:sld>
-</file>
-
-<file path=ppt/slides/slide19.xml><?xml version="1.0" encoding="utf-8"?>
-<p:sld xmlns:a="http://schemas.openxmlformats.org/drawingml/2006/main" xmlns:r="http://schemas.openxmlformats.org/officeDocument/2006/relationships" xmlns:p="http://schemas.openxmlformats.org/presentationml/2006/main">
-  <p:cSld>
-    <p:spTree>
-      <p:nvGrpSpPr>
-        <p:cNvPr id="1" name=""/>
-        <p:cNvGrpSpPr/>
-        <p:nvPr/>
-      </p:nvGrpSpPr>
-      <p:grpSpPr>
-        <a:xfrm>
-          <a:off x="0" y="0"/>
-          <a:ext cx="0" cy="0"/>
-          <a:chOff x="0" y="0"/>
-          <a:chExt cx="0" cy="0"/>
-        </a:xfrm>
-      </p:grpSpPr>
-      <p:sp>
-        <p:nvSpPr>
-          <p:cNvPr id="7" name="Title 6">
-            <a:extLst>
-              <a:ext uri="{FF2B5EF4-FFF2-40B4-BE49-F238E27FC236}">
-                <a16:creationId xmlns:a16="http://schemas.microsoft.com/office/drawing/2014/main" id="{E24B1868-EF67-4723-BF45-56E050B3232D}"/>
-              </a:ext>
-            </a:extLst>
-          </p:cNvPr>
-          <p:cNvSpPr>
-            <a:spLocks noGrp="1"/>
-          </p:cNvSpPr>
-          <p:nvPr>
-            <p:ph type="title"/>
-          </p:nvPr>
-        </p:nvSpPr>
-        <p:spPr/>
-        <p:txBody>
-          <a:bodyPr/>
-          <a:lstStyle/>
-          <a:p>
-            <a:r>
-              <a:rPr lang="ru-RU" dirty="0"/>
-              <a:t>Заключение</a:t>
-            </a:r>
-            <a:endParaRPr lang="en-US" dirty="0"/>
-          </a:p>
-        </p:txBody>
-      </p:sp>
-      <p:pic>
-        <p:nvPicPr>
-          <p:cNvPr id="10" name="Content Placeholder 9" descr="Plane on tarmac">
-            <a:extLst>
-              <a:ext uri="{FF2B5EF4-FFF2-40B4-BE49-F238E27FC236}">
-                <a16:creationId xmlns:a16="http://schemas.microsoft.com/office/drawing/2014/main" id="{A1197907-AA0A-420E-8AF8-C3447B556D83}"/>
-              </a:ext>
-            </a:extLst>
-          </p:cNvPr>
-          <p:cNvPicPr>
-            <a:picLocks noGrp="1" noChangeAspect="1"/>
-          </p:cNvPicPr>
-          <p:nvPr>
-            <p:ph idx="1"/>
-          </p:nvPr>
-        </p:nvPicPr>
-        <p:blipFill>
-          <a:blip r:embed="rId3">
-            <a:extLst>
-              <a:ext uri="{28A0092B-C50C-407E-A947-70E740481C1C}">
-                <a14:useLocalDpi xmlns:a14="http://schemas.microsoft.com/office/drawing/2010/main" val="0"/>
-              </a:ext>
-            </a:extLst>
-          </a:blip>
-          <a:stretch>
-            <a:fillRect/>
-          </a:stretch>
-        </p:blipFill>
-        <p:spPr>
-          <a:xfrm>
-            <a:off x="2831700" y="1825625"/>
-            <a:ext cx="6528600" cy="4351338"/>
-          </a:xfrm>
-        </p:spPr>
-      </p:pic>
-      <p:sp>
-        <p:nvSpPr>
-          <p:cNvPr id="4" name="Slide Number Placeholder 3">
-            <a:extLst>
-              <a:ext uri="{FF2B5EF4-FFF2-40B4-BE49-F238E27FC236}">
-                <a16:creationId xmlns:a16="http://schemas.microsoft.com/office/drawing/2014/main" id="{15521BB7-151A-46F7-A16C-E68AECDC26E1}"/>
-              </a:ext>
-            </a:extLst>
-          </p:cNvPr>
-          <p:cNvSpPr>
-            <a:spLocks noGrp="1"/>
-          </p:cNvSpPr>
-          <p:nvPr>
-            <p:ph type="sldNum" sz="quarter" idx="12"/>
-          </p:nvPr>
-        </p:nvSpPr>
-        <p:spPr/>
-        <p:txBody>
-          <a:bodyPr/>
-          <a:lstStyle/>
-          <a:p>
-            <a:fld id="{C0511E7A-FB40-414D-9CE5-8839E25420B8}" type="slidenum">
-              <a:rPr lang="en-US" smtClean="0"/>
-              <a:t>19</a:t>
-            </a:fld>
-            <a:endParaRPr lang="en-US"/>
-          </a:p>
-        </p:txBody>
-      </p:sp>
-    </p:spTree>
-    <p:extLst>
-      <p:ext uri="{BB962C8B-B14F-4D97-AF65-F5344CB8AC3E}">
-        <p14:creationId xmlns:p14="http://schemas.microsoft.com/office/powerpoint/2010/main" val="2753432089"/>
       </p:ext>
     </p:extLst>
   </p:cSld>
@@ -48469,6 +51301,129 @@
 </p:sld>
 </file>
 
+<file path=ppt/slides/slide20.xml><?xml version="1.0" encoding="utf-8"?>
+<p:sld xmlns:a="http://schemas.openxmlformats.org/drawingml/2006/main" xmlns:r="http://schemas.openxmlformats.org/officeDocument/2006/relationships" xmlns:p="http://schemas.openxmlformats.org/presentationml/2006/main">
+  <p:cSld>
+    <p:spTree>
+      <p:nvGrpSpPr>
+        <p:cNvPr id="1" name=""/>
+        <p:cNvGrpSpPr/>
+        <p:nvPr/>
+      </p:nvGrpSpPr>
+      <p:grpSpPr>
+        <a:xfrm>
+          <a:off x="0" y="0"/>
+          <a:ext cx="0" cy="0"/>
+          <a:chOff x="0" y="0"/>
+          <a:chExt cx="0" cy="0"/>
+        </a:xfrm>
+      </p:grpSpPr>
+      <p:sp>
+        <p:nvSpPr>
+          <p:cNvPr id="7" name="Title 6">
+            <a:extLst>
+              <a:ext uri="{FF2B5EF4-FFF2-40B4-BE49-F238E27FC236}">
+                <a16:creationId xmlns:a16="http://schemas.microsoft.com/office/drawing/2014/main" id="{E24B1868-EF67-4723-BF45-56E050B3232D}"/>
+              </a:ext>
+            </a:extLst>
+          </p:cNvPr>
+          <p:cNvSpPr>
+            <a:spLocks noGrp="1"/>
+          </p:cNvSpPr>
+          <p:nvPr>
+            <p:ph type="title"/>
+          </p:nvPr>
+        </p:nvSpPr>
+        <p:spPr/>
+        <p:txBody>
+          <a:bodyPr/>
+          <a:lstStyle/>
+          <a:p>
+            <a:r>
+              <a:rPr lang="ru-RU" dirty="0"/>
+              <a:t>Заключение</a:t>
+            </a:r>
+            <a:endParaRPr lang="en-US" dirty="0"/>
+          </a:p>
+        </p:txBody>
+      </p:sp>
+      <p:pic>
+        <p:nvPicPr>
+          <p:cNvPr id="10" name="Content Placeholder 9" descr="Plane on tarmac">
+            <a:extLst>
+              <a:ext uri="{FF2B5EF4-FFF2-40B4-BE49-F238E27FC236}">
+                <a16:creationId xmlns:a16="http://schemas.microsoft.com/office/drawing/2014/main" id="{A1197907-AA0A-420E-8AF8-C3447B556D83}"/>
+              </a:ext>
+            </a:extLst>
+          </p:cNvPr>
+          <p:cNvPicPr>
+            <a:picLocks noGrp="1" noChangeAspect="1"/>
+          </p:cNvPicPr>
+          <p:nvPr>
+            <p:ph idx="1"/>
+          </p:nvPr>
+        </p:nvPicPr>
+        <p:blipFill>
+          <a:blip r:embed="rId3">
+            <a:extLst>
+              <a:ext uri="{28A0092B-C50C-407E-A947-70E740481C1C}">
+                <a14:useLocalDpi xmlns:a14="http://schemas.microsoft.com/office/drawing/2010/main" val="0"/>
+              </a:ext>
+            </a:extLst>
+          </a:blip>
+          <a:stretch>
+            <a:fillRect/>
+          </a:stretch>
+        </p:blipFill>
+        <p:spPr>
+          <a:xfrm>
+            <a:off x="2831700" y="1825625"/>
+            <a:ext cx="6528600" cy="4351338"/>
+          </a:xfrm>
+        </p:spPr>
+      </p:pic>
+      <p:sp>
+        <p:nvSpPr>
+          <p:cNvPr id="4" name="Slide Number Placeholder 3">
+            <a:extLst>
+              <a:ext uri="{FF2B5EF4-FFF2-40B4-BE49-F238E27FC236}">
+                <a16:creationId xmlns:a16="http://schemas.microsoft.com/office/drawing/2014/main" id="{15521BB7-151A-46F7-A16C-E68AECDC26E1}"/>
+              </a:ext>
+            </a:extLst>
+          </p:cNvPr>
+          <p:cNvSpPr>
+            <a:spLocks noGrp="1"/>
+          </p:cNvSpPr>
+          <p:nvPr>
+            <p:ph type="sldNum" sz="quarter" idx="12"/>
+          </p:nvPr>
+        </p:nvSpPr>
+        <p:spPr/>
+        <p:txBody>
+          <a:bodyPr/>
+          <a:lstStyle/>
+          <a:p>
+            <a:fld id="{C0511E7A-FB40-414D-9CE5-8839E25420B8}" type="slidenum">
+              <a:rPr lang="en-US" smtClean="0"/>
+              <a:t>20</a:t>
+            </a:fld>
+            <a:endParaRPr lang="en-US"/>
+          </a:p>
+        </p:txBody>
+      </p:sp>
+    </p:spTree>
+    <p:extLst>
+      <p:ext uri="{BB962C8B-B14F-4D97-AF65-F5344CB8AC3E}">
+        <p14:creationId xmlns:p14="http://schemas.microsoft.com/office/powerpoint/2010/main" val="2753432089"/>
+      </p:ext>
+    </p:extLst>
+  </p:cSld>
+  <p:clrMapOvr>
+    <a:masterClrMapping/>
+  </p:clrMapOvr>
+</p:sld>
+</file>
+
 <file path=ppt/slides/slide3.xml><?xml version="1.0" encoding="utf-8"?>
 <p:sld xmlns:a="http://schemas.openxmlformats.org/drawingml/2006/main" xmlns:r="http://schemas.openxmlformats.org/officeDocument/2006/relationships" xmlns:p="http://schemas.openxmlformats.org/presentationml/2006/main">
   <p:cSld>
@@ -48500,7 +51455,7 @@
         </p:nvSpPr>
         <p:spPr>
           <a:xfrm>
-            <a:off x="2174240" y="1534160"/>
+            <a:off x="2201672" y="1534160"/>
             <a:ext cx="7254240" cy="4822190"/>
           </a:xfrm>
           <a:prstGeom prst="flowChartPredefinedProcess">
@@ -48575,7 +51530,7 @@
             <p:ph idx="1"/>
             <p:extLst>
               <p:ext uri="{D42A27DB-BD31-4B8C-83A1-F6EECF244321}">
-                <p14:modId xmlns:p14="http://schemas.microsoft.com/office/powerpoint/2010/main" val="1597130245"/>
+                <p14:modId xmlns:p14="http://schemas.microsoft.com/office/powerpoint/2010/main" val="1053980118"/>
               </p:ext>
             </p:extLst>
           </p:nvPr>
@@ -49164,7 +52119,7 @@
                                           </p:stCondLst>
                                         </p:cTn>
                                         <p:tgtEl>
-                                          <p:spTgt spid="14"/>
+                                          <p:spTgt spid="15"/>
                                         </p:tgtEl>
                                         <p:attrNameLst>
                                           <p:attrName>style.visibility</p:attrName>
@@ -49209,7 +52164,7 @@
                                           </p:stCondLst>
                                         </p:cTn>
                                         <p:tgtEl>
-                                          <p:spTgt spid="15"/>
+                                          <p:spTgt spid="14"/>
                                         </p:tgtEl>
                                         <p:attrNameLst>
                                           <p:attrName>style.visibility</p:attrName>
@@ -49963,7 +52918,7 @@
                                           </p:stCondLst>
                                         </p:cTn>
                                         <p:tgtEl>
-                                          <p:spTgt spid="15"/>
+                                          <p:spTgt spid="16"/>
                                         </p:tgtEl>
                                         <p:attrNameLst>
                                           <p:attrName>style.visibility</p:attrName>
@@ -50008,7 +52963,7 @@
                                           </p:stCondLst>
                                         </p:cTn>
                                         <p:tgtEl>
-                                          <p:spTgt spid="16"/>
+                                          <p:spTgt spid="15"/>
                                         </p:tgtEl>
                                         <p:attrNameLst>
                                           <p:attrName>style.visibility</p:attrName>

</xml_diff>

<commit_message>
update fuckup night as template
</commit_message>
<xml_diff>
--- a/2021_FuckUpNight/Presentation.pptx
+++ b/2021_FuckUpNight/Presentation.pptx
@@ -13877,7 +13877,7 @@
   <dgm:whole/>
   <dgm:extLst>
     <a:ext uri="http://schemas.microsoft.com/office/drawing/2008/diagram">
-      <dsp:dataModelExt xmlns:dsp="http://schemas.microsoft.com/office/drawing/2008/diagram" relId="rId6" minVer="http://schemas.openxmlformats.org/drawingml/2006/diagram"/>
+      <dsp:dataModelExt xmlns:dsp="http://schemas.microsoft.com/office/drawing/2008/diagram" relId="rId7" minVer="http://schemas.openxmlformats.org/drawingml/2006/diagram"/>
     </a:ext>
   </dgm:extLst>
 </dgm:dataModel>
@@ -14506,7 +14506,7 @@
   <dgm:whole/>
   <dgm:extLst>
     <a:ext uri="http://schemas.microsoft.com/office/drawing/2008/diagram">
-      <dsp:dataModelExt xmlns:dsp="http://schemas.microsoft.com/office/drawing/2008/diagram" relId="rId6" minVer="http://schemas.openxmlformats.org/drawingml/2006/diagram"/>
+      <dsp:dataModelExt xmlns:dsp="http://schemas.microsoft.com/office/drawing/2008/diagram" relId="rId7" minVer="http://schemas.openxmlformats.org/drawingml/2006/diagram"/>
     </a:ext>
   </dgm:extLst>
 </dgm:dataModel>
@@ -16242,9 +16242,9 @@
     <dgm:cxn modelId="{A6E5C129-4AB2-463A-A68D-5E4524E564A6}" srcId="{48433AD1-F49B-4FB9-83BF-4D966B1E9D0B}" destId="{20A6160E-A8EC-4CFF-A417-94B8A83F1D2F}" srcOrd="0" destOrd="0" parTransId="{C27A7EB7-7987-426E-A2A0-8EBA1C7C93CD}" sibTransId="{1D4E3362-23B4-43F5-A289-75D664A64B9B}"/>
     <dgm:cxn modelId="{3867853E-0A3A-4F25-A327-47D5000C27AA}" srcId="{55F1F739-1C78-49C9-A7F3-128D955038F8}" destId="{48433AD1-F49B-4FB9-83BF-4D966B1E9D0B}" srcOrd="1" destOrd="0" parTransId="{9FE15BF5-F02E-44CD-9B2B-D839E7FAAC3B}" sibTransId="{44D15EED-CF8E-4F8D-9671-A4574A33FC7B}"/>
     <dgm:cxn modelId="{48BF7940-E179-4864-8332-74A8A0634EFC}" type="presOf" srcId="{20A6160E-A8EC-4CFF-A417-94B8A83F1D2F}" destId="{6D616275-9F5E-4535-B6FD-A32B662DD957}" srcOrd="0" destOrd="0" presId="urn:microsoft.com/office/officeart/2009/layout/CirclePictureHierarchy"/>
+    <dgm:cxn modelId="{019E7D51-209C-4BF2-A7B4-2C5D409CE650}" srcId="{FC90D099-DFD0-4F7E-9CCF-2543C4F8FAB1}" destId="{5779FFBB-C50F-435B-B444-775E7D3CC1DC}" srcOrd="1" destOrd="0" parTransId="{F33C93D8-5B45-4CE3-B8AF-EFE65EBF8515}" sibTransId="{4E5978E7-9302-4591-A624-390F31C9E541}"/>
     <dgm:cxn modelId="{159D0164-9DC8-42C2-ABCB-032A1CAE987E}" type="presOf" srcId="{E7075A20-5841-4034-8C30-0957CB36F5B6}" destId="{2E4858A7-39D7-44B0-9149-7E290158A78D}" srcOrd="0" destOrd="0" presId="urn:microsoft.com/office/officeart/2009/layout/CirclePictureHierarchy"/>
     <dgm:cxn modelId="{8D692871-D26D-432B-81FD-B3E378C03F8D}" type="presOf" srcId="{D554FC60-C5F0-459B-B0DE-29BF977606C3}" destId="{FEDB2CB5-3F3F-4501-BBA0-ED51C20E8156}" srcOrd="0" destOrd="0" presId="urn:microsoft.com/office/officeart/2009/layout/CirclePictureHierarchy"/>
-    <dgm:cxn modelId="{019E7D51-209C-4BF2-A7B4-2C5D409CE650}" srcId="{FC90D099-DFD0-4F7E-9CCF-2543C4F8FAB1}" destId="{5779FFBB-C50F-435B-B444-775E7D3CC1DC}" srcOrd="1" destOrd="0" parTransId="{F33C93D8-5B45-4CE3-B8AF-EFE65EBF8515}" sibTransId="{4E5978E7-9302-4591-A624-390F31C9E541}"/>
     <dgm:cxn modelId="{0AD87F76-4A59-4EBB-A0DD-48E3DC78CB8B}" type="presOf" srcId="{48433AD1-F49B-4FB9-83BF-4D966B1E9D0B}" destId="{1A839164-0C7D-408B-B9BC-C9AC73276772}" srcOrd="0" destOrd="0" presId="urn:microsoft.com/office/officeart/2009/layout/CirclePictureHierarchy"/>
     <dgm:cxn modelId="{6A8C7C8E-825A-47F9-B76D-7E7DA6F78B6A}" type="presOf" srcId="{F33C93D8-5B45-4CE3-B8AF-EFE65EBF8515}" destId="{D22FB746-2AAC-4EF9-AD3E-A950E9146FCD}" srcOrd="0" destOrd="0" presId="urn:microsoft.com/office/officeart/2009/layout/CirclePictureHierarchy"/>
     <dgm:cxn modelId="{C068EDAC-3754-4096-B925-5A6B38832589}" srcId="{55F1F739-1C78-49C9-A7F3-128D955038F8}" destId="{FC90D099-DFD0-4F7E-9CCF-2543C4F8FAB1}" srcOrd="0" destOrd="0" parTransId="{6FAC2932-8F0D-4A7B-AE28-4AB5D89CDB7D}" sibTransId="{0DE1E6B3-2E7C-4652-9090-4B2442059EA1}"/>
@@ -16843,9 +16843,9 @@
     <dgm:cxn modelId="{A6E5C129-4AB2-463A-A68D-5E4524E564A6}" srcId="{48433AD1-F49B-4FB9-83BF-4D966B1E9D0B}" destId="{20A6160E-A8EC-4CFF-A417-94B8A83F1D2F}" srcOrd="0" destOrd="0" parTransId="{C27A7EB7-7987-426E-A2A0-8EBA1C7C93CD}" sibTransId="{1D4E3362-23B4-43F5-A289-75D664A64B9B}"/>
     <dgm:cxn modelId="{3867853E-0A3A-4F25-A327-47D5000C27AA}" srcId="{55F1F739-1C78-49C9-A7F3-128D955038F8}" destId="{48433AD1-F49B-4FB9-83BF-4D966B1E9D0B}" srcOrd="1" destOrd="0" parTransId="{9FE15BF5-F02E-44CD-9B2B-D839E7FAAC3B}" sibTransId="{44D15EED-CF8E-4F8D-9671-A4574A33FC7B}"/>
     <dgm:cxn modelId="{48BF7940-E179-4864-8332-74A8A0634EFC}" type="presOf" srcId="{20A6160E-A8EC-4CFF-A417-94B8A83F1D2F}" destId="{6D616275-9F5E-4535-B6FD-A32B662DD957}" srcOrd="0" destOrd="0" presId="urn:microsoft.com/office/officeart/2009/layout/CirclePictureHierarchy"/>
+    <dgm:cxn modelId="{019E7D51-209C-4BF2-A7B4-2C5D409CE650}" srcId="{FC90D099-DFD0-4F7E-9CCF-2543C4F8FAB1}" destId="{5779FFBB-C50F-435B-B444-775E7D3CC1DC}" srcOrd="1" destOrd="0" parTransId="{F33C93D8-5B45-4CE3-B8AF-EFE65EBF8515}" sibTransId="{4E5978E7-9302-4591-A624-390F31C9E541}"/>
     <dgm:cxn modelId="{159D0164-9DC8-42C2-ABCB-032A1CAE987E}" type="presOf" srcId="{E7075A20-5841-4034-8C30-0957CB36F5B6}" destId="{2E4858A7-39D7-44B0-9149-7E290158A78D}" srcOrd="0" destOrd="0" presId="urn:microsoft.com/office/officeart/2009/layout/CirclePictureHierarchy"/>
     <dgm:cxn modelId="{8D692871-D26D-432B-81FD-B3E378C03F8D}" type="presOf" srcId="{D554FC60-C5F0-459B-B0DE-29BF977606C3}" destId="{FEDB2CB5-3F3F-4501-BBA0-ED51C20E8156}" srcOrd="0" destOrd="0" presId="urn:microsoft.com/office/officeart/2009/layout/CirclePictureHierarchy"/>
-    <dgm:cxn modelId="{019E7D51-209C-4BF2-A7B4-2C5D409CE650}" srcId="{FC90D099-DFD0-4F7E-9CCF-2543C4F8FAB1}" destId="{5779FFBB-C50F-435B-B444-775E7D3CC1DC}" srcOrd="1" destOrd="0" parTransId="{F33C93D8-5B45-4CE3-B8AF-EFE65EBF8515}" sibTransId="{4E5978E7-9302-4591-A624-390F31C9E541}"/>
     <dgm:cxn modelId="{0AD87F76-4A59-4EBB-A0DD-48E3DC78CB8B}" type="presOf" srcId="{48433AD1-F49B-4FB9-83BF-4D966B1E9D0B}" destId="{1A839164-0C7D-408B-B9BC-C9AC73276772}" srcOrd="0" destOrd="0" presId="urn:microsoft.com/office/officeart/2009/layout/CirclePictureHierarchy"/>
     <dgm:cxn modelId="{6A8C7C8E-825A-47F9-B76D-7E7DA6F78B6A}" type="presOf" srcId="{F33C93D8-5B45-4CE3-B8AF-EFE65EBF8515}" destId="{D22FB746-2AAC-4EF9-AD3E-A950E9146FCD}" srcOrd="0" destOrd="0" presId="urn:microsoft.com/office/officeart/2009/layout/CirclePictureHierarchy"/>
     <dgm:cxn modelId="{C068EDAC-3754-4096-B925-5A6B38832589}" srcId="{55F1F739-1C78-49C9-A7F3-128D955038F8}" destId="{FC90D099-DFD0-4F7E-9CCF-2543C4F8FAB1}" srcOrd="0" destOrd="0" parTransId="{6FAC2932-8F0D-4A7B-AE28-4AB5D89CDB7D}" sibTransId="{0DE1E6B3-2E7C-4652-9090-4B2442059EA1}"/>
@@ -43869,7 +43869,7 @@
           <a:p>
             <a:fld id="{83B82F2E-7BF0-4478-B30F-6DC8BF0B2F06}" type="datetimeFigureOut">
               <a:rPr lang="en-US" smtClean="0"/>
-              <a:t>2021-11-05</a:t>
+              <a:t>11/29/21</a:t>
             </a:fld>
             <a:endParaRPr lang="en-US"/>
           </a:p>
@@ -44268,6 +44268,94 @@
           <a:bodyPr/>
           <a:lstStyle/>
           <a:p>
+            <a:r>
+              <a:rPr lang="ru-RU" dirty="0"/>
+              <a:t>Чтобы нарушать правила, их надо знать</a:t>
+            </a:r>
+            <a:endParaRPr lang="en-RU" dirty="0"/>
+          </a:p>
+        </p:txBody>
+      </p:sp>
+      <p:sp>
+        <p:nvSpPr>
+          <p:cNvPr id="4" name="Slide Number Placeholder 3"/>
+          <p:cNvSpPr>
+            <a:spLocks noGrp="1"/>
+          </p:cNvSpPr>
+          <p:nvPr>
+            <p:ph type="sldNum" sz="quarter" idx="5"/>
+          </p:nvPr>
+        </p:nvSpPr>
+        <p:spPr/>
+        <p:txBody>
+          <a:bodyPr/>
+          <a:lstStyle/>
+          <a:p>
+            <a:fld id="{B6F10287-B1A7-4952-A817-DFE375B7FB46}" type="slidenum">
+              <a:rPr lang="en-US" smtClean="0"/>
+              <a:t>17</a:t>
+            </a:fld>
+            <a:endParaRPr lang="en-US"/>
+          </a:p>
+        </p:txBody>
+      </p:sp>
+    </p:spTree>
+    <p:extLst>
+      <p:ext uri="{BB962C8B-B14F-4D97-AF65-F5344CB8AC3E}">
+        <p14:creationId xmlns:p14="http://schemas.microsoft.com/office/powerpoint/2010/main" val="3894988844"/>
+      </p:ext>
+    </p:extLst>
+  </p:cSld>
+  <p:clrMapOvr>
+    <a:masterClrMapping/>
+  </p:clrMapOvr>
+</p:notes>
+</file>
+
+<file path=ppt/notesSlides/notesSlide11.xml><?xml version="1.0" encoding="utf-8"?>
+<p:notes xmlns:a="http://schemas.openxmlformats.org/drawingml/2006/main" xmlns:r="http://schemas.openxmlformats.org/officeDocument/2006/relationships" xmlns:p="http://schemas.openxmlformats.org/presentationml/2006/main">
+  <p:cSld>
+    <p:spTree>
+      <p:nvGrpSpPr>
+        <p:cNvPr id="1" name=""/>
+        <p:cNvGrpSpPr/>
+        <p:nvPr/>
+      </p:nvGrpSpPr>
+      <p:grpSpPr>
+        <a:xfrm>
+          <a:off x="0" y="0"/>
+          <a:ext cx="0" cy="0"/>
+          <a:chOff x="0" y="0"/>
+          <a:chExt cx="0" cy="0"/>
+        </a:xfrm>
+      </p:grpSpPr>
+      <p:sp>
+        <p:nvSpPr>
+          <p:cNvPr id="2" name="Slide Image Placeholder 1"/>
+          <p:cNvSpPr>
+            <a:spLocks noGrp="1" noRot="1" noChangeAspect="1"/>
+          </p:cNvSpPr>
+          <p:nvPr>
+            <p:ph type="sldImg"/>
+          </p:nvPr>
+        </p:nvSpPr>
+        <p:spPr/>
+      </p:sp>
+      <p:sp>
+        <p:nvSpPr>
+          <p:cNvPr id="3" name="Notes Placeholder 2"/>
+          <p:cNvSpPr>
+            <a:spLocks noGrp="1"/>
+          </p:cNvSpPr>
+          <p:nvPr>
+            <p:ph type="body" idx="1"/>
+          </p:nvPr>
+        </p:nvSpPr>
+        <p:spPr/>
+        <p:txBody>
+          <a:bodyPr/>
+          <a:lstStyle/>
+          <a:p>
             <a:endParaRPr lang="en-US" dirty="0"/>
           </a:p>
         </p:txBody>
@@ -44308,7 +44396,91 @@
 </p:notes>
 </file>
 
-<file path=ppt/notesSlides/notesSlide11.xml><?xml version="1.0" encoding="utf-8"?>
+<file path=ppt/notesSlides/notesSlide12.xml><?xml version="1.0" encoding="utf-8"?>
+<p:notes xmlns:a="http://schemas.openxmlformats.org/drawingml/2006/main" xmlns:r="http://schemas.openxmlformats.org/officeDocument/2006/relationships" xmlns:p="http://schemas.openxmlformats.org/presentationml/2006/main">
+  <p:cSld>
+    <p:spTree>
+      <p:nvGrpSpPr>
+        <p:cNvPr id="1" name=""/>
+        <p:cNvGrpSpPr/>
+        <p:nvPr/>
+      </p:nvGrpSpPr>
+      <p:grpSpPr>
+        <a:xfrm>
+          <a:off x="0" y="0"/>
+          <a:ext cx="0" cy="0"/>
+          <a:chOff x="0" y="0"/>
+          <a:chExt cx="0" cy="0"/>
+        </a:xfrm>
+      </p:grpSpPr>
+      <p:sp>
+        <p:nvSpPr>
+          <p:cNvPr id="2" name="Slide Image Placeholder 1"/>
+          <p:cNvSpPr>
+            <a:spLocks noGrp="1" noRot="1" noChangeAspect="1"/>
+          </p:cNvSpPr>
+          <p:nvPr>
+            <p:ph type="sldImg"/>
+          </p:nvPr>
+        </p:nvSpPr>
+        <p:spPr/>
+      </p:sp>
+      <p:sp>
+        <p:nvSpPr>
+          <p:cNvPr id="3" name="Notes Placeholder 2"/>
+          <p:cNvSpPr>
+            <a:spLocks noGrp="1"/>
+          </p:cNvSpPr>
+          <p:nvPr>
+            <p:ph type="body" idx="1"/>
+          </p:nvPr>
+        </p:nvSpPr>
+        <p:spPr/>
+        <p:txBody>
+          <a:bodyPr/>
+          <a:lstStyle/>
+          <a:p>
+            <a:endParaRPr lang="en-RU" dirty="0"/>
+          </a:p>
+        </p:txBody>
+      </p:sp>
+      <p:sp>
+        <p:nvSpPr>
+          <p:cNvPr id="4" name="Slide Number Placeholder 3"/>
+          <p:cNvSpPr>
+            <a:spLocks noGrp="1"/>
+          </p:cNvSpPr>
+          <p:nvPr>
+            <p:ph type="sldNum" sz="quarter" idx="5"/>
+          </p:nvPr>
+        </p:nvSpPr>
+        <p:spPr/>
+        <p:txBody>
+          <a:bodyPr/>
+          <a:lstStyle/>
+          <a:p>
+            <a:fld id="{B6F10287-B1A7-4952-A817-DFE375B7FB46}" type="slidenum">
+              <a:rPr lang="en-US" smtClean="0"/>
+              <a:t>19</a:t>
+            </a:fld>
+            <a:endParaRPr lang="en-US"/>
+          </a:p>
+        </p:txBody>
+      </p:sp>
+    </p:spTree>
+    <p:extLst>
+      <p:ext uri="{BB962C8B-B14F-4D97-AF65-F5344CB8AC3E}">
+        <p14:creationId xmlns:p14="http://schemas.microsoft.com/office/powerpoint/2010/main" val="4072326943"/>
+      </p:ext>
+    </p:extLst>
+  </p:cSld>
+  <p:clrMapOvr>
+    <a:masterClrMapping/>
+  </p:clrMapOvr>
+</p:notes>
+</file>
+
+<file path=ppt/notesSlides/notesSlide13.xml><?xml version="1.0" encoding="utf-8"?>
 <p:notes xmlns:a="http://schemas.openxmlformats.org/drawingml/2006/main" xmlns:r="http://schemas.openxmlformats.org/officeDocument/2006/relationships" xmlns:p="http://schemas.openxmlformats.org/presentationml/2006/main">
   <p:cSld>
     <p:spTree>
@@ -45276,9 +45448,9 @@
           <a:bodyPr/>
           <a:lstStyle/>
           <a:p>
-            <a:fld id="{838550C6-B700-4010-A128-436CD12A3E28}" type="datetime1">
-              <a:rPr lang="en-US" smtClean="0"/>
-              <a:t>2021-11-05</a:t>
+            <a:fld id="{F333CE8A-A12F-3148-8608-57A952B97E83}" type="datetime1">
+              <a:rPr lang="ru-RU" smtClean="0"/>
+              <a:t>30.11.2021</a:t>
             </a:fld>
             <a:endParaRPr lang="en-US"/>
           </a:p>
@@ -45474,9 +45646,9 @@
           <a:bodyPr/>
           <a:lstStyle/>
           <a:p>
-            <a:fld id="{4AEF2539-0B99-4BE6-867B-AF5F5CC16E2A}" type="datetime1">
-              <a:rPr lang="en-US" smtClean="0"/>
-              <a:t>2021-11-05</a:t>
+            <a:fld id="{04907ED0-36BE-9C40-9AB0-03813AA24D42}" type="datetime1">
+              <a:rPr lang="ru-RU" smtClean="0"/>
+              <a:t>30.11.2021</a:t>
             </a:fld>
             <a:endParaRPr lang="en-US"/>
           </a:p>
@@ -45682,9 +45854,9 @@
           <a:bodyPr/>
           <a:lstStyle/>
           <a:p>
-            <a:fld id="{AA20639D-DE06-4714-A2DD-7BE4DEFA6620}" type="datetime1">
-              <a:rPr lang="en-US" smtClean="0"/>
-              <a:t>2021-11-05</a:t>
+            <a:fld id="{5EB9DD01-CE66-514E-8A77-155085C60F6D}" type="datetime1">
+              <a:rPr lang="ru-RU" smtClean="0"/>
+              <a:t>30.11.2021</a:t>
             </a:fld>
             <a:endParaRPr lang="en-US"/>
           </a:p>
@@ -45880,9 +46052,9 @@
           <a:bodyPr/>
           <a:lstStyle/>
           <a:p>
-            <a:fld id="{7CE3065D-3EB2-4AB6-9A73-6741DBC19012}" type="datetime1">
-              <a:rPr lang="en-US" smtClean="0"/>
-              <a:t>2021-11-05</a:t>
+            <a:fld id="{91D688C2-A7FD-F84C-9596-60ED16766B45}" type="datetime1">
+              <a:rPr lang="ru-RU" smtClean="0"/>
+              <a:t>30.11.2021</a:t>
             </a:fld>
             <a:endParaRPr lang="en-US"/>
           </a:p>
@@ -46155,9 +46327,9 @@
           <a:bodyPr/>
           <a:lstStyle/>
           <a:p>
-            <a:fld id="{F5B98698-9691-4BBC-8346-4023DC940402}" type="datetime1">
-              <a:rPr lang="en-US" smtClean="0"/>
-              <a:t>2021-11-05</a:t>
+            <a:fld id="{3D66877A-3A8D-7648-8013-F8B36E37AC63}" type="datetime1">
+              <a:rPr lang="ru-RU" smtClean="0"/>
+              <a:t>30.11.2021</a:t>
             </a:fld>
             <a:endParaRPr lang="en-US"/>
           </a:p>
@@ -46420,9 +46592,9 @@
           <a:bodyPr/>
           <a:lstStyle/>
           <a:p>
-            <a:fld id="{A62108FF-6B6B-4956-8BDB-A173EC229641}" type="datetime1">
-              <a:rPr lang="en-US" smtClean="0"/>
-              <a:t>2021-11-05</a:t>
+            <a:fld id="{1AAAD36A-A5DD-A948-8884-09E209B05CC2}" type="datetime1">
+              <a:rPr lang="ru-RU" smtClean="0"/>
+              <a:t>30.11.2021</a:t>
             </a:fld>
             <a:endParaRPr lang="en-US"/>
           </a:p>
@@ -46832,9 +47004,9 @@
           <a:bodyPr/>
           <a:lstStyle/>
           <a:p>
-            <a:fld id="{B00B79BE-572B-4DFD-B3A5-62A1D591CEE0}" type="datetime1">
-              <a:rPr lang="en-US" smtClean="0"/>
-              <a:t>2021-11-05</a:t>
+            <a:fld id="{1599FE76-A7FB-2444-BA3E-04D761501ACE}" type="datetime1">
+              <a:rPr lang="ru-RU" smtClean="0"/>
+              <a:t>30.11.2021</a:t>
             </a:fld>
             <a:endParaRPr lang="en-US"/>
           </a:p>
@@ -46973,9 +47145,9 @@
           <a:bodyPr/>
           <a:lstStyle/>
           <a:p>
-            <a:fld id="{6793535B-05D0-41A1-BA02-10BC42F2B02D}" type="datetime1">
-              <a:rPr lang="en-US" smtClean="0"/>
-              <a:t>2021-11-05</a:t>
+            <a:fld id="{9024F748-F912-454C-A838-B0775F4E455A}" type="datetime1">
+              <a:rPr lang="ru-RU" smtClean="0"/>
+              <a:t>30.11.2021</a:t>
             </a:fld>
             <a:endParaRPr lang="en-US"/>
           </a:p>
@@ -47086,9 +47258,9 @@
           <a:bodyPr/>
           <a:lstStyle/>
           <a:p>
-            <a:fld id="{CFAA7C6A-169A-4D40-8F33-4C784E98E1A4}" type="datetime1">
-              <a:rPr lang="en-US" smtClean="0"/>
-              <a:t>2021-11-05</a:t>
+            <a:fld id="{E555E7B7-F9DD-654B-83D2-890442C45AE6}" type="datetime1">
+              <a:rPr lang="ru-RU" smtClean="0"/>
+              <a:t>30.11.2021</a:t>
             </a:fld>
             <a:endParaRPr lang="en-US"/>
           </a:p>
@@ -47397,9 +47569,9 @@
           <a:bodyPr/>
           <a:lstStyle/>
           <a:p>
-            <a:fld id="{EEC83A40-97F0-472C-BDC2-592D41FF3468}" type="datetime1">
-              <a:rPr lang="en-US" smtClean="0"/>
-              <a:t>2021-11-05</a:t>
+            <a:fld id="{1EE0C4C6-77D3-1447-8DAD-6FA3CB678846}" type="datetime1">
+              <a:rPr lang="ru-RU" smtClean="0"/>
+              <a:t>30.11.2021</a:t>
             </a:fld>
             <a:endParaRPr lang="en-US"/>
           </a:p>
@@ -47688,9 +47860,9 @@
           <a:bodyPr/>
           <a:lstStyle/>
           <a:p>
-            <a:fld id="{CBE839F0-C029-4840-B6B5-DD225AC2619B}" type="datetime1">
-              <a:rPr lang="en-US" smtClean="0"/>
-              <a:t>2021-11-05</a:t>
+            <a:fld id="{186068DF-5E4D-A24C-BD4B-947BFAA34EF4}" type="datetime1">
+              <a:rPr lang="ru-RU" smtClean="0"/>
+              <a:t>30.11.2021</a:t>
             </a:fld>
             <a:endParaRPr lang="en-US"/>
           </a:p>
@@ -47929,9 +48101,9 @@
             </a:lvl1pPr>
           </a:lstStyle>
           <a:p>
-            <a:fld id="{3D507592-AC47-4ACC-AC8C-38BE4BF7CBB1}" type="datetime1">
-              <a:rPr lang="en-US" smtClean="0"/>
-              <a:t>2021-11-05</a:t>
+            <a:fld id="{57A33E42-2AAF-0940-8049-FD359BC7009B}" type="datetime1">
+              <a:rPr lang="ru-RU" smtClean="0"/>
+              <a:t>30.11.2021</a:t>
             </a:fld>
             <a:endParaRPr lang="en-US"/>
           </a:p>
@@ -48048,7 +48220,7 @@
     <p:sldLayoutId id="2147483658" r:id="rId10"/>
     <p:sldLayoutId id="2147483659" r:id="rId11"/>
   </p:sldLayoutIdLst>
-  <p:hf hdr="0" ftr="0" dt="0"/>
+  <p:hf sldNum="0" hdr="0" ftr="0" dt="0"/>
   <p:txStyles>
     <p:titleStyle>
       <a:lvl1pPr algn="l" defTabSz="914400" rtl="0" eaLnBrk="1" latinLnBrk="0" hangingPunct="1">
@@ -48401,36 +48573,7 @@
           <a:bodyPr/>
           <a:lstStyle/>
           <a:p>
-            <a:endParaRPr lang="en-US"/>
-          </a:p>
-        </p:txBody>
-      </p:sp>
-      <p:sp>
-        <p:nvSpPr>
-          <p:cNvPr id="4" name="Slide Number Placeholder 3">
-            <a:extLst>
-              <a:ext uri="{FF2B5EF4-FFF2-40B4-BE49-F238E27FC236}">
-                <a16:creationId xmlns:a16="http://schemas.microsoft.com/office/drawing/2014/main" id="{A5E09B57-E867-4B0B-BBA5-AF2ACB369DEB}"/>
-              </a:ext>
-            </a:extLst>
-          </p:cNvPr>
-          <p:cNvSpPr>
-            <a:spLocks noGrp="1"/>
-          </p:cNvSpPr>
-          <p:nvPr>
-            <p:ph type="sldNum" sz="quarter" idx="12"/>
-          </p:nvPr>
-        </p:nvSpPr>
-        <p:spPr/>
-        <p:txBody>
-          <a:bodyPr/>
-          <a:lstStyle/>
-          <a:p>
-            <a:fld id="{C0511E7A-FB40-414D-9CE5-8839E25420B8}" type="slidenum">
-              <a:rPr lang="en-US" smtClean="0"/>
-              <a:t>1</a:t>
-            </a:fld>
-            <a:endParaRPr lang="en-US"/>
+            <a:endParaRPr lang="en-US" dirty="0"/>
           </a:p>
         </p:txBody>
       </p:sp>
@@ -48519,35 +48662,6 @@
           </a:graphicData>
         </a:graphic>
       </p:graphicFrame>
-      <p:sp>
-        <p:nvSpPr>
-          <p:cNvPr id="4" name="Slide Number Placeholder 3">
-            <a:extLst>
-              <a:ext uri="{FF2B5EF4-FFF2-40B4-BE49-F238E27FC236}">
-                <a16:creationId xmlns:a16="http://schemas.microsoft.com/office/drawing/2014/main" id="{BCECDA63-B565-4FED-8757-55394339B960}"/>
-              </a:ext>
-            </a:extLst>
-          </p:cNvPr>
-          <p:cNvSpPr>
-            <a:spLocks noGrp="1"/>
-          </p:cNvSpPr>
-          <p:nvPr>
-            <p:ph type="sldNum" sz="quarter" idx="12"/>
-          </p:nvPr>
-        </p:nvSpPr>
-        <p:spPr/>
-        <p:txBody>
-          <a:bodyPr/>
-          <a:lstStyle/>
-          <a:p>
-            <a:fld id="{C0511E7A-FB40-414D-9CE5-8839E25420B8}" type="slidenum">
-              <a:rPr lang="en-US" smtClean="0"/>
-              <a:t>10</a:t>
-            </a:fld>
-            <a:endParaRPr lang="en-US"/>
-          </a:p>
-        </p:txBody>
-      </p:sp>
     </p:spTree>
     <p:extLst>
       <p:ext uri="{BB962C8B-B14F-4D97-AF65-F5344CB8AC3E}">
@@ -48697,35 +48811,6 @@
           </a:p>
           <a:p>
             <a:endParaRPr lang="en-US" dirty="0"/>
-          </a:p>
-        </p:txBody>
-      </p:sp>
-      <p:sp>
-        <p:nvSpPr>
-          <p:cNvPr id="4" name="Slide Number Placeholder 3">
-            <a:extLst>
-              <a:ext uri="{FF2B5EF4-FFF2-40B4-BE49-F238E27FC236}">
-                <a16:creationId xmlns:a16="http://schemas.microsoft.com/office/drawing/2014/main" id="{F0A8F125-4BA7-4B46-A24E-BD88C9F0DB76}"/>
-              </a:ext>
-            </a:extLst>
-          </p:cNvPr>
-          <p:cNvSpPr>
-            <a:spLocks noGrp="1"/>
-          </p:cNvSpPr>
-          <p:nvPr>
-            <p:ph type="sldNum" sz="quarter" idx="12"/>
-          </p:nvPr>
-        </p:nvSpPr>
-        <p:spPr/>
-        <p:txBody>
-          <a:bodyPr/>
-          <a:lstStyle/>
-          <a:p>
-            <a:fld id="{C0511E7A-FB40-414D-9CE5-8839E25420B8}" type="slidenum">
-              <a:rPr lang="en-US" smtClean="0"/>
-              <a:t>11</a:t>
-            </a:fld>
-            <a:endParaRPr lang="en-US"/>
           </a:p>
         </p:txBody>
       </p:sp>
@@ -49039,35 +49124,6 @@
               <a:t>из цепочки)</a:t>
             </a:r>
             <a:endParaRPr lang="en-US" dirty="0"/>
-          </a:p>
-        </p:txBody>
-      </p:sp>
-      <p:sp>
-        <p:nvSpPr>
-          <p:cNvPr id="4" name="Slide Number Placeholder 3">
-            <a:extLst>
-              <a:ext uri="{FF2B5EF4-FFF2-40B4-BE49-F238E27FC236}">
-                <a16:creationId xmlns:a16="http://schemas.microsoft.com/office/drawing/2014/main" id="{4D362FB8-A07E-40E1-8984-ACFC780BDC69}"/>
-              </a:ext>
-            </a:extLst>
-          </p:cNvPr>
-          <p:cNvSpPr>
-            <a:spLocks noGrp="1"/>
-          </p:cNvSpPr>
-          <p:nvPr>
-            <p:ph type="sldNum" sz="quarter" idx="12"/>
-          </p:nvPr>
-        </p:nvSpPr>
-        <p:spPr/>
-        <p:txBody>
-          <a:bodyPr/>
-          <a:lstStyle/>
-          <a:p>
-            <a:fld id="{C0511E7A-FB40-414D-9CE5-8839E25420B8}" type="slidenum">
-              <a:rPr lang="en-US" smtClean="0"/>
-              <a:t>12</a:t>
-            </a:fld>
-            <a:endParaRPr lang="en-US"/>
           </a:p>
         </p:txBody>
       </p:sp>
@@ -49466,35 +49522,6 @@
           </a:p>
         </p:txBody>
       </p:sp>
-      <p:sp>
-        <p:nvSpPr>
-          <p:cNvPr id="4" name="Slide Number Placeholder 3">
-            <a:extLst>
-              <a:ext uri="{FF2B5EF4-FFF2-40B4-BE49-F238E27FC236}">
-                <a16:creationId xmlns:a16="http://schemas.microsoft.com/office/drawing/2014/main" id="{D4B5C780-AAE0-435F-AB67-BA6AFA018E0A}"/>
-              </a:ext>
-            </a:extLst>
-          </p:cNvPr>
-          <p:cNvSpPr>
-            <a:spLocks noGrp="1"/>
-          </p:cNvSpPr>
-          <p:nvPr>
-            <p:ph type="sldNum" sz="quarter" idx="12"/>
-          </p:nvPr>
-        </p:nvSpPr>
-        <p:spPr/>
-        <p:txBody>
-          <a:bodyPr/>
-          <a:lstStyle/>
-          <a:p>
-            <a:fld id="{C0511E7A-FB40-414D-9CE5-8839E25420B8}" type="slidenum">
-              <a:rPr lang="en-US" smtClean="0"/>
-              <a:t>13</a:t>
-            </a:fld>
-            <a:endParaRPr lang="en-US"/>
-          </a:p>
-        </p:txBody>
-      </p:sp>
       <p:pic>
         <p:nvPicPr>
           <p:cNvPr id="17" name="Content Placeholder 16" descr="Baby with solid fill">
@@ -49847,35 +49874,6 @@
           </a:graphicData>
         </a:graphic>
       </p:graphicFrame>
-      <p:sp>
-        <p:nvSpPr>
-          <p:cNvPr id="4" name="Slide Number Placeholder 3">
-            <a:extLst>
-              <a:ext uri="{FF2B5EF4-FFF2-40B4-BE49-F238E27FC236}">
-                <a16:creationId xmlns:a16="http://schemas.microsoft.com/office/drawing/2014/main" id="{F0300049-12AD-4E7B-8C52-F185648205DF}"/>
-              </a:ext>
-            </a:extLst>
-          </p:cNvPr>
-          <p:cNvSpPr>
-            <a:spLocks noGrp="1"/>
-          </p:cNvSpPr>
-          <p:nvPr>
-            <p:ph type="sldNum" sz="quarter" idx="12"/>
-          </p:nvPr>
-        </p:nvSpPr>
-        <p:spPr/>
-        <p:txBody>
-          <a:bodyPr/>
-          <a:lstStyle/>
-          <a:p>
-            <a:fld id="{C0511E7A-FB40-414D-9CE5-8839E25420B8}" type="slidenum">
-              <a:rPr lang="en-US" smtClean="0"/>
-              <a:t>14</a:t>
-            </a:fld>
-            <a:endParaRPr lang="en-US"/>
-          </a:p>
-        </p:txBody>
-      </p:sp>
       <p:cxnSp>
         <p:nvCxnSpPr>
           <p:cNvPr id="7" name="Straight Arrow Connector 6">
@@ -50110,35 +50108,6 @@
           </a:p>
         </p:txBody>
       </p:sp>
-      <p:sp>
-        <p:nvSpPr>
-          <p:cNvPr id="4" name="Slide Number Placeholder 3">
-            <a:extLst>
-              <a:ext uri="{FF2B5EF4-FFF2-40B4-BE49-F238E27FC236}">
-                <a16:creationId xmlns:a16="http://schemas.microsoft.com/office/drawing/2014/main" id="{BCECDA63-B565-4FED-8757-55394339B960}"/>
-              </a:ext>
-            </a:extLst>
-          </p:cNvPr>
-          <p:cNvSpPr>
-            <a:spLocks noGrp="1"/>
-          </p:cNvSpPr>
-          <p:nvPr>
-            <p:ph type="sldNum" sz="quarter" idx="12"/>
-          </p:nvPr>
-        </p:nvSpPr>
-        <p:spPr/>
-        <p:txBody>
-          <a:bodyPr/>
-          <a:lstStyle/>
-          <a:p>
-            <a:fld id="{C0511E7A-FB40-414D-9CE5-8839E25420B8}" type="slidenum">
-              <a:rPr lang="en-US" smtClean="0"/>
-              <a:t>15</a:t>
-            </a:fld>
-            <a:endParaRPr lang="en-US"/>
-          </a:p>
-        </p:txBody>
-      </p:sp>
     </p:spTree>
     <p:extLst>
       <p:ext uri="{BB962C8B-B14F-4D97-AF65-F5344CB8AC3E}">
@@ -50259,35 +50228,6 @@
               <a:t>...</a:t>
             </a:r>
             <a:endParaRPr lang="en-US" dirty="0"/>
-          </a:p>
-        </p:txBody>
-      </p:sp>
-      <p:sp>
-        <p:nvSpPr>
-          <p:cNvPr id="7" name="Slide Number Placeholder 6">
-            <a:extLst>
-              <a:ext uri="{FF2B5EF4-FFF2-40B4-BE49-F238E27FC236}">
-                <a16:creationId xmlns:a16="http://schemas.microsoft.com/office/drawing/2014/main" id="{7B056B9E-E0FA-4AF8-B1D2-E7679F62C7A0}"/>
-              </a:ext>
-            </a:extLst>
-          </p:cNvPr>
-          <p:cNvSpPr>
-            <a:spLocks noGrp="1"/>
-          </p:cNvSpPr>
-          <p:nvPr>
-            <p:ph type="sldNum" sz="quarter" idx="12"/>
-          </p:nvPr>
-        </p:nvSpPr>
-        <p:spPr/>
-        <p:txBody>
-          <a:bodyPr/>
-          <a:lstStyle/>
-          <a:p>
-            <a:fld id="{C0511E7A-FB40-414D-9CE5-8839E25420B8}" type="slidenum">
-              <a:rPr lang="en-US" smtClean="0"/>
-              <a:t>16</a:t>
-            </a:fld>
-            <a:endParaRPr lang="en-US"/>
           </a:p>
         </p:txBody>
       </p:sp>
@@ -50613,35 +50553,6 @@
           </a:p>
         </p:txBody>
       </p:sp>
-      <p:sp>
-        <p:nvSpPr>
-          <p:cNvPr id="4" name="Slide Number Placeholder 3">
-            <a:extLst>
-              <a:ext uri="{FF2B5EF4-FFF2-40B4-BE49-F238E27FC236}">
-                <a16:creationId xmlns:a16="http://schemas.microsoft.com/office/drawing/2014/main" id="{FEC295F8-C79B-46FF-BDE7-973AB411DFE8}"/>
-              </a:ext>
-            </a:extLst>
-          </p:cNvPr>
-          <p:cNvSpPr>
-            <a:spLocks noGrp="1"/>
-          </p:cNvSpPr>
-          <p:nvPr>
-            <p:ph type="sldNum" sz="quarter" idx="12"/>
-          </p:nvPr>
-        </p:nvSpPr>
-        <p:spPr/>
-        <p:txBody>
-          <a:bodyPr/>
-          <a:lstStyle/>
-          <a:p>
-            <a:fld id="{C0511E7A-FB40-414D-9CE5-8839E25420B8}" type="slidenum">
-              <a:rPr lang="en-US" smtClean="0"/>
-              <a:t>17</a:t>
-            </a:fld>
-            <a:endParaRPr lang="en-US"/>
-          </a:p>
-        </p:txBody>
-      </p:sp>
       <p:graphicFrame>
         <p:nvGraphicFramePr>
           <p:cNvPr id="5" name="Content Placeholder 4">
@@ -50669,7 +50580,7 @@
         </p:xfrm>
         <a:graphic>
           <a:graphicData uri="http://schemas.openxmlformats.org/drawingml/2006/diagram">
-            <dgm:relIds xmlns:dgm="http://schemas.openxmlformats.org/drawingml/2006/diagram" xmlns:r="http://schemas.openxmlformats.org/officeDocument/2006/relationships" r:dm="rId2" r:lo="rId3" r:qs="rId4" r:cs="rId5"/>
+            <dgm:relIds xmlns:dgm="http://schemas.openxmlformats.org/drawingml/2006/diagram" xmlns:r="http://schemas.openxmlformats.org/officeDocument/2006/relationships" r:dm="rId3" r:lo="rId4" r:qs="rId5" r:cs="rId6"/>
           </a:graphicData>
         </a:graphic>
       </p:graphicFrame>
@@ -50895,35 +50806,6 @@
       </p:graphicFrame>
       <p:sp>
         <p:nvSpPr>
-          <p:cNvPr id="4" name="Slide Number Placeholder 3">
-            <a:extLst>
-              <a:ext uri="{FF2B5EF4-FFF2-40B4-BE49-F238E27FC236}">
-                <a16:creationId xmlns:a16="http://schemas.microsoft.com/office/drawing/2014/main" id="{BCECDA63-B565-4FED-8757-55394339B960}"/>
-              </a:ext>
-            </a:extLst>
-          </p:cNvPr>
-          <p:cNvSpPr>
-            <a:spLocks noGrp="1"/>
-          </p:cNvSpPr>
-          <p:nvPr>
-            <p:ph type="sldNum" sz="quarter" idx="12"/>
-          </p:nvPr>
-        </p:nvSpPr>
-        <p:spPr/>
-        <p:txBody>
-          <a:bodyPr/>
-          <a:lstStyle/>
-          <a:p>
-            <a:fld id="{C0511E7A-FB40-414D-9CE5-8839E25420B8}" type="slidenum">
-              <a:rPr lang="en-US" smtClean="0"/>
-              <a:t>18</a:t>
-            </a:fld>
-            <a:endParaRPr lang="en-US"/>
-          </a:p>
-        </p:txBody>
-      </p:sp>
-      <p:sp>
-        <p:nvSpPr>
           <p:cNvPr id="5" name="&quot;Not Allowed&quot; Symbol 4">
             <a:extLst>
               <a:ext uri="{FF2B5EF4-FFF2-40B4-BE49-F238E27FC236}">
@@ -51136,39 +51018,10 @@
         </p:xfrm>
         <a:graphic>
           <a:graphicData uri="http://schemas.openxmlformats.org/drawingml/2006/diagram">
-            <dgm:relIds xmlns:dgm="http://schemas.openxmlformats.org/drawingml/2006/diagram" xmlns:r="http://schemas.openxmlformats.org/officeDocument/2006/relationships" r:dm="rId2" r:lo="rId3" r:qs="rId4" r:cs="rId5"/>
+            <dgm:relIds xmlns:dgm="http://schemas.openxmlformats.org/drawingml/2006/diagram" xmlns:r="http://schemas.openxmlformats.org/officeDocument/2006/relationships" r:dm="rId3" r:lo="rId4" r:qs="rId5" r:cs="rId6"/>
           </a:graphicData>
         </a:graphic>
       </p:graphicFrame>
-      <p:sp>
-        <p:nvSpPr>
-          <p:cNvPr id="4" name="Slide Number Placeholder 3">
-            <a:extLst>
-              <a:ext uri="{FF2B5EF4-FFF2-40B4-BE49-F238E27FC236}">
-                <a16:creationId xmlns:a16="http://schemas.microsoft.com/office/drawing/2014/main" id="{BCECDA63-B565-4FED-8757-55394339B960}"/>
-              </a:ext>
-            </a:extLst>
-          </p:cNvPr>
-          <p:cNvSpPr>
-            <a:spLocks noGrp="1"/>
-          </p:cNvSpPr>
-          <p:nvPr>
-            <p:ph type="sldNum" sz="quarter" idx="12"/>
-          </p:nvPr>
-        </p:nvSpPr>
-        <p:spPr/>
-        <p:txBody>
-          <a:bodyPr/>
-          <a:lstStyle/>
-          <a:p>
-            <a:fld id="{C0511E7A-FB40-414D-9CE5-8839E25420B8}" type="slidenum">
-              <a:rPr lang="en-US" smtClean="0"/>
-              <a:t>19</a:t>
-            </a:fld>
-            <a:endParaRPr lang="en-US"/>
-          </a:p>
-        </p:txBody>
-      </p:sp>
     </p:spTree>
     <p:extLst>
       <p:ext uri="{BB962C8B-B14F-4D97-AF65-F5344CB8AC3E}">
@@ -51259,35 +51112,6 @@
           </a:graphicData>
         </a:graphic>
       </p:graphicFrame>
-      <p:sp>
-        <p:nvSpPr>
-          <p:cNvPr id="4" name="Slide Number Placeholder 3">
-            <a:extLst>
-              <a:ext uri="{FF2B5EF4-FFF2-40B4-BE49-F238E27FC236}">
-                <a16:creationId xmlns:a16="http://schemas.microsoft.com/office/drawing/2014/main" id="{560F896B-CBF3-436F-9F5F-7A364E4E2820}"/>
-              </a:ext>
-            </a:extLst>
-          </p:cNvPr>
-          <p:cNvSpPr>
-            <a:spLocks noGrp="1"/>
-          </p:cNvSpPr>
-          <p:nvPr>
-            <p:ph type="sldNum" sz="quarter" idx="12"/>
-          </p:nvPr>
-        </p:nvSpPr>
-        <p:spPr/>
-        <p:txBody>
-          <a:bodyPr/>
-          <a:lstStyle/>
-          <a:p>
-            <a:fld id="{C0511E7A-FB40-414D-9CE5-8839E25420B8}" type="slidenum">
-              <a:rPr lang="en-US" smtClean="0"/>
-              <a:t>2</a:t>
-            </a:fld>
-            <a:endParaRPr lang="en-US"/>
-          </a:p>
-        </p:txBody>
-      </p:sp>
     </p:spTree>
     <p:extLst>
       <p:ext uri="{BB962C8B-B14F-4D97-AF65-F5344CB8AC3E}">
@@ -51382,35 +51206,6 @@
           </a:xfrm>
         </p:spPr>
       </p:pic>
-      <p:sp>
-        <p:nvSpPr>
-          <p:cNvPr id="4" name="Slide Number Placeholder 3">
-            <a:extLst>
-              <a:ext uri="{FF2B5EF4-FFF2-40B4-BE49-F238E27FC236}">
-                <a16:creationId xmlns:a16="http://schemas.microsoft.com/office/drawing/2014/main" id="{15521BB7-151A-46F7-A16C-E68AECDC26E1}"/>
-              </a:ext>
-            </a:extLst>
-          </p:cNvPr>
-          <p:cNvSpPr>
-            <a:spLocks noGrp="1"/>
-          </p:cNvSpPr>
-          <p:nvPr>
-            <p:ph type="sldNum" sz="quarter" idx="12"/>
-          </p:nvPr>
-        </p:nvSpPr>
-        <p:spPr/>
-        <p:txBody>
-          <a:bodyPr/>
-          <a:lstStyle/>
-          <a:p>
-            <a:fld id="{C0511E7A-FB40-414D-9CE5-8839E25420B8}" type="slidenum">
-              <a:rPr lang="en-US" smtClean="0"/>
-              <a:t>20</a:t>
-            </a:fld>
-            <a:endParaRPr lang="en-US"/>
-          </a:p>
-        </p:txBody>
-      </p:sp>
     </p:spTree>
     <p:extLst>
       <p:ext uri="{BB962C8B-B14F-4D97-AF65-F5344CB8AC3E}">
@@ -51545,35 +51340,6 @@
           </a:graphicData>
         </a:graphic>
       </p:graphicFrame>
-      <p:sp>
-        <p:nvSpPr>
-          <p:cNvPr id="4" name="Slide Number Placeholder 3">
-            <a:extLst>
-              <a:ext uri="{FF2B5EF4-FFF2-40B4-BE49-F238E27FC236}">
-                <a16:creationId xmlns:a16="http://schemas.microsoft.com/office/drawing/2014/main" id="{F0300049-12AD-4E7B-8C52-F185648205DF}"/>
-              </a:ext>
-            </a:extLst>
-          </p:cNvPr>
-          <p:cNvSpPr>
-            <a:spLocks noGrp="1"/>
-          </p:cNvSpPr>
-          <p:nvPr>
-            <p:ph type="sldNum" sz="quarter" idx="12"/>
-          </p:nvPr>
-        </p:nvSpPr>
-        <p:spPr/>
-        <p:txBody>
-          <a:bodyPr/>
-          <a:lstStyle/>
-          <a:p>
-            <a:fld id="{C0511E7A-FB40-414D-9CE5-8839E25420B8}" type="slidenum">
-              <a:rPr lang="en-US" smtClean="0"/>
-              <a:t>3</a:t>
-            </a:fld>
-            <a:endParaRPr lang="en-US"/>
-          </a:p>
-        </p:txBody>
-      </p:sp>
     </p:spTree>
     <p:extLst>
       <p:ext uri="{BB962C8B-B14F-4D97-AF65-F5344CB8AC3E}">
@@ -51659,35 +51425,6 @@
           </a:graphicData>
         </a:graphic>
       </p:graphicFrame>
-      <p:sp>
-        <p:nvSpPr>
-          <p:cNvPr id="4" name="Slide Number Placeholder 3">
-            <a:extLst>
-              <a:ext uri="{FF2B5EF4-FFF2-40B4-BE49-F238E27FC236}">
-                <a16:creationId xmlns:a16="http://schemas.microsoft.com/office/drawing/2014/main" id="{F0300049-12AD-4E7B-8C52-F185648205DF}"/>
-              </a:ext>
-            </a:extLst>
-          </p:cNvPr>
-          <p:cNvSpPr>
-            <a:spLocks noGrp="1"/>
-          </p:cNvSpPr>
-          <p:nvPr>
-            <p:ph type="sldNum" sz="quarter" idx="12"/>
-          </p:nvPr>
-        </p:nvSpPr>
-        <p:spPr/>
-        <p:txBody>
-          <a:bodyPr/>
-          <a:lstStyle/>
-          <a:p>
-            <a:fld id="{C0511E7A-FB40-414D-9CE5-8839E25420B8}" type="slidenum">
-              <a:rPr lang="en-US" smtClean="0"/>
-              <a:t>4</a:t>
-            </a:fld>
-            <a:endParaRPr lang="en-US"/>
-          </a:p>
-        </p:txBody>
-      </p:sp>
       <p:cxnSp>
         <p:nvCxnSpPr>
           <p:cNvPr id="7" name="Straight Arrow Connector 6">
@@ -51856,35 +51593,6 @@
           </a:graphicData>
         </a:graphic>
       </p:graphicFrame>
-      <p:sp>
-        <p:nvSpPr>
-          <p:cNvPr id="4" name="Slide Number Placeholder 3">
-            <a:extLst>
-              <a:ext uri="{FF2B5EF4-FFF2-40B4-BE49-F238E27FC236}">
-                <a16:creationId xmlns:a16="http://schemas.microsoft.com/office/drawing/2014/main" id="{F0300049-12AD-4E7B-8C52-F185648205DF}"/>
-              </a:ext>
-            </a:extLst>
-          </p:cNvPr>
-          <p:cNvSpPr>
-            <a:spLocks noGrp="1"/>
-          </p:cNvSpPr>
-          <p:nvPr>
-            <p:ph type="sldNum" sz="quarter" idx="12"/>
-          </p:nvPr>
-        </p:nvSpPr>
-        <p:spPr/>
-        <p:txBody>
-          <a:bodyPr/>
-          <a:lstStyle/>
-          <a:p>
-            <a:fld id="{C0511E7A-FB40-414D-9CE5-8839E25420B8}" type="slidenum">
-              <a:rPr lang="en-US" smtClean="0"/>
-              <a:t>5</a:t>
-            </a:fld>
-            <a:endParaRPr lang="en-US"/>
-          </a:p>
-        </p:txBody>
-      </p:sp>
       <p:cxnSp>
         <p:nvCxnSpPr>
           <p:cNvPr id="7" name="Straight Arrow Connector 6">
@@ -52289,35 +51997,6 @@
           </a:graphicData>
         </a:graphic>
       </p:graphicFrame>
-      <p:sp>
-        <p:nvSpPr>
-          <p:cNvPr id="4" name="Slide Number Placeholder 3">
-            <a:extLst>
-              <a:ext uri="{FF2B5EF4-FFF2-40B4-BE49-F238E27FC236}">
-                <a16:creationId xmlns:a16="http://schemas.microsoft.com/office/drawing/2014/main" id="{456FE65D-CD4E-4EE5-B5AD-93344C9FA0F4}"/>
-              </a:ext>
-            </a:extLst>
-          </p:cNvPr>
-          <p:cNvSpPr>
-            <a:spLocks noGrp="1"/>
-          </p:cNvSpPr>
-          <p:nvPr>
-            <p:ph type="sldNum" sz="quarter" idx="12"/>
-          </p:nvPr>
-        </p:nvSpPr>
-        <p:spPr/>
-        <p:txBody>
-          <a:bodyPr/>
-          <a:lstStyle/>
-          <a:p>
-            <a:fld id="{C0511E7A-FB40-414D-9CE5-8839E25420B8}" type="slidenum">
-              <a:rPr lang="en-US" smtClean="0"/>
-              <a:t>6</a:t>
-            </a:fld>
-            <a:endParaRPr lang="en-US"/>
-          </a:p>
-        </p:txBody>
-      </p:sp>
       <p:graphicFrame>
         <p:nvGraphicFramePr>
           <p:cNvPr id="9" name="Content Placeholder 8">
@@ -53094,35 +52773,6 @@
           </a:graphicData>
         </a:graphic>
       </p:graphicFrame>
-      <p:sp>
-        <p:nvSpPr>
-          <p:cNvPr id="4" name="Slide Number Placeholder 3">
-            <a:extLst>
-              <a:ext uri="{FF2B5EF4-FFF2-40B4-BE49-F238E27FC236}">
-                <a16:creationId xmlns:a16="http://schemas.microsoft.com/office/drawing/2014/main" id="{153D16ED-B41A-4FF1-8BB6-1C9D43B688F6}"/>
-              </a:ext>
-            </a:extLst>
-          </p:cNvPr>
-          <p:cNvSpPr>
-            <a:spLocks noGrp="1"/>
-          </p:cNvSpPr>
-          <p:nvPr>
-            <p:ph type="sldNum" sz="quarter" idx="12"/>
-          </p:nvPr>
-        </p:nvSpPr>
-        <p:spPr/>
-        <p:txBody>
-          <a:bodyPr/>
-          <a:lstStyle/>
-          <a:p>
-            <a:fld id="{C0511E7A-FB40-414D-9CE5-8839E25420B8}" type="slidenum">
-              <a:rPr lang="en-US" smtClean="0"/>
-              <a:t>7</a:t>
-            </a:fld>
-            <a:endParaRPr lang="en-US"/>
-          </a:p>
-        </p:txBody>
-      </p:sp>
     </p:spTree>
     <p:extLst>
       <p:ext uri="{BB962C8B-B14F-4D97-AF65-F5344CB8AC3E}">
@@ -53213,35 +52863,6 @@
           </a:graphicData>
         </a:graphic>
       </p:graphicFrame>
-      <p:sp>
-        <p:nvSpPr>
-          <p:cNvPr id="4" name="Slide Number Placeholder 3">
-            <a:extLst>
-              <a:ext uri="{FF2B5EF4-FFF2-40B4-BE49-F238E27FC236}">
-                <a16:creationId xmlns:a16="http://schemas.microsoft.com/office/drawing/2014/main" id="{153D16ED-B41A-4FF1-8BB6-1C9D43B688F6}"/>
-              </a:ext>
-            </a:extLst>
-          </p:cNvPr>
-          <p:cNvSpPr>
-            <a:spLocks noGrp="1"/>
-          </p:cNvSpPr>
-          <p:nvPr>
-            <p:ph type="sldNum" sz="quarter" idx="12"/>
-          </p:nvPr>
-        </p:nvSpPr>
-        <p:spPr/>
-        <p:txBody>
-          <a:bodyPr/>
-          <a:lstStyle/>
-          <a:p>
-            <a:fld id="{C0511E7A-FB40-414D-9CE5-8839E25420B8}" type="slidenum">
-              <a:rPr lang="en-US" smtClean="0"/>
-              <a:t>8</a:t>
-            </a:fld>
-            <a:endParaRPr lang="en-US"/>
-          </a:p>
-        </p:txBody>
-      </p:sp>
     </p:spTree>
     <p:extLst>
       <p:ext uri="{BB962C8B-B14F-4D97-AF65-F5344CB8AC3E}">
@@ -53332,35 +52953,6 @@
           </a:graphicData>
         </a:graphic>
       </p:graphicFrame>
-      <p:sp>
-        <p:nvSpPr>
-          <p:cNvPr id="4" name="Slide Number Placeholder 3">
-            <a:extLst>
-              <a:ext uri="{FF2B5EF4-FFF2-40B4-BE49-F238E27FC236}">
-                <a16:creationId xmlns:a16="http://schemas.microsoft.com/office/drawing/2014/main" id="{BCECDA63-B565-4FED-8757-55394339B960}"/>
-              </a:ext>
-            </a:extLst>
-          </p:cNvPr>
-          <p:cNvSpPr>
-            <a:spLocks noGrp="1"/>
-          </p:cNvSpPr>
-          <p:nvPr>
-            <p:ph type="sldNum" sz="quarter" idx="12"/>
-          </p:nvPr>
-        </p:nvSpPr>
-        <p:spPr/>
-        <p:txBody>
-          <a:bodyPr/>
-          <a:lstStyle/>
-          <a:p>
-            <a:fld id="{C0511E7A-FB40-414D-9CE5-8839E25420B8}" type="slidenum">
-              <a:rPr lang="en-US" smtClean="0"/>
-              <a:t>9</a:t>
-            </a:fld>
-            <a:endParaRPr lang="en-US"/>
-          </a:p>
-        </p:txBody>
-      </p:sp>
     </p:spTree>
     <p:extLst>
       <p:ext uri="{BB962C8B-B14F-4D97-AF65-F5344CB8AC3E}">

</xml_diff>